<commit_message>
Updates to GLD-implemented VVO scheme to provide more detail and explain the variables better.
</commit_message>
<xml_diff>
--- a/University of Washington Class/Module 6 - Volt-VAR Optimization.pptx
+++ b/University of Washington Class/Module 6 - Volt-VAR Optimization.pptx
@@ -5,7 +5,7 @@
     <p:sldMasterId id="2147483648" r:id="rId1"/>
   </p:sldMasterIdLst>
   <p:notesMasterIdLst>
-    <p:notesMasterId r:id="rId33"/>
+    <p:notesMasterId r:id="rId37"/>
   </p:notesMasterIdLst>
   <p:sldIdLst>
     <p:sldId id="256" r:id="rId2"/>
@@ -22,23 +22,27 @@
     <p:sldId id="335" r:id="rId13"/>
     <p:sldId id="336" r:id="rId14"/>
     <p:sldId id="337" r:id="rId15"/>
-    <p:sldId id="338" r:id="rId16"/>
-    <p:sldId id="339" r:id="rId17"/>
-    <p:sldId id="340" r:id="rId18"/>
-    <p:sldId id="341" r:id="rId19"/>
-    <p:sldId id="344" r:id="rId20"/>
-    <p:sldId id="345" r:id="rId21"/>
-    <p:sldId id="348" r:id="rId22"/>
-    <p:sldId id="346" r:id="rId23"/>
-    <p:sldId id="347" r:id="rId24"/>
-    <p:sldId id="342" r:id="rId25"/>
-    <p:sldId id="343" r:id="rId26"/>
-    <p:sldId id="324" r:id="rId27"/>
-    <p:sldId id="261" r:id="rId28"/>
-    <p:sldId id="328" r:id="rId29"/>
-    <p:sldId id="330" r:id="rId30"/>
-    <p:sldId id="329" r:id="rId31"/>
-    <p:sldId id="349" r:id="rId32"/>
+    <p:sldId id="351" r:id="rId16"/>
+    <p:sldId id="338" r:id="rId17"/>
+    <p:sldId id="352" r:id="rId18"/>
+    <p:sldId id="339" r:id="rId19"/>
+    <p:sldId id="355" r:id="rId20"/>
+    <p:sldId id="354" r:id="rId21"/>
+    <p:sldId id="340" r:id="rId22"/>
+    <p:sldId id="341" r:id="rId23"/>
+    <p:sldId id="344" r:id="rId24"/>
+    <p:sldId id="345" r:id="rId25"/>
+    <p:sldId id="348" r:id="rId26"/>
+    <p:sldId id="346" r:id="rId27"/>
+    <p:sldId id="347" r:id="rId28"/>
+    <p:sldId id="342" r:id="rId29"/>
+    <p:sldId id="343" r:id="rId30"/>
+    <p:sldId id="324" r:id="rId31"/>
+    <p:sldId id="261" r:id="rId32"/>
+    <p:sldId id="328" r:id="rId33"/>
+    <p:sldId id="330" r:id="rId34"/>
+    <p:sldId id="329" r:id="rId35"/>
+    <p:sldId id="349" r:id="rId36"/>
   </p:sldIdLst>
   <p:sldSz cx="9144000" cy="6858000" type="screen4x3"/>
   <p:notesSz cx="6858000" cy="9144000"/>
@@ -223,7 +227,7 @@
             <a:fld id="{30456DE2-1550-4DE2-8C7A-8D9992B45402}" type="datetimeFigureOut">
               <a:rPr lang="en-US" smtClean="0"/>
               <a:pPr/>
-              <a:t>11/28/2011</a:t>
+              <a:t>11/29/2011</a:t>
             </a:fld>
             <a:endParaRPr lang="en-US"/>
           </a:p>
@@ -675,7 +679,7 @@
           <a:p>
             <a:fld id="{6519E7BD-BA7F-4B81-A129-70E95F6DF237}" type="datetime1">
               <a:rPr lang="en-US" smtClean="0"/>
-              <a:t>11/28/2011</a:t>
+              <a:t>11/29/2011</a:t>
             </a:fld>
             <a:endParaRPr lang="en-US"/>
           </a:p>
@@ -944,7 +948,7 @@
           <a:p>
             <a:fld id="{ED390F24-4C39-4969-AF25-1239CA7FF3DE}" type="datetime1">
               <a:rPr lang="en-US" smtClean="0"/>
-              <a:t>11/28/2011</a:t>
+              <a:t>11/29/2011</a:t>
             </a:fld>
             <a:endParaRPr lang="en-US"/>
           </a:p>
@@ -1120,7 +1124,7 @@
           <a:p>
             <a:fld id="{C34E4A9B-9920-4234-AEB4-5607845725C0}" type="datetime1">
               <a:rPr lang="en-US" smtClean="0"/>
-              <a:t>11/28/2011</a:t>
+              <a:t>11/29/2011</a:t>
             </a:fld>
             <a:endParaRPr lang="en-US"/>
           </a:p>
@@ -1286,7 +1290,7 @@
           <a:p>
             <a:fld id="{4EB4F7BD-B02C-4562-9C64-672E469C9760}" type="datetime1">
               <a:rPr lang="en-US" smtClean="0"/>
-              <a:t>11/28/2011</a:t>
+              <a:t>11/29/2011</a:t>
             </a:fld>
             <a:endParaRPr lang="en-US" dirty="0"/>
           </a:p>
@@ -1528,7 +1532,7 @@
           <a:p>
             <a:fld id="{3E4D7124-CB27-4A90-BE7A-D1E0ABDB04C5}" type="datetime1">
               <a:rPr lang="en-US" smtClean="0"/>
-              <a:t>11/28/2011</a:t>
+              <a:t>11/29/2011</a:t>
             </a:fld>
             <a:endParaRPr lang="en-US"/>
           </a:p>
@@ -1812,7 +1816,7 @@
           <a:p>
             <a:fld id="{CA5669D2-688D-4573-B135-CCF7B5BC920F}" type="datetime1">
               <a:rPr lang="en-US" smtClean="0"/>
-              <a:t>11/28/2011</a:t>
+              <a:t>11/29/2011</a:t>
             </a:fld>
             <a:endParaRPr lang="en-US"/>
           </a:p>
@@ -2230,7 +2234,7 @@
           <a:p>
             <a:fld id="{30FFD320-1AEF-4D74-B2A0-E24E0249BEC1}" type="datetime1">
               <a:rPr lang="en-US" smtClean="0"/>
-              <a:t>11/28/2011</a:t>
+              <a:t>11/29/2011</a:t>
             </a:fld>
             <a:endParaRPr lang="en-US"/>
           </a:p>
@@ -2344,7 +2348,7 @@
           <a:p>
             <a:fld id="{BB15CDF8-705B-4637-AE33-67119B125F3D}" type="datetime1">
               <a:rPr lang="en-US" smtClean="0"/>
-              <a:t>11/28/2011</a:t>
+              <a:t>11/29/2011</a:t>
             </a:fld>
             <a:endParaRPr lang="en-US"/>
           </a:p>
@@ -2435,7 +2439,7 @@
           <a:p>
             <a:fld id="{0A6B3399-1807-4B55-9AC1-576C7016240D}" type="datetime1">
               <a:rPr lang="en-US" smtClean="0"/>
-              <a:t>11/28/2011</a:t>
+              <a:t>11/29/2011</a:t>
             </a:fld>
             <a:endParaRPr lang="en-US"/>
           </a:p>
@@ -2708,7 +2712,7 @@
           <a:p>
             <a:fld id="{AABB4BFE-5A26-46CE-87FE-B0B3FFEF3620}" type="datetime1">
               <a:rPr lang="en-US" smtClean="0"/>
-              <a:t>11/28/2011</a:t>
+              <a:t>11/29/2011</a:t>
             </a:fld>
             <a:endParaRPr lang="en-US"/>
           </a:p>
@@ -2957,7 +2961,7 @@
           <a:p>
             <a:fld id="{215422AA-CF2D-439D-80CB-DD01E7ACDE11}" type="datetime1">
               <a:rPr lang="en-US" smtClean="0"/>
-              <a:t>11/28/2011</a:t>
+              <a:t>11/29/2011</a:t>
             </a:fld>
             <a:endParaRPr lang="en-US"/>
           </a:p>
@@ -3170,7 +3174,7 @@
           <a:p>
             <a:fld id="{1129FE10-ACD9-430D-B7E5-C58C92EFD52A}" type="datetime1">
               <a:rPr lang="en-US" smtClean="0"/>
-              <a:t>11/28/2011</a:t>
+              <a:t>11/29/2011</a:t>
             </a:fld>
             <a:endParaRPr lang="en-US" dirty="0"/>
           </a:p>
@@ -3902,9 +3906,8 @@
           <a:p>
             <a:r>
               <a:rPr lang="en-US" dirty="0" smtClean="0"/>
-              <a:t>The capabilities, and cost, of these commercially available products varies.</a:t>
-            </a:r>
-            <a:endParaRPr lang="en-US" dirty="0" smtClean="0"/>
+              <a:t>The capabilities and cost of these commercially available products varies.</a:t>
+            </a:r>
           </a:p>
           <a:p>
             <a:pPr lvl="1"/>
@@ -4056,11 +4059,7 @@
           <a:p>
             <a:r>
               <a:rPr lang="en-US" dirty="0" smtClean="0"/>
-              <a:t>Simple </a:t>
-            </a:r>
-            <a:r>
-              <a:rPr lang="en-US" dirty="0" smtClean="0"/>
-              <a:t>control scheme</a:t>
+              <a:t>Simple control scheme</a:t>
             </a:r>
           </a:p>
           <a:p>
@@ -4084,6 +4083,13 @@
             </a:r>
           </a:p>
           <a:p>
+            <a:pPr lvl="1"/>
+            <a:r>
+              <a:rPr lang="en-US" dirty="0" smtClean="0"/>
+              <a:t>Assumes no reverse energy power flow</a:t>
+            </a:r>
+          </a:p>
+          <a:p>
             <a:r>
               <a:rPr lang="en-US" dirty="0" smtClean="0"/>
               <a:t>Two-stage process</a:t>
@@ -4093,22 +4099,14 @@
             <a:pPr lvl="1"/>
             <a:r>
               <a:rPr lang="en-US" dirty="0" smtClean="0"/>
-              <a:t>Primary goal: optimize </a:t>
-            </a:r>
-            <a:r>
-              <a:rPr lang="en-US" dirty="0" smtClean="0"/>
-              <a:t>voltage</a:t>
+              <a:t>Primary goal: optimize voltage – move the voltage to a desired set point</a:t>
             </a:r>
           </a:p>
           <a:p>
             <a:pPr lvl="1"/>
             <a:r>
               <a:rPr lang="en-US" dirty="0" smtClean="0"/>
-              <a:t>Secondary goal: optimize </a:t>
-            </a:r>
-            <a:r>
-              <a:rPr lang="en-US" dirty="0" smtClean="0"/>
-              <a:t>reactive power</a:t>
+              <a:t>Secondary goal: optimize reactive power – switch capacitors to maintain power factor</a:t>
             </a:r>
           </a:p>
           <a:p>
@@ -4218,7 +4216,7 @@
           <a:p>
             <a:r>
               <a:rPr lang="en-US" dirty="0" smtClean="0"/>
-              <a:t>Voltage Optimization</a:t>
+              <a:t>Stage 1: Voltage Optimization Objectives</a:t>
             </a:r>
           </a:p>
           <a:p>
@@ -4257,12 +4255,9 @@
           <a:p>
             <a:r>
               <a:rPr lang="en-US" dirty="0" smtClean="0"/>
-              <a:t>Capacitor </a:t>
-            </a:r>
-            <a:r>
-              <a:rPr lang="en-US" dirty="0"/>
-              <a:t>Optimization</a:t>
-            </a:r>
+              <a:t>Stage 2: Reactive Power Optimization Objectives</a:t>
+            </a:r>
+            <a:endParaRPr lang="en-US" dirty="0"/>
           </a:p>
           <a:p>
             <a:pPr marL="971550" lvl="1" indent="-514350">
@@ -4360,7 +4355,7 @@
           <a:p>
             <a:r>
               <a:rPr lang="en-US" dirty="0" smtClean="0"/>
-              <a:t>VVO-Regulators</a:t>
+              <a:t>VVO-Regulators – Voltage Optimization</a:t>
             </a:r>
             <a:endParaRPr lang="en-US" dirty="0"/>
           </a:p>
@@ -4405,6 +4400,64 @@
             </a:r>
           </a:p>
           <a:p>
+            <a:pPr marL="400050" lvl="1" indent="0">
+              <a:buNone/>
+            </a:pPr>
+            <a:r>
+              <a:rPr lang="en-US" i="1" dirty="0" smtClean="0"/>
+              <a:t>	minimum voltage</a:t>
+            </a:r>
+            <a:r>
+              <a:rPr lang="en-US" dirty="0" smtClean="0"/>
+              <a:t> (</a:t>
+            </a:r>
+            <a:r>
+              <a:rPr lang="en-US" i="1" dirty="0" err="1" smtClean="0"/>
+              <a:t>V</a:t>
+            </a:r>
+            <a:r>
+              <a:rPr lang="en-US" i="1" baseline="-25000" dirty="0" err="1" smtClean="0"/>
+              <a:t>min</a:t>
+            </a:r>
+            <a:r>
+              <a:rPr lang="en-US" dirty="0" smtClean="0"/>
+              <a:t>) is the lowest voltage measured associated 	with that regulator.  It could be the load side of the regulator 	(</a:t>
+            </a:r>
+            <a:r>
+              <a:rPr lang="en-US" i="1" dirty="0" smtClean="0"/>
+              <a:t>regulator load-side voltage </a:t>
+            </a:r>
+            <a:r>
+              <a:rPr lang="en-US" dirty="0" smtClean="0"/>
+              <a:t>(</a:t>
+            </a:r>
+            <a:r>
+              <a:rPr lang="en-US" i="1" dirty="0" err="1" smtClean="0"/>
+              <a:t>V</a:t>
+            </a:r>
+            <a:r>
+              <a:rPr lang="en-US" i="1" baseline="-25000" dirty="0" err="1" smtClean="0"/>
+              <a:t>reg_load</a:t>
+            </a:r>
+            <a:r>
+              <a:rPr lang="en-US" dirty="0" smtClean="0"/>
+              <a:t>)) or an end-of-line measurement 	(</a:t>
+            </a:r>
+            <a:r>
+              <a:rPr lang="en-US" i="1" dirty="0" smtClean="0"/>
+              <a:t>V</a:t>
+            </a:r>
+            <a:r>
+              <a:rPr lang="en-US" i="1" baseline="-25000" dirty="0" smtClean="0"/>
+              <a:t>EOL</a:t>
+            </a:r>
+            <a:r>
+              <a:rPr lang="en-US" dirty="0" smtClean="0"/>
+              <a:t>).</a:t>
+            </a:r>
+            <a:endParaRPr lang="en-US" i="1" dirty="0" smtClean="0"/>
+          </a:p>
+          <a:p>
             <a:pPr marL="514350" indent="-514350">
               <a:buFont typeface="+mj-lt"/>
               <a:buAutoNum type="arabicPeriod"/>
@@ -4415,11 +4468,27 @@
             </a:r>
             <a:r>
               <a:rPr lang="en-US" i="1" dirty="0" smtClean="0"/>
-              <a:t>voltage drop</a:t>
-            </a:r>
-            <a:r>
-              <a:rPr lang="en-US" dirty="0" smtClean="0"/>
-              <a:t> between regulator and minimum voltage</a:t>
+              <a:t>voltage drop </a:t>
+            </a:r>
+            <a:r>
+              <a:rPr lang="en-US" dirty="0" smtClean="0"/>
+              <a:t>(</a:t>
+            </a:r>
+            <a:r>
+              <a:rPr lang="en-US" i="1" dirty="0" err="1" smtClean="0"/>
+              <a:t>V</a:t>
+            </a:r>
+            <a:r>
+              <a:rPr lang="en-US" i="1" baseline="-25000" dirty="0" err="1" smtClean="0"/>
+              <a:t>drop</a:t>
+            </a:r>
+            <a:r>
+              <a:rPr lang="en-US" dirty="0" smtClean="0"/>
+              <a:t>) between regulator and </a:t>
+            </a:r>
+            <a:r>
+              <a:rPr lang="en-US" i="1" dirty="0" smtClean="0"/>
+              <a:t>minimum voltage</a:t>
             </a:r>
           </a:p>
           <a:p>
@@ -4427,31 +4496,7 @@
               <a:buFont typeface="+mj-lt"/>
               <a:buAutoNum type="arabicPeriod"/>
             </a:pPr>
-            <a:r>
-              <a:rPr lang="en-US" dirty="0" smtClean="0"/>
-              <a:t>Apply </a:t>
-            </a:r>
-            <a:r>
-              <a:rPr lang="en-US" i="1" dirty="0" smtClean="0"/>
-              <a:t>voltage drop</a:t>
-            </a:r>
-            <a:r>
-              <a:rPr lang="en-US" dirty="0" smtClean="0"/>
-              <a:t> to </a:t>
-            </a:r>
-            <a:r>
-              <a:rPr lang="en-US" i="1" dirty="0" smtClean="0"/>
-              <a:t>desired voltage</a:t>
-            </a:r>
-            <a:r>
-              <a:rPr lang="en-US" dirty="0" smtClean="0"/>
-              <a:t> to obtain </a:t>
-            </a:r>
-            <a:r>
-              <a:rPr lang="en-US" i="1" dirty="0" smtClean="0"/>
-              <a:t>corrected desired voltage</a:t>
-            </a:r>
-            <a:endParaRPr lang="en-US" dirty="0"/>
+            <a:endParaRPr lang="en-US" i="1" dirty="0" smtClean="0"/>
           </a:p>
           <a:p>
             <a:pPr marL="514350" indent="-514350">
@@ -4460,16 +4505,57 @@
             </a:pPr>
             <a:r>
               <a:rPr lang="en-US" dirty="0" smtClean="0"/>
-              <a:t>Ensure </a:t>
+              <a:t>Apply </a:t>
             </a:r>
             <a:r>
               <a:rPr lang="en-US" i="1" dirty="0" smtClean="0"/>
-              <a:t>corrected desired voltage</a:t>
-            </a:r>
-            <a:r>
-              <a:rPr lang="en-US" dirty="0" smtClean="0"/>
-              <a:t> does not exceed the minimum or maximum ratings of the system</a:t>
-            </a:r>
+              <a:t>voltage drop</a:t>
+            </a:r>
+            <a:r>
+              <a:rPr lang="en-US" dirty="0" smtClean="0"/>
+              <a:t> to </a:t>
+            </a:r>
+            <a:r>
+              <a:rPr lang="en-US" i="1" dirty="0" smtClean="0"/>
+              <a:t>desired voltage </a:t>
+            </a:r>
+            <a:r>
+              <a:rPr lang="en-US" dirty="0" smtClean="0"/>
+              <a:t>(</a:t>
+            </a:r>
+            <a:r>
+              <a:rPr lang="en-US" i="1" dirty="0" err="1" smtClean="0"/>
+              <a:t>V</a:t>
+            </a:r>
+            <a:r>
+              <a:rPr lang="en-US" i="1" baseline="-25000" dirty="0" err="1" smtClean="0"/>
+              <a:t>des</a:t>
+            </a:r>
+            <a:r>
+              <a:rPr lang="en-US" dirty="0" smtClean="0"/>
+              <a:t>) to obtain </a:t>
+            </a:r>
+            <a:r>
+              <a:rPr lang="en-US" i="1" dirty="0" smtClean="0"/>
+              <a:t>corrected desired voltage </a:t>
+            </a:r>
+            <a:r>
+              <a:rPr lang="en-US" dirty="0" smtClean="0"/>
+              <a:t>(</a:t>
+            </a:r>
+            <a:r>
+              <a:rPr lang="en-US" i="1" dirty="0" err="1" smtClean="0"/>
+              <a:t>V</a:t>
+            </a:r>
+            <a:r>
+              <a:rPr lang="en-US" i="1" baseline="-25000" dirty="0" err="1" smtClean="0"/>
+              <a:t>corr_des</a:t>
+            </a:r>
+            <a:r>
+              <a:rPr lang="en-US" dirty="0" smtClean="0"/>
+              <a:t>)</a:t>
+            </a:r>
+            <a:endParaRPr lang="en-US" dirty="0"/>
           </a:p>
           <a:p>
             <a:pPr marL="514350" indent="-514350">
@@ -4504,6 +4590,120 @@
           </a:p>
         </p:txBody>
       </p:sp>
+      <p:graphicFrame>
+        <p:nvGraphicFramePr>
+          <p:cNvPr id="5" name="Object 4"/>
+          <p:cNvGraphicFramePr>
+            <a:graphicFrameLocks noChangeAspect="1"/>
+          </p:cNvGraphicFramePr>
+          <p:nvPr>
+            <p:extLst>
+              <p:ext uri="{D42A27DB-BD31-4B8C-83A1-F6EECF244321}">
+                <p14:modId xmlns:p14="http://schemas.microsoft.com/office/powerpoint/2010/main" val="1172306981"/>
+              </p:ext>
+            </p:extLst>
+          </p:nvPr>
+        </p:nvGraphicFramePr>
+        <p:xfrm>
+          <a:off x="1066800" y="4459224"/>
+          <a:ext cx="2598821" cy="493776"/>
+        </p:xfrm>
+        <a:graphic>
+          <a:graphicData uri="http://schemas.openxmlformats.org/presentationml/2006/ole">
+            <mc:AlternateContent xmlns:mc="http://schemas.openxmlformats.org/markup-compatibility/2006">
+              <mc:Choice xmlns:v="urn:schemas-microsoft-com:vml" Requires="v">
+                <p:oleObj spid="_x0000_s1049" name="Equation" r:id="rId3" imgW="1269720" imgH="241200" progId="Equation.3">
+                  <p:embed/>
+                </p:oleObj>
+              </mc:Choice>
+              <mc:Fallback>
+                <p:oleObj name="Equation" r:id="rId3" imgW="1269720" imgH="241200" progId="Equation.3">
+                  <p:embed/>
+                  <p:pic>
+                    <p:nvPicPr>
+                      <p:cNvPr id="0" name=""/>
+                      <p:cNvPicPr/>
+                      <p:nvPr/>
+                    </p:nvPicPr>
+                    <p:blipFill>
+                      <a:blip r:embed="rId4"/>
+                      <a:stretch>
+                        <a:fillRect/>
+                      </a:stretch>
+                    </p:blipFill>
+                    <p:spPr>
+                      <a:xfrm>
+                        <a:off x="1066800" y="4459224"/>
+                        <a:ext cx="2598821" cy="493776"/>
+                      </a:xfrm>
+                      <a:prstGeom prst="rect">
+                        <a:avLst/>
+                      </a:prstGeom>
+                    </p:spPr>
+                  </p:pic>
+                </p:oleObj>
+              </mc:Fallback>
+            </mc:AlternateContent>
+          </a:graphicData>
+        </a:graphic>
+      </p:graphicFrame>
+      <p:graphicFrame>
+        <p:nvGraphicFramePr>
+          <p:cNvPr id="6" name="Object 5"/>
+          <p:cNvGraphicFramePr>
+            <a:graphicFrameLocks noChangeAspect="1"/>
+          </p:cNvGraphicFramePr>
+          <p:nvPr>
+            <p:extLst>
+              <p:ext uri="{D42A27DB-BD31-4B8C-83A1-F6EECF244321}">
+                <p14:modId xmlns:p14="http://schemas.microsoft.com/office/powerpoint/2010/main" val="1543908936"/>
+              </p:ext>
+            </p:extLst>
+          </p:nvPr>
+        </p:nvGraphicFramePr>
+        <p:xfrm>
+          <a:off x="1066800" y="5753940"/>
+          <a:ext cx="2551266" cy="494460"/>
+        </p:xfrm>
+        <a:graphic>
+          <a:graphicData uri="http://schemas.openxmlformats.org/presentationml/2006/ole">
+            <mc:AlternateContent xmlns:mc="http://schemas.openxmlformats.org/markup-compatibility/2006">
+              <mc:Choice xmlns:v="urn:schemas-microsoft-com:vml" Requires="v">
+                <p:oleObj spid="_x0000_s1050" name="Equation" r:id="rId5" imgW="1244520" imgH="241200" progId="Equation.3">
+                  <p:embed/>
+                </p:oleObj>
+              </mc:Choice>
+              <mc:Fallback>
+                <p:oleObj name="Equation" r:id="rId5" imgW="1244520" imgH="241200" progId="Equation.3">
+                  <p:embed/>
+                  <p:pic>
+                    <p:nvPicPr>
+                      <p:cNvPr id="0" name=""/>
+                      <p:cNvPicPr/>
+                      <p:nvPr/>
+                    </p:nvPicPr>
+                    <p:blipFill>
+                      <a:blip r:embed="rId6"/>
+                      <a:stretch>
+                        <a:fillRect/>
+                      </a:stretch>
+                    </p:blipFill>
+                    <p:spPr>
+                      <a:xfrm>
+                        <a:off x="1066800" y="5753940"/>
+                        <a:ext cx="2551266" cy="494460"/>
+                      </a:xfrm>
+                      <a:prstGeom prst="rect">
+                        <a:avLst/>
+                      </a:prstGeom>
+                    </p:spPr>
+                  </p:pic>
+                </p:oleObj>
+              </mc:Fallback>
+            </mc:AlternateContent>
+          </a:graphicData>
+        </a:graphic>
+      </p:graphicFrame>
     </p:spTree>
     <p:extLst>
       <p:ext uri="{BB962C8B-B14F-4D97-AF65-F5344CB8AC3E}">
@@ -4553,7 +4753,7 @@
           <a:p>
             <a:r>
               <a:rPr lang="en-US" dirty="0" smtClean="0"/>
-              <a:t>VVO-Regulators Cont.</a:t>
+              <a:t>VVO-Regulators – Voltage Optimization</a:t>
             </a:r>
             <a:endParaRPr lang="en-US" dirty="0"/>
           </a:p>
@@ -4572,97 +4772,179 @@
         <p:spPr/>
         <p:txBody>
           <a:bodyPr>
-            <a:normAutofit/>
+            <a:normAutofit lnSpcReduction="10000"/>
           </a:bodyPr>
           <a:lstStyle/>
+          <a:p>
+            <a:pPr marL="514350" indent="-514350">
+              <a:buFont typeface="+mj-lt"/>
+              <a:buAutoNum type="arabicPeriod" startAt="4"/>
+            </a:pPr>
+            <a:r>
+              <a:rPr lang="en-US" dirty="0" smtClean="0"/>
+              <a:t>Ensure </a:t>
+            </a:r>
+            <a:r>
+              <a:rPr lang="en-US" i="1" dirty="0" smtClean="0"/>
+              <a:t>corrected desired voltage</a:t>
+            </a:r>
+            <a:r>
+              <a:rPr lang="en-US" dirty="0" smtClean="0"/>
+              <a:t> does not exceed the minimum or maximum ratings of the system (</a:t>
+            </a:r>
+            <a:r>
+              <a:rPr lang="en-US" i="1" dirty="0" err="1" smtClean="0"/>
+              <a:t>V</a:t>
+            </a:r>
+            <a:r>
+              <a:rPr lang="en-US" i="1" baseline="-25000" dirty="0" err="1" smtClean="0"/>
+              <a:t>sys_min</a:t>
+            </a:r>
+            <a:r>
+              <a:rPr lang="en-US" dirty="0" smtClean="0"/>
+              <a:t> or </a:t>
+            </a:r>
+            <a:r>
+              <a:rPr lang="en-US" i="1" dirty="0" err="1" smtClean="0"/>
+              <a:t>V</a:t>
+            </a:r>
+            <a:r>
+              <a:rPr lang="en-US" i="1" baseline="-25000" dirty="0" err="1" smtClean="0"/>
+              <a:t>sys_max</a:t>
+            </a:r>
+            <a:r>
+              <a:rPr lang="en-US" dirty="0" smtClean="0"/>
+              <a:t>)</a:t>
+            </a:r>
+          </a:p>
+          <a:p>
+            <a:pPr marL="514350" indent="-514350">
+              <a:buFont typeface="+mj-lt"/>
+              <a:buAutoNum type="arabicPeriod" startAt="4"/>
+            </a:pPr>
+            <a:endParaRPr lang="en-US" dirty="0" smtClean="0"/>
+          </a:p>
           <a:p>
             <a:pPr marL="514350" indent="-514350">
               <a:buFont typeface="+mj-lt"/>
               <a:buAutoNum type="arabicPeriod" startAt="5"/>
             </a:pPr>
             <a:r>
-              <a:rPr lang="en-US" dirty="0" smtClean="0"/>
+              <a:rPr lang="en-US" dirty="0"/>
               <a:t>Determine if in high-loading or low-loading </a:t>
             </a:r>
             <a:r>
-              <a:rPr lang="en-US" dirty="0" err="1" smtClean="0"/>
+              <a:rPr lang="en-US" i="1" dirty="0" err="1"/>
               <a:t>deadband</a:t>
             </a:r>
             <a:r>
-              <a:rPr lang="en-US" dirty="0" smtClean="0"/>
-              <a:t> conditions by examining </a:t>
+              <a:rPr lang="en-US" dirty="0"/>
+              <a:t> </a:t>
+            </a:r>
+            <a:r>
+              <a:rPr lang="en-US" dirty="0" smtClean="0"/>
+              <a:t>(</a:t>
+            </a:r>
+            <a:r>
+              <a:rPr lang="en-US" i="1" dirty="0" err="1" smtClean="0"/>
+              <a:t>V</a:t>
+            </a:r>
+            <a:r>
+              <a:rPr lang="en-US" i="1" baseline="-25000" dirty="0" err="1" smtClean="0"/>
+              <a:t>deadband</a:t>
+            </a:r>
+            <a:r>
+              <a:rPr lang="en-US" dirty="0" smtClean="0"/>
+              <a:t>) conditions </a:t>
+            </a:r>
+            <a:r>
+              <a:rPr lang="en-US" dirty="0"/>
+              <a:t>by examining </a:t>
+            </a:r>
+            <a:r>
+              <a:rPr lang="en-US" i="1" dirty="0"/>
+              <a:t>voltage </a:t>
             </a:r>
             <a:r>
               <a:rPr lang="en-US" i="1" dirty="0" smtClean="0"/>
-              <a:t>voltage drop</a:t>
-            </a:r>
-          </a:p>
-          <a:p>
-            <a:pPr marL="514350" indent="-514350">
-              <a:buFont typeface="+mj-lt"/>
-              <a:buAutoNum type="arabicPeriod" startAt="5"/>
+              <a:t>drop</a:t>
+            </a:r>
+          </a:p>
+          <a:p>
+            <a:pPr marL="400050" lvl="1" indent="0">
+              <a:buNone/>
             </a:pPr>
             <a:r>
               <a:rPr lang="en-US" dirty="0" smtClean="0"/>
-              <a:t>Determine if </a:t>
-            </a:r>
-            <a:r>
-              <a:rPr lang="en-US" i="1" dirty="0" smtClean="0"/>
-              <a:t>corrected desired voltage</a:t>
-            </a:r>
-            <a:r>
-              <a:rPr lang="en-US" dirty="0" smtClean="0"/>
-              <a:t> is outside the </a:t>
-            </a:r>
-            <a:r>
-              <a:rPr lang="en-US" dirty="0" err="1" smtClean="0"/>
-              <a:t>deadband</a:t>
-            </a:r>
-            <a:r>
-              <a:rPr lang="en-US" dirty="0" smtClean="0"/>
-              <a:t> of </a:t>
-            </a:r>
-            <a:r>
-              <a:rPr lang="en-US" i="1" dirty="0" smtClean="0"/>
-              <a:t>current voltage</a:t>
-            </a:r>
+              <a:t>	Tap-changing conditions can be determined based on a high or low 	load voltage drop condition</a:t>
+            </a:r>
+          </a:p>
+          <a:p>
+            <a:pPr marL="400050" lvl="1" indent="0">
+              <a:buNone/>
+            </a:pPr>
+            <a:r>
+              <a:rPr lang="en-US" dirty="0"/>
+              <a:t>	</a:t>
+            </a:r>
+            <a:r>
+              <a:rPr lang="en-US" dirty="0" smtClean="0"/>
+              <a:t>Under high loading, the voltage may want to be constrained more</a:t>
+            </a:r>
+          </a:p>
+          <a:p>
+            <a:pPr marL="400050" lvl="1" indent="0">
+              <a:buNone/>
+            </a:pPr>
+            <a:r>
+              <a:rPr lang="en-US" dirty="0"/>
+              <a:t>	</a:t>
+            </a:r>
+            <a:r>
+              <a:rPr lang="en-US" dirty="0" smtClean="0"/>
+              <a:t>e.g., a high loading condition may have:</a:t>
+            </a:r>
+          </a:p>
+          <a:p>
+            <a:pPr marL="400050" lvl="1" indent="0">
+              <a:buNone/>
+            </a:pPr>
+            <a:r>
+              <a:rPr lang="en-US" dirty="0"/>
+              <a:t>	</a:t>
+            </a:r>
+            <a:r>
+              <a:rPr lang="en-US" dirty="0" smtClean="0"/>
+              <a:t>        a low loading may have:</a:t>
+            </a:r>
+          </a:p>
+          <a:p>
+            <a:pPr marL="400050" lvl="1" indent="0">
+              <a:buNone/>
+            </a:pPr>
+            <a:r>
+              <a:rPr lang="en-US" dirty="0" smtClean="0"/>
+              <a:t>	</a:t>
+            </a:r>
+            <a:r>
+              <a:rPr lang="en-US" i="1" dirty="0" err="1" smtClean="0"/>
+              <a:t>V</a:t>
+            </a:r>
+            <a:r>
+              <a:rPr lang="en-US" i="1" baseline="-25000" dirty="0" err="1" smtClean="0"/>
+              <a:t>tap</a:t>
+            </a:r>
+            <a:r>
+              <a:rPr lang="en-US" dirty="0" smtClean="0"/>
+              <a:t> is the ideal voltage change associated with a tap change on the 	regulator</a:t>
+            </a:r>
+            <a:endParaRPr lang="en-US" dirty="0"/>
+          </a:p>
+          <a:p>
+            <a:pPr marL="0" indent="0">
+              <a:buNone/>
+            </a:pPr>
             <a:endParaRPr lang="en-US" dirty="0" smtClean="0"/>
-          </a:p>
-          <a:p>
-            <a:pPr marL="514350" indent="-514350">
-              <a:buFont typeface="+mj-lt"/>
-              <a:buAutoNum type="arabicPeriod" startAt="5"/>
-            </a:pPr>
-            <a:r>
-              <a:rPr lang="en-US" dirty="0" smtClean="0"/>
-              <a:t>If tap change, ensure the estimated </a:t>
-            </a:r>
-            <a:r>
-              <a:rPr lang="en-US" i="1" dirty="0" smtClean="0"/>
-              <a:t>new voltage</a:t>
-            </a:r>
-            <a:r>
-              <a:rPr lang="en-US" dirty="0" smtClean="0"/>
-              <a:t> will not exceed the minimum and maximum values of the system</a:t>
-            </a:r>
-          </a:p>
-          <a:p>
-            <a:pPr marL="514350" indent="-514350">
-              <a:buFont typeface="+mj-lt"/>
-              <a:buAutoNum type="arabicPeriod" startAt="5"/>
-            </a:pPr>
-            <a:r>
-              <a:rPr lang="en-US" dirty="0" smtClean="0"/>
-              <a:t>If </a:t>
-            </a:r>
-            <a:r>
-              <a:rPr lang="en-US" i="1" dirty="0" smtClean="0"/>
-              <a:t>new voltage</a:t>
-            </a:r>
-            <a:r>
-              <a:rPr lang="en-US" dirty="0" smtClean="0"/>
-              <a:t> is acceptable, change taps of regulator</a:t>
-            </a:r>
           </a:p>
         </p:txBody>
       </p:sp>
@@ -4690,10 +4972,207 @@
           </a:p>
         </p:txBody>
       </p:sp>
+      <p:graphicFrame>
+        <p:nvGraphicFramePr>
+          <p:cNvPr id="5" name="Object 4"/>
+          <p:cNvGraphicFramePr>
+            <a:graphicFrameLocks noChangeAspect="1"/>
+          </p:cNvGraphicFramePr>
+          <p:nvPr>
+            <p:extLst>
+              <p:ext uri="{D42A27DB-BD31-4B8C-83A1-F6EECF244321}">
+                <p14:modId xmlns:p14="http://schemas.microsoft.com/office/powerpoint/2010/main" val="2563724450"/>
+              </p:ext>
+            </p:extLst>
+          </p:nvPr>
+        </p:nvGraphicFramePr>
+        <p:xfrm>
+          <a:off x="1069848" y="2667000"/>
+          <a:ext cx="3306240" cy="494460"/>
+        </p:xfrm>
+        <a:graphic>
+          <a:graphicData uri="http://schemas.openxmlformats.org/presentationml/2006/ole">
+            <mc:AlternateContent xmlns:mc="http://schemas.openxmlformats.org/markup-compatibility/2006">
+              <mc:Choice xmlns:v="urn:schemas-microsoft-com:vml" Requires="v">
+                <p:oleObj spid="_x0000_s2085" name="Equation" r:id="rId3" imgW="1612800" imgH="241200" progId="Equation.3">
+                  <p:embed/>
+                </p:oleObj>
+              </mc:Choice>
+              <mc:Fallback>
+                <p:oleObj name="Equation" r:id="rId3" imgW="1612800" imgH="241200" progId="Equation.3">
+                  <p:embed/>
+                  <p:pic>
+                    <p:nvPicPr>
+                      <p:cNvPr id="0" name=""/>
+                      <p:cNvPicPr/>
+                      <p:nvPr/>
+                    </p:nvPicPr>
+                    <p:blipFill>
+                      <a:blip r:embed="rId4"/>
+                      <a:stretch>
+                        <a:fillRect/>
+                      </a:stretch>
+                    </p:blipFill>
+                    <p:spPr>
+                      <a:xfrm>
+                        <a:off x="1069848" y="2667000"/>
+                        <a:ext cx="3306240" cy="494460"/>
+                      </a:xfrm>
+                      <a:prstGeom prst="rect">
+                        <a:avLst/>
+                      </a:prstGeom>
+                    </p:spPr>
+                  </p:pic>
+                </p:oleObj>
+              </mc:Fallback>
+            </mc:AlternateContent>
+          </a:graphicData>
+        </a:graphic>
+      </p:graphicFrame>
+      <p:graphicFrame>
+        <p:nvGraphicFramePr>
+          <p:cNvPr id="6" name="Object 5"/>
+          <p:cNvGraphicFramePr>
+            <a:graphicFrameLocks noChangeAspect="1"/>
+          </p:cNvGraphicFramePr>
+          <p:nvPr>
+            <p:extLst>
+              <p:ext uri="{D42A27DB-BD31-4B8C-83A1-F6EECF244321}">
+                <p14:modId xmlns:p14="http://schemas.microsoft.com/office/powerpoint/2010/main" val="657418474"/>
+              </p:ext>
+            </p:extLst>
+          </p:nvPr>
+        </p:nvGraphicFramePr>
+        <p:xfrm>
+          <a:off x="5538654" y="4724400"/>
+          <a:ext cx="1822450" cy="403225"/>
+        </p:xfrm>
+        <a:graphic>
+          <a:graphicData uri="http://schemas.openxmlformats.org/presentationml/2006/ole">
+            <mc:AlternateContent xmlns:mc="http://schemas.openxmlformats.org/markup-compatibility/2006">
+              <mc:Choice xmlns:v="urn:schemas-microsoft-com:vml" Requires="v">
+                <p:oleObj spid="_x0000_s2086" name="Equation" r:id="rId5" imgW="1091880" imgH="241200" progId="Equation.3">
+                  <p:embed/>
+                </p:oleObj>
+              </mc:Choice>
+              <mc:Fallback>
+                <p:oleObj name="Equation" r:id="rId5" imgW="1091880" imgH="241200" progId="Equation.3">
+                  <p:embed/>
+                  <p:pic>
+                    <p:nvPicPr>
+                      <p:cNvPr id="0" name=""/>
+                      <p:cNvPicPr/>
+                      <p:nvPr/>
+                    </p:nvPicPr>
+                    <p:blipFill>
+                      <a:blip r:embed="rId6"/>
+                      <a:stretch>
+                        <a:fillRect/>
+                      </a:stretch>
+                    </p:blipFill>
+                    <p:spPr>
+                      <a:xfrm>
+                        <a:off x="5538654" y="4724400"/>
+                        <a:ext cx="1822450" cy="403225"/>
+                      </a:xfrm>
+                      <a:prstGeom prst="rect">
+                        <a:avLst/>
+                      </a:prstGeom>
+                    </p:spPr>
+                  </p:pic>
+                </p:oleObj>
+              </mc:Fallback>
+            </mc:AlternateContent>
+          </a:graphicData>
+        </a:graphic>
+      </p:graphicFrame>
+      <p:graphicFrame>
+        <p:nvGraphicFramePr>
+          <p:cNvPr id="7" name="Object 6"/>
+          <p:cNvGraphicFramePr>
+            <a:graphicFrameLocks noChangeAspect="1"/>
+          </p:cNvGraphicFramePr>
+          <p:nvPr>
+            <p:extLst>
+              <p:ext uri="{D42A27DB-BD31-4B8C-83A1-F6EECF244321}">
+                <p14:modId xmlns:p14="http://schemas.microsoft.com/office/powerpoint/2010/main" val="3646580045"/>
+              </p:ext>
+            </p:extLst>
+          </p:nvPr>
+        </p:nvGraphicFramePr>
+        <p:xfrm>
+          <a:off x="4468813" y="5064125"/>
+          <a:ext cx="1820862" cy="401638"/>
+        </p:xfrm>
+        <a:graphic>
+          <a:graphicData uri="http://schemas.openxmlformats.org/presentationml/2006/ole">
+            <mc:AlternateContent xmlns:mc="http://schemas.openxmlformats.org/markup-compatibility/2006">
+              <mc:Choice xmlns:v="urn:schemas-microsoft-com:vml" Requires="v">
+                <p:oleObj spid="_x0000_s2087" name="Equation" r:id="rId7" imgW="1091880" imgH="241200" progId="Equation.3">
+                  <p:embed/>
+                </p:oleObj>
+              </mc:Choice>
+              <mc:Fallback>
+                <p:oleObj name="Equation" r:id="rId7" imgW="1091880" imgH="241200" progId="Equation.3">
+                  <p:embed/>
+                  <p:pic>
+                    <p:nvPicPr>
+                      <p:cNvPr id="0" name="Object 5"/>
+                      <p:cNvPicPr>
+                        <a:picLocks noChangeAspect="1" noChangeArrowheads="1"/>
+                      </p:cNvPicPr>
+                      <p:nvPr/>
+                    </p:nvPicPr>
+                    <p:blipFill>
+                      <a:blip r:embed="rId8"/>
+                      <a:srcRect/>
+                      <a:stretch>
+                        <a:fillRect/>
+                      </a:stretch>
+                    </p:blipFill>
+                    <p:spPr bwMode="auto">
+                      <a:xfrm>
+                        <a:off x="4468813" y="5064125"/>
+                        <a:ext cx="1820862" cy="401638"/>
+                      </a:xfrm>
+                      <a:prstGeom prst="rect">
+                        <a:avLst/>
+                      </a:prstGeom>
+                      <a:noFill/>
+                      <a:ln>
+                        <a:noFill/>
+                      </a:ln>
+                      <a:extLst>
+                        <a:ext uri="{909E8E84-426E-40DD-AFC4-6F175D3DCCD1}">
+                          <a14:hiddenFill xmlns:a14="http://schemas.microsoft.com/office/drawing/2010/main">
+                            <a:solidFill>
+                              <a:srgbClr val="FFFFFF"/>
+                            </a:solidFill>
+                          </a14:hiddenFill>
+                        </a:ext>
+                        <a:ext uri="{91240B29-F687-4F45-9708-019B960494DF}">
+                          <a14:hiddenLine xmlns:a14="http://schemas.microsoft.com/office/drawing/2010/main" w="9525">
+                            <a:solidFill>
+                              <a:srgbClr val="000000"/>
+                            </a:solidFill>
+                            <a:miter lim="800000"/>
+                            <a:headEnd/>
+                            <a:tailEnd/>
+                          </a14:hiddenLine>
+                        </a:ext>
+                      </a:extLst>
+                    </p:spPr>
+                  </p:pic>
+                </p:oleObj>
+              </mc:Fallback>
+            </mc:AlternateContent>
+          </a:graphicData>
+        </a:graphic>
+      </p:graphicFrame>
     </p:spTree>
     <p:extLst>
       <p:ext uri="{BB962C8B-B14F-4D97-AF65-F5344CB8AC3E}">
-        <p14:creationId xmlns:p14="http://schemas.microsoft.com/office/powerpoint/2010/main" val="3031603408"/>
+        <p14:creationId xmlns:p14="http://schemas.microsoft.com/office/powerpoint/2010/main" val="2420186792"/>
       </p:ext>
     </p:extLst>
   </p:cSld>
@@ -4739,7 +5218,7 @@
           <a:p>
             <a:r>
               <a:rPr lang="en-US" dirty="0" smtClean="0"/>
-              <a:t>VVO-Capacitors</a:t>
+              <a:t>VVO-Regulators – Voltage Optimization</a:t>
             </a:r>
             <a:endParaRPr lang="en-US" dirty="0"/>
           </a:p>
@@ -4762,130 +5241,123 @@
           </a:bodyPr>
           <a:lstStyle/>
           <a:p>
-            <a:r>
-              <a:rPr lang="en-US" dirty="0" smtClean="0"/>
-              <a:t>Only occurs if no regulator changes are requested</a:t>
-            </a:r>
-          </a:p>
-          <a:p>
             <a:pPr marL="514350" indent="-514350">
               <a:buFont typeface="+mj-lt"/>
-              <a:buAutoNum type="arabicPeriod"/>
+              <a:buAutoNum type="arabicPeriod" startAt="6"/>
             </a:pPr>
             <a:r>
               <a:rPr lang="en-US" dirty="0" smtClean="0"/>
-              <a:t>Determine </a:t>
+              <a:t>Determine if </a:t>
             </a:r>
             <a:r>
               <a:rPr lang="en-US" i="1" dirty="0" smtClean="0"/>
-              <a:t>reactive power</a:t>
-            </a:r>
-            <a:r>
-              <a:rPr lang="en-US" dirty="0" smtClean="0"/>
-              <a:t> on line of interest (substation transformer) – compute the current </a:t>
+              <a:t>corrected desired voltage</a:t>
+            </a:r>
+            <a:r>
+              <a:rPr lang="en-US" dirty="0" smtClean="0"/>
+              <a:t> is outside the </a:t>
+            </a:r>
+            <a:r>
+              <a:rPr lang="en-US" i="1" dirty="0" err="1" smtClean="0"/>
+              <a:t>deadband</a:t>
+            </a:r>
+            <a:r>
+              <a:rPr lang="en-US" dirty="0" smtClean="0"/>
+              <a:t> of </a:t>
             </a:r>
             <a:r>
               <a:rPr lang="en-US" i="1" dirty="0" smtClean="0"/>
-              <a:t>power factor</a:t>
-            </a:r>
-            <a:endParaRPr lang="en-US" dirty="0" smtClean="0"/>
+              <a:t>current set voltage </a:t>
+            </a:r>
+            <a:r>
+              <a:rPr lang="en-US" dirty="0" smtClean="0"/>
+              <a:t>(</a:t>
+            </a:r>
+            <a:r>
+              <a:rPr lang="en-US" i="1" dirty="0" err="1" smtClean="0"/>
+              <a:t>V</a:t>
+            </a:r>
+            <a:r>
+              <a:rPr lang="en-US" i="1" baseline="-25000" dirty="0" err="1" smtClean="0"/>
+              <a:t>curr_set</a:t>
+            </a:r>
+            <a:r>
+              <a:rPr lang="en-US" dirty="0" smtClean="0"/>
+              <a:t>)</a:t>
+            </a:r>
           </a:p>
           <a:p>
             <a:pPr marL="514350" indent="-514350">
               <a:buFont typeface="+mj-lt"/>
-              <a:buAutoNum type="arabicPeriod"/>
+              <a:buAutoNum type="arabicPeriod" startAt="6"/>
             </a:pPr>
-            <a:r>
-              <a:rPr lang="en-US" dirty="0" smtClean="0"/>
-              <a:t>Determine if </a:t>
-            </a:r>
-            <a:r>
-              <a:rPr lang="en-US" i="1" dirty="0" smtClean="0"/>
-              <a:t>power factor</a:t>
-            </a:r>
-            <a:r>
-              <a:rPr lang="en-US" dirty="0" smtClean="0"/>
-              <a:t> is below the </a:t>
-            </a:r>
-            <a:r>
-              <a:rPr lang="en-US" i="1" dirty="0" smtClean="0"/>
-              <a:t>desired power factor</a:t>
-            </a:r>
+            <a:endParaRPr lang="en-US" dirty="0" smtClean="0"/>
           </a:p>
           <a:p>
             <a:pPr marL="514350" indent="-514350">
               <a:buFont typeface="+mj-lt"/>
-              <a:buAutoNum type="arabicPeriod"/>
+              <a:buAutoNum type="arabicPeriod" startAt="6"/>
             </a:pPr>
-            <a:r>
-              <a:rPr lang="en-US" dirty="0" smtClean="0"/>
-              <a:t>If outside range, proceed through capacitors –only change one per operation cycle:</a:t>
-            </a:r>
-          </a:p>
-          <a:p>
-            <a:pPr marL="739775" lvl="1" indent="-339725"/>
-            <a:r>
-              <a:rPr lang="en-US" dirty="0" smtClean="0"/>
-              <a:t>Capacitor active and </a:t>
+            <a:endParaRPr lang="en-US" dirty="0" smtClean="0"/>
+          </a:p>
+          <a:p>
+            <a:pPr marL="514350" indent="-514350">
+              <a:buFont typeface="+mj-lt"/>
+              <a:buAutoNum type="arabicPeriod" startAt="6"/>
+            </a:pPr>
+            <a:r>
+              <a:rPr lang="en-US" dirty="0" smtClean="0"/>
+              <a:t>If tap change, ensure the estimated </a:t>
             </a:r>
             <a:r>
               <a:rPr lang="en-US" i="1" dirty="0" smtClean="0"/>
-              <a:t>reactive power</a:t>
-            </a:r>
-            <a:r>
-              <a:rPr lang="en-US" dirty="0" smtClean="0"/>
-              <a:t> &lt; </a:t>
-            </a:r>
-            <a:r>
-              <a:rPr lang="en-US" i="1" dirty="0" smtClean="0"/>
-              <a:t>capacitor size</a:t>
-            </a:r>
-            <a:r>
-              <a:rPr lang="en-US" dirty="0" smtClean="0"/>
-              <a:t> * </a:t>
+              <a:t>new voltage</a:t>
+            </a:r>
+            <a:r>
+              <a:rPr lang="en-US" dirty="0" smtClean="0"/>
+              <a:t> will not exceed the minimum and maximum values of the system</a:t>
+            </a:r>
+          </a:p>
+          <a:p>
+            <a:pPr marL="0" indent="0">
+              <a:buNone/>
+            </a:pPr>
+            <a:r>
+              <a:rPr lang="en-US" dirty="0"/>
+              <a:t>	</a:t>
             </a:r>
             <a:r>
               <a:rPr lang="en-US" i="1" dirty="0" err="1" smtClean="0"/>
-              <a:t>d_min</a:t>
-            </a:r>
-            <a:r>
-              <a:rPr lang="en-US" dirty="0" smtClean="0"/>
-              <a:t>: switch capacitor to inactive</a:t>
-            </a:r>
-          </a:p>
-          <a:p>
-            <a:pPr marL="739775" lvl="1" indent="-339725"/>
-            <a:r>
-              <a:rPr lang="en-US" dirty="0" smtClean="0"/>
-              <a:t>Capacitor inactive and </a:t>
-            </a:r>
-            <a:r>
-              <a:rPr lang="en-US" i="1" dirty="0" smtClean="0"/>
-              <a:t>reactive power</a:t>
-            </a:r>
-            <a:r>
-              <a:rPr lang="en-US" dirty="0" smtClean="0"/>
-              <a:t> &gt; </a:t>
-            </a:r>
-            <a:r>
-              <a:rPr lang="en-US" i="1" dirty="0" smtClean="0"/>
-              <a:t>capacitor size * </a:t>
+              <a:t>V</a:t>
+            </a:r>
+            <a:r>
+              <a:rPr lang="en-US" i="1" baseline="-25000" dirty="0" err="1" smtClean="0"/>
+              <a:t>tapchange</a:t>
+            </a:r>
+            <a:r>
+              <a:rPr lang="en-US" dirty="0" smtClean="0"/>
+              <a:t> is the </a:t>
             </a:r>
             <a:r>
               <a:rPr lang="en-US" i="1" dirty="0" err="1" smtClean="0"/>
-              <a:t>d_max</a:t>
-            </a:r>
-            <a:r>
-              <a:rPr lang="en-US" dirty="0" smtClean="0"/>
-              <a:t>: switch capacitor to active</a:t>
-            </a:r>
-          </a:p>
-          <a:p>
-            <a:pPr marL="739775" lvl="1" indent="-339725"/>
-            <a:r>
-              <a:rPr lang="en-US" dirty="0" smtClean="0"/>
-              <a:t>Neither: proceed to next largest capacitor and continue check</a:t>
-            </a:r>
+              <a:t>V</a:t>
+            </a:r>
+            <a:r>
+              <a:rPr lang="en-US" i="1" baseline="-25000" dirty="0" err="1" smtClean="0"/>
+              <a:t>tap</a:t>
+            </a:r>
+            <a:r>
+              <a:rPr lang="en-US" dirty="0" smtClean="0"/>
+              <a:t> in the appropriate direction</a:t>
+            </a:r>
+            <a:br>
+              <a:rPr lang="en-US" dirty="0" smtClean="0"/>
+            </a:br>
+            <a:r>
+              <a:rPr lang="en-US" dirty="0" smtClean="0"/>
+              <a:t>	(+ for tap up, - for tap down)</a:t>
+            </a:r>
+            <a:endParaRPr lang="en-US" dirty="0"/>
           </a:p>
         </p:txBody>
       </p:sp>
@@ -4913,10 +5385,347 @@
           </a:p>
         </p:txBody>
       </p:sp>
+      <p:graphicFrame>
+        <p:nvGraphicFramePr>
+          <p:cNvPr id="5" name="Object 4"/>
+          <p:cNvGraphicFramePr>
+            <a:graphicFrameLocks noChangeAspect="1"/>
+          </p:cNvGraphicFramePr>
+          <p:nvPr>
+            <p:extLst>
+              <p:ext uri="{D42A27DB-BD31-4B8C-83A1-F6EECF244321}">
+                <p14:modId xmlns:p14="http://schemas.microsoft.com/office/powerpoint/2010/main" val="2271449346"/>
+              </p:ext>
+            </p:extLst>
+          </p:nvPr>
+        </p:nvGraphicFramePr>
+        <p:xfrm>
+          <a:off x="1069848" y="2368728"/>
+          <a:ext cx="3775075" cy="493713"/>
+        </p:xfrm>
+        <a:graphic>
+          <a:graphicData uri="http://schemas.openxmlformats.org/presentationml/2006/ole">
+            <mc:AlternateContent xmlns:mc="http://schemas.openxmlformats.org/markup-compatibility/2006">
+              <mc:Choice xmlns:v="urn:schemas-microsoft-com:vml" Requires="v">
+                <p:oleObj spid="_x0000_s3136" name="Equation" r:id="rId3" imgW="1841400" imgH="241200" progId="Equation.3">
+                  <p:embed/>
+                </p:oleObj>
+              </mc:Choice>
+              <mc:Fallback>
+                <p:oleObj name="Equation" r:id="rId3" imgW="1841400" imgH="241200" progId="Equation.3">
+                  <p:embed/>
+                  <p:pic>
+                    <p:nvPicPr>
+                      <p:cNvPr id="0" name=""/>
+                      <p:cNvPicPr/>
+                      <p:nvPr/>
+                    </p:nvPicPr>
+                    <p:blipFill>
+                      <a:blip r:embed="rId4"/>
+                      <a:stretch>
+                        <a:fillRect/>
+                      </a:stretch>
+                    </p:blipFill>
+                    <p:spPr>
+                      <a:xfrm>
+                        <a:off x="1069848" y="2368728"/>
+                        <a:ext cx="3775075" cy="493713"/>
+                      </a:xfrm>
+                      <a:prstGeom prst="rect">
+                        <a:avLst/>
+                      </a:prstGeom>
+                    </p:spPr>
+                  </p:pic>
+                </p:oleObj>
+              </mc:Fallback>
+            </mc:AlternateContent>
+          </a:graphicData>
+        </a:graphic>
+      </p:graphicFrame>
+      <p:graphicFrame>
+        <p:nvGraphicFramePr>
+          <p:cNvPr id="6" name="Object 5"/>
+          <p:cNvGraphicFramePr>
+            <a:graphicFrameLocks noChangeAspect="1"/>
+          </p:cNvGraphicFramePr>
+          <p:nvPr>
+            <p:extLst>
+              <p:ext uri="{D42A27DB-BD31-4B8C-83A1-F6EECF244321}">
+                <p14:modId xmlns:p14="http://schemas.microsoft.com/office/powerpoint/2010/main" val="3110644663"/>
+              </p:ext>
+            </p:extLst>
+          </p:nvPr>
+        </p:nvGraphicFramePr>
+        <p:xfrm>
+          <a:off x="1069848" y="2867292"/>
+          <a:ext cx="3357900" cy="494460"/>
+        </p:xfrm>
+        <a:graphic>
+          <a:graphicData uri="http://schemas.openxmlformats.org/presentationml/2006/ole">
+            <mc:AlternateContent xmlns:mc="http://schemas.openxmlformats.org/markup-compatibility/2006">
+              <mc:Choice xmlns:v="urn:schemas-microsoft-com:vml" Requires="v">
+                <p:oleObj spid="_x0000_s3137" name="Equation" r:id="rId5" imgW="1638000" imgH="241200" progId="Equation.3">
+                  <p:embed/>
+                </p:oleObj>
+              </mc:Choice>
+              <mc:Fallback>
+                <p:oleObj name="Equation" r:id="rId5" imgW="1638000" imgH="241200" progId="Equation.3">
+                  <p:embed/>
+                  <p:pic>
+                    <p:nvPicPr>
+                      <p:cNvPr id="0" name="Object 4"/>
+                      <p:cNvPicPr>
+                        <a:picLocks noChangeAspect="1" noChangeArrowheads="1"/>
+                      </p:cNvPicPr>
+                      <p:nvPr/>
+                    </p:nvPicPr>
+                    <p:blipFill>
+                      <a:blip r:embed="rId6"/>
+                      <a:srcRect/>
+                      <a:stretch>
+                        <a:fillRect/>
+                      </a:stretch>
+                    </p:blipFill>
+                    <p:spPr bwMode="auto">
+                      <a:xfrm>
+                        <a:off x="1069848" y="2867292"/>
+                        <a:ext cx="3357900" cy="494460"/>
+                      </a:xfrm>
+                      <a:prstGeom prst="rect">
+                        <a:avLst/>
+                      </a:prstGeom>
+                      <a:noFill/>
+                      <a:ln>
+                        <a:noFill/>
+                      </a:ln>
+                      <a:extLst>
+                        <a:ext uri="{909E8E84-426E-40DD-AFC4-6F175D3DCCD1}">
+                          <a14:hiddenFill xmlns:a14="http://schemas.microsoft.com/office/drawing/2010/main">
+                            <a:solidFill>
+                              <a:srgbClr val="FFFFFF"/>
+                            </a:solidFill>
+                          </a14:hiddenFill>
+                        </a:ext>
+                        <a:ext uri="{91240B29-F687-4F45-9708-019B960494DF}">
+                          <a14:hiddenLine xmlns:a14="http://schemas.microsoft.com/office/drawing/2010/main" w="9525">
+                            <a:solidFill>
+                              <a:srgbClr val="000000"/>
+                            </a:solidFill>
+                            <a:miter lim="800000"/>
+                            <a:headEnd/>
+                            <a:tailEnd/>
+                          </a14:hiddenLine>
+                        </a:ext>
+                      </a:extLst>
+                    </p:spPr>
+                  </p:pic>
+                </p:oleObj>
+              </mc:Fallback>
+            </mc:AlternateContent>
+          </a:graphicData>
+        </a:graphic>
+      </p:graphicFrame>
+      <p:graphicFrame>
+        <p:nvGraphicFramePr>
+          <p:cNvPr id="7" name="Object 6"/>
+          <p:cNvGraphicFramePr>
+            <a:graphicFrameLocks noChangeAspect="1"/>
+          </p:cNvGraphicFramePr>
+          <p:nvPr>
+            <p:extLst>
+              <p:ext uri="{D42A27DB-BD31-4B8C-83A1-F6EECF244321}">
+                <p14:modId xmlns:p14="http://schemas.microsoft.com/office/powerpoint/2010/main" val="3302301093"/>
+              </p:ext>
+            </p:extLst>
+          </p:nvPr>
+        </p:nvGraphicFramePr>
+        <p:xfrm>
+          <a:off x="1435608" y="4916488"/>
+          <a:ext cx="6116638" cy="493712"/>
+        </p:xfrm>
+        <a:graphic>
+          <a:graphicData uri="http://schemas.openxmlformats.org/presentationml/2006/ole">
+            <mc:AlternateContent xmlns:mc="http://schemas.openxmlformats.org/markup-compatibility/2006">
+              <mc:Choice xmlns:v="urn:schemas-microsoft-com:vml" Requires="v">
+                <p:oleObj spid="_x0000_s3138" name="Equation" r:id="rId7" imgW="2984400" imgH="241200" progId="Equation.3">
+                  <p:embed/>
+                </p:oleObj>
+              </mc:Choice>
+              <mc:Fallback>
+                <p:oleObj name="Equation" r:id="rId7" imgW="2984400" imgH="241200" progId="Equation.3">
+                  <p:embed/>
+                  <p:pic>
+                    <p:nvPicPr>
+                      <p:cNvPr id="0" name=""/>
+                      <p:cNvPicPr/>
+                      <p:nvPr/>
+                    </p:nvPicPr>
+                    <p:blipFill>
+                      <a:blip r:embed="rId8"/>
+                      <a:stretch>
+                        <a:fillRect/>
+                      </a:stretch>
+                    </p:blipFill>
+                    <p:spPr>
+                      <a:xfrm>
+                        <a:off x="1435608" y="4916488"/>
+                        <a:ext cx="6116638" cy="493712"/>
+                      </a:xfrm>
+                      <a:prstGeom prst="rect">
+                        <a:avLst/>
+                      </a:prstGeom>
+                    </p:spPr>
+                  </p:pic>
+                </p:oleObj>
+              </mc:Fallback>
+            </mc:AlternateContent>
+          </a:graphicData>
+        </a:graphic>
+      </p:graphicFrame>
+      <p:graphicFrame>
+        <p:nvGraphicFramePr>
+          <p:cNvPr id="8" name="Object 7"/>
+          <p:cNvGraphicFramePr>
+            <a:graphicFrameLocks noChangeAspect="1"/>
+          </p:cNvGraphicFramePr>
+          <p:nvPr>
+            <p:extLst>
+              <p:ext uri="{D42A27DB-BD31-4B8C-83A1-F6EECF244321}">
+                <p14:modId xmlns:p14="http://schemas.microsoft.com/office/powerpoint/2010/main" val="194244510"/>
+              </p:ext>
+            </p:extLst>
+          </p:nvPr>
+        </p:nvGraphicFramePr>
+        <p:xfrm>
+          <a:off x="1435608" y="5356225"/>
+          <a:ext cx="6194425" cy="495300"/>
+        </p:xfrm>
+        <a:graphic>
+          <a:graphicData uri="http://schemas.openxmlformats.org/presentationml/2006/ole">
+            <mc:AlternateContent xmlns:mc="http://schemas.openxmlformats.org/markup-compatibility/2006">
+              <mc:Choice xmlns:v="urn:schemas-microsoft-com:vml" Requires="v">
+                <p:oleObj spid="_x0000_s3139" name="Equation" r:id="rId9" imgW="3022560" imgH="241200" progId="Equation.3">
+                  <p:embed/>
+                </p:oleObj>
+              </mc:Choice>
+              <mc:Fallback>
+                <p:oleObj name="Equation" r:id="rId9" imgW="3022560" imgH="241200" progId="Equation.3">
+                  <p:embed/>
+                  <p:pic>
+                    <p:nvPicPr>
+                      <p:cNvPr id="0" name="Object 6"/>
+                      <p:cNvPicPr>
+                        <a:picLocks noChangeAspect="1" noChangeArrowheads="1"/>
+                      </p:cNvPicPr>
+                      <p:nvPr/>
+                    </p:nvPicPr>
+                    <p:blipFill>
+                      <a:blip r:embed="rId10"/>
+                      <a:srcRect/>
+                      <a:stretch>
+                        <a:fillRect/>
+                      </a:stretch>
+                    </p:blipFill>
+                    <p:spPr bwMode="auto">
+                      <a:xfrm>
+                        <a:off x="1435608" y="5356225"/>
+                        <a:ext cx="6194425" cy="495300"/>
+                      </a:xfrm>
+                      <a:prstGeom prst="rect">
+                        <a:avLst/>
+                      </a:prstGeom>
+                      <a:noFill/>
+                      <a:ln>
+                        <a:noFill/>
+                      </a:ln>
+                      <a:extLst>
+                        <a:ext uri="{909E8E84-426E-40DD-AFC4-6F175D3DCCD1}">
+                          <a14:hiddenFill xmlns:a14="http://schemas.microsoft.com/office/drawing/2010/main">
+                            <a:solidFill>
+                              <a:srgbClr val="FFFFFF"/>
+                            </a:solidFill>
+                          </a14:hiddenFill>
+                        </a:ext>
+                        <a:ext uri="{91240B29-F687-4F45-9708-019B960494DF}">
+                          <a14:hiddenLine xmlns:a14="http://schemas.microsoft.com/office/drawing/2010/main" w="9525">
+                            <a:solidFill>
+                              <a:srgbClr val="000000"/>
+                            </a:solidFill>
+                            <a:miter lim="800000"/>
+                            <a:headEnd/>
+                            <a:tailEnd/>
+                          </a14:hiddenLine>
+                        </a:ext>
+                      </a:extLst>
+                    </p:spPr>
+                  </p:pic>
+                </p:oleObj>
+              </mc:Fallback>
+            </mc:AlternateContent>
+          </a:graphicData>
+        </a:graphic>
+      </p:graphicFrame>
+      <p:graphicFrame>
+        <p:nvGraphicFramePr>
+          <p:cNvPr id="9" name="Object 8"/>
+          <p:cNvGraphicFramePr>
+            <a:graphicFrameLocks noChangeAspect="1"/>
+          </p:cNvGraphicFramePr>
+          <p:nvPr>
+            <p:extLst>
+              <p:ext uri="{D42A27DB-BD31-4B8C-83A1-F6EECF244321}">
+                <p14:modId xmlns:p14="http://schemas.microsoft.com/office/powerpoint/2010/main" val="3823589378"/>
+              </p:ext>
+            </p:extLst>
+          </p:nvPr>
+        </p:nvGraphicFramePr>
+        <p:xfrm>
+          <a:off x="1435608" y="5801832"/>
+          <a:ext cx="5284818" cy="494460"/>
+        </p:xfrm>
+        <a:graphic>
+          <a:graphicData uri="http://schemas.openxmlformats.org/presentationml/2006/ole">
+            <mc:AlternateContent xmlns:mc="http://schemas.openxmlformats.org/markup-compatibility/2006">
+              <mc:Choice xmlns:v="urn:schemas-microsoft-com:vml" Requires="v">
+                <p:oleObj spid="_x0000_s3140" name="Equation" r:id="rId11" imgW="2577960" imgH="241200" progId="Equation.3">
+                  <p:embed/>
+                </p:oleObj>
+              </mc:Choice>
+              <mc:Fallback>
+                <p:oleObj name="Equation" r:id="rId11" imgW="2577960" imgH="241200" progId="Equation.3">
+                  <p:embed/>
+                  <p:pic>
+                    <p:nvPicPr>
+                      <p:cNvPr id="0" name=""/>
+                      <p:cNvPicPr/>
+                      <p:nvPr/>
+                    </p:nvPicPr>
+                    <p:blipFill>
+                      <a:blip r:embed="rId12"/>
+                      <a:stretch>
+                        <a:fillRect/>
+                      </a:stretch>
+                    </p:blipFill>
+                    <p:spPr>
+                      <a:xfrm>
+                        <a:off x="1435608" y="5801832"/>
+                        <a:ext cx="5284818" cy="494460"/>
+                      </a:xfrm>
+                      <a:prstGeom prst="rect">
+                        <a:avLst/>
+                      </a:prstGeom>
+                    </p:spPr>
+                  </p:pic>
+                </p:oleObj>
+              </mc:Fallback>
+            </mc:AlternateContent>
+          </a:graphicData>
+        </a:graphic>
+      </p:graphicFrame>
     </p:spTree>
     <p:extLst>
       <p:ext uri="{BB962C8B-B14F-4D97-AF65-F5344CB8AC3E}">
-        <p14:creationId xmlns:p14="http://schemas.microsoft.com/office/powerpoint/2010/main" val="2196991609"/>
+        <p14:creationId xmlns:p14="http://schemas.microsoft.com/office/powerpoint/2010/main" val="3031603408"/>
       </p:ext>
     </p:extLst>
   </p:cSld>
@@ -4962,12 +5771,14 @@
         </p:nvSpPr>
         <p:spPr/>
         <p:txBody>
-          <a:bodyPr/>
-          <a:lstStyle/>
-          <a:p>
-            <a:r>
-              <a:rPr lang="en-US" dirty="0" smtClean="0"/>
-              <a:t>Volt-VAR Optimization – Example</a:t>
+          <a:bodyPr>
+            <a:normAutofit/>
+          </a:bodyPr>
+          <a:lstStyle/>
+          <a:p>
+            <a:r>
+              <a:rPr lang="en-US" dirty="0" smtClean="0"/>
+              <a:t>VVO-Regulators – Voltage Optimization</a:t>
             </a:r>
             <a:endParaRPr lang="en-US" dirty="0"/>
           </a:p>
@@ -4983,125 +5794,74 @@
             <p:ph idx="1"/>
           </p:nvPr>
         </p:nvSpPr>
-        <p:spPr>
-          <a:xfrm>
-            <a:off x="457199" y="1600200"/>
-            <a:ext cx="4541191" cy="4525963"/>
-          </a:xfrm>
-        </p:spPr>
+        <p:spPr/>
         <p:txBody>
           <a:bodyPr>
-            <a:normAutofit fontScale="92500"/>
+            <a:normAutofit/>
           </a:bodyPr>
           <a:lstStyle/>
           <a:p>
-            <a:r>
-              <a:rPr lang="en-US" sz="3000" dirty="0" smtClean="0"/>
-              <a:t>Simple “4-node” system</a:t>
-            </a:r>
-          </a:p>
-          <a:p>
-            <a:pPr lvl="1"/>
-            <a:r>
-              <a:rPr lang="en-US" sz="2400" dirty="0" smtClean="0"/>
-              <a:t>Nodes represent measurements</a:t>
-            </a:r>
-          </a:p>
-          <a:p>
-            <a:pPr lvl="1"/>
-            <a:r>
-              <a:rPr lang="en-US" sz="2400" dirty="0" smtClean="0"/>
-              <a:t>Two Regulators</a:t>
-            </a:r>
-          </a:p>
-          <a:p>
-            <a:pPr lvl="1"/>
-            <a:r>
-              <a:rPr lang="en-US" sz="2400" dirty="0" smtClean="0"/>
-              <a:t>Two Capacitors</a:t>
-            </a:r>
-          </a:p>
-          <a:p>
-            <a:pPr lvl="1"/>
-            <a:r>
-              <a:rPr lang="en-US" sz="2400" dirty="0" smtClean="0"/>
-              <a:t>Assume regulators have 100 V tap positions</a:t>
-            </a:r>
-          </a:p>
-          <a:p>
-            <a:r>
-              <a:rPr lang="en-US" sz="3000" dirty="0" smtClean="0"/>
-              <a:t>4700 V end of line desired</a:t>
-            </a:r>
-          </a:p>
-          <a:p>
-            <a:r>
-              <a:rPr lang="en-US" sz="3000" dirty="0" smtClean="0"/>
-              <a:t>0.99 </a:t>
-            </a:r>
-            <a:r>
-              <a:rPr lang="en-US" sz="3000" dirty="0" err="1" smtClean="0"/>
-              <a:t>pf</a:t>
-            </a:r>
-            <a:r>
-              <a:rPr lang="en-US" sz="3000" dirty="0" smtClean="0"/>
-              <a:t> desired</a:t>
-            </a:r>
-          </a:p>
-          <a:p>
-            <a:r>
-              <a:rPr lang="en-US" sz="3000" dirty="0" smtClean="0"/>
-              <a:t>Minimize reactive flow through </a:t>
-            </a:r>
-            <a:r>
-              <a:rPr lang="en-US" sz="3000" dirty="0" err="1" smtClean="0"/>
-              <a:t>Xfmr</a:t>
-            </a:r>
-            <a:endParaRPr lang="en-US" sz="3000" dirty="0" smtClean="0"/>
-          </a:p>
-        </p:txBody>
-      </p:sp>
-      <p:pic>
-        <p:nvPicPr>
-          <p:cNvPr id="13314" name="Picture 2" descr="C:\Users\d3x593\Desktop\Volt-VAR-Example\Base_Volt_VAR.jpg"/>
-          <p:cNvPicPr>
-            <a:picLocks noChangeAspect="1" noChangeArrowheads="1"/>
-          </p:cNvPicPr>
-          <p:nvPr/>
-        </p:nvPicPr>
-        <p:blipFill>
-          <a:blip r:embed="rId2">
-            <a:extLst>
-              <a:ext uri="{28A0092B-C50C-407E-A947-70E740481C1C}">
-                <a14:useLocalDpi xmlns:a14="http://schemas.microsoft.com/office/drawing/2010/main" val="0"/>
-              </a:ext>
-            </a:extLst>
-          </a:blip>
-          <a:srcRect/>
-          <a:stretch>
-            <a:fillRect/>
-          </a:stretch>
-        </p:blipFill>
-        <p:spPr bwMode="auto">
-          <a:xfrm>
-            <a:off x="5001768" y="1647825"/>
-            <a:ext cx="4068064" cy="3456432"/>
-          </a:xfrm>
-          <a:prstGeom prst="rect">
-            <a:avLst/>
-          </a:prstGeom>
-          <a:noFill/>
-          <a:extLst>
-            <a:ext uri="{909E8E84-426E-40DD-AFC4-6F175D3DCCD1}">
-              <a14:hiddenFill xmlns:a14="http://schemas.microsoft.com/office/drawing/2010/main">
-                <a:solidFill>
-                  <a:srgbClr val="FFFFFF"/>
-                </a:solidFill>
-              </a14:hiddenFill>
-            </a:ext>
-          </a:extLst>
-        </p:spPr>
-      </p:pic>
+            <a:pPr marL="514350" indent="-514350">
+              <a:buFont typeface="+mj-lt"/>
+              <a:buAutoNum type="arabicPeriod" startAt="8"/>
+            </a:pPr>
+            <a:r>
+              <a:rPr lang="en-US" dirty="0" smtClean="0"/>
+              <a:t>If </a:t>
+            </a:r>
+            <a:r>
+              <a:rPr lang="en-US" i="1" dirty="0" smtClean="0"/>
+              <a:t>new voltage</a:t>
+            </a:r>
+            <a:r>
+              <a:rPr lang="en-US" dirty="0" smtClean="0"/>
+              <a:t> is acceptable, change taps of regulator</a:t>
+            </a:r>
+          </a:p>
+          <a:p>
+            <a:pPr marL="400050" lvl="1" indent="0">
+              <a:buNone/>
+            </a:pPr>
+            <a:r>
+              <a:rPr lang="en-US" dirty="0"/>
+              <a:t>	</a:t>
+            </a:r>
+            <a:r>
+              <a:rPr lang="en-US" dirty="0" smtClean="0"/>
+              <a:t>Tap change is pushed to the regulator directly, not a voltage set point</a:t>
+            </a:r>
+            <a:br>
+              <a:rPr lang="en-US" dirty="0" smtClean="0"/>
+            </a:br>
+            <a:r>
+              <a:rPr lang="en-US" dirty="0" smtClean="0"/>
+              <a:t>	(i.e., the regulator is commanded “tap up”, not “set voltage to 2500”)</a:t>
+            </a:r>
+          </a:p>
+          <a:p>
+            <a:pPr marL="400050" lvl="1" indent="0">
+              <a:buNone/>
+            </a:pPr>
+            <a:endParaRPr lang="en-US" dirty="0"/>
+          </a:p>
+          <a:p>
+            <a:pPr marL="400050" lvl="1" indent="0">
+              <a:buNone/>
+            </a:pPr>
+            <a:r>
+              <a:rPr lang="en-US" dirty="0" smtClean="0"/>
+              <a:t>	Downstream regulators are not coordinated, so upstream changes may</a:t>
+            </a:r>
+            <a:br>
+              <a:rPr lang="en-US" dirty="0" smtClean="0"/>
+            </a:br>
+            <a:r>
+              <a:rPr lang="en-US" dirty="0" smtClean="0"/>
+              <a:t>	move them into a voltage violation</a:t>
+            </a:r>
+          </a:p>
+        </p:txBody>
+      </p:sp>
       <p:sp>
         <p:nvSpPr>
           <p:cNvPr id="4" name="Slide Number Placeholder 3"/>
@@ -5129,7 +5889,7 @@
     </p:spTree>
     <p:extLst>
       <p:ext uri="{BB962C8B-B14F-4D97-AF65-F5344CB8AC3E}">
-        <p14:creationId xmlns:p14="http://schemas.microsoft.com/office/powerpoint/2010/main" val="1951542715"/>
+        <p14:creationId xmlns:p14="http://schemas.microsoft.com/office/powerpoint/2010/main" val="3612236639"/>
       </p:ext>
     </p:extLst>
   </p:cSld>
@@ -5182,7 +5942,7 @@
           <a:p>
             <a:r>
               <a:rPr lang="en-US" dirty="0" smtClean="0"/>
-              <a:t>Volt-VAR Optimization Example – Initial Voltages</a:t>
+              <a:t>VVO-Capacitors – Reactive Power Optimization</a:t>
             </a:r>
             <a:endParaRPr lang="en-US" dirty="0"/>
           </a:p>
@@ -5198,138 +5958,165 @@
             <p:ph idx="1"/>
           </p:nvPr>
         </p:nvSpPr>
-        <p:spPr>
-          <a:xfrm>
-            <a:off x="457199" y="1600200"/>
-            <a:ext cx="4541191" cy="4525963"/>
-          </a:xfrm>
-        </p:spPr>
+        <p:spPr/>
         <p:txBody>
           <a:bodyPr>
             <a:normAutofit/>
           </a:bodyPr>
           <a:lstStyle/>
+          <a:p>
+            <a:r>
+              <a:rPr lang="en-US" dirty="0" smtClean="0"/>
+              <a:t>Only occurs if no regulator changes are requested</a:t>
+            </a:r>
+          </a:p>
           <a:p>
             <a:pPr marL="514350" indent="-514350">
               <a:buFont typeface="+mj-lt"/>
               <a:buAutoNum type="arabicPeriod"/>
             </a:pPr>
             <a:r>
-              <a:rPr lang="en-US" sz="2800" dirty="0" smtClean="0"/>
+              <a:rPr lang="en-US" dirty="0" smtClean="0"/>
               <a:t>Determine </a:t>
             </a:r>
             <a:r>
-              <a:rPr lang="en-US" sz="2800" i="1" dirty="0" smtClean="0"/>
-              <a:t>minimum voltage</a:t>
-            </a:r>
-            <a:r>
-              <a:rPr lang="en-US" sz="2800" dirty="0" smtClean="0"/>
+              <a:rPr lang="en-US" i="1" dirty="0" smtClean="0"/>
+              <a:t>reactive power </a:t>
+            </a:r>
+            <a:r>
+              <a:rPr lang="en-US" dirty="0" smtClean="0"/>
+              <a:t>(</a:t>
+            </a:r>
+            <a:r>
+              <a:rPr lang="en-US" i="1" dirty="0" err="1" smtClean="0"/>
+              <a:t>Q</a:t>
+            </a:r>
+            <a:r>
+              <a:rPr lang="en-US" i="1" baseline="-25000" dirty="0" err="1" smtClean="0"/>
+              <a:t>line</a:t>
+            </a:r>
+            <a:r>
+              <a:rPr lang="en-US" dirty="0" smtClean="0"/>
+              <a:t>) on line of interest (substation transformer) – compute the current </a:t>
+            </a:r>
+            <a:r>
+              <a:rPr lang="en-US" i="1" dirty="0" smtClean="0"/>
+              <a:t>power factor </a:t>
+            </a:r>
+            <a:r>
+              <a:rPr lang="en-US" dirty="0" smtClean="0"/>
+              <a:t>(</a:t>
+            </a:r>
+            <a:r>
+              <a:rPr lang="en-US" i="1" dirty="0" err="1" smtClean="0"/>
+              <a:t>PF</a:t>
+            </a:r>
+            <a:r>
+              <a:rPr lang="en-US" i="1" baseline="-25000" dirty="0" err="1" smtClean="0"/>
+              <a:t>curr</a:t>
+            </a:r>
+            <a:r>
+              <a:rPr lang="en-US" dirty="0" smtClean="0"/>
+              <a:t>) from the </a:t>
+            </a:r>
+            <a:r>
+              <a:rPr lang="en-US" i="1" dirty="0" smtClean="0"/>
+              <a:t>reactive power</a:t>
+            </a:r>
+            <a:r>
+              <a:rPr lang="en-US" dirty="0" smtClean="0"/>
               <a:t> and </a:t>
             </a:r>
             <a:r>
-              <a:rPr lang="en-US" sz="2800" i="1" dirty="0" smtClean="0"/>
-              <a:t>regulator load-side voltages</a:t>
-            </a:r>
-          </a:p>
-          <a:p>
-            <a:pPr lvl="1"/>
-            <a:r>
-              <a:rPr lang="en-US" sz="2200" dirty="0" err="1" smtClean="0"/>
-              <a:t>Reg</a:t>
-            </a:r>
-            <a:r>
-              <a:rPr lang="en-US" sz="2200" dirty="0" smtClean="0"/>
-              <a:t> 1 – 4850 V and 4600 V</a:t>
-            </a:r>
-          </a:p>
-          <a:p>
-            <a:pPr lvl="1"/>
-            <a:r>
-              <a:rPr lang="en-US" sz="2200" dirty="0" err="1" smtClean="0"/>
-              <a:t>Reg</a:t>
-            </a:r>
-            <a:r>
-              <a:rPr lang="en-US" sz="2200" dirty="0" smtClean="0"/>
-              <a:t> 2 – 4840 V and 4700 V</a:t>
-            </a:r>
-          </a:p>
-          <a:p>
-            <a:pPr marL="0" indent="0">
+              <a:rPr lang="en-US" i="1" dirty="0" smtClean="0"/>
+              <a:t>real power</a:t>
+            </a:r>
+            <a:r>
+              <a:rPr lang="en-US" dirty="0" smtClean="0"/>
+              <a:t> (</a:t>
+            </a:r>
+            <a:r>
+              <a:rPr lang="en-US" i="1" dirty="0" err="1" smtClean="0"/>
+              <a:t>P</a:t>
+            </a:r>
+            <a:r>
+              <a:rPr lang="en-US" i="1" baseline="-25000" dirty="0" err="1" smtClean="0"/>
+              <a:t>line</a:t>
+            </a:r>
+            <a:r>
+              <a:rPr lang="en-US" dirty="0" smtClean="0"/>
+              <a:t>) of the line</a:t>
+            </a:r>
+          </a:p>
+          <a:p>
+            <a:pPr marL="514350" indent="-514350">
+              <a:buFont typeface="+mj-lt"/>
+              <a:buAutoNum type="arabicPeriod"/>
+            </a:pPr>
+            <a:endParaRPr lang="en-US" dirty="0" smtClean="0"/>
+          </a:p>
+          <a:p>
+            <a:pPr marL="514350" indent="-514350">
+              <a:buFont typeface="+mj-lt"/>
+              <a:buAutoNum type="arabicPeriod"/>
+            </a:pPr>
+            <a:endParaRPr lang="en-US" dirty="0" smtClean="0"/>
+          </a:p>
+          <a:p>
+            <a:pPr marL="400050" lvl="1" indent="0">
               <a:buNone/>
             </a:pPr>
             <a:r>
-              <a:rPr lang="en-US" sz="2800" dirty="0" smtClean="0"/>
-              <a:t>1a. Evaluate voltages</a:t>
-            </a:r>
-          </a:p>
-          <a:p>
-            <a:pPr lvl="1"/>
-            <a:r>
-              <a:rPr lang="en-US" sz="2200" dirty="0" err="1" smtClean="0"/>
-              <a:t>Reg</a:t>
-            </a:r>
-            <a:r>
-              <a:rPr lang="en-US" sz="2200" dirty="0" smtClean="0"/>
-              <a:t> 1 end-of-line voltage is low</a:t>
-            </a:r>
-          </a:p>
-          <a:p>
-            <a:pPr lvl="1"/>
-            <a:r>
-              <a:rPr lang="en-US" sz="2200" dirty="0" err="1" smtClean="0"/>
-              <a:t>Reg</a:t>
-            </a:r>
-            <a:r>
-              <a:rPr lang="en-US" sz="2200" dirty="0" smtClean="0"/>
-              <a:t> 2 is acceptable</a:t>
-            </a:r>
-          </a:p>
-          <a:p>
-            <a:endParaRPr lang="en-US" dirty="0"/>
-          </a:p>
-        </p:txBody>
-      </p:sp>
-      <p:pic>
-        <p:nvPicPr>
-          <p:cNvPr id="14338" name="Picture 2" descr="C:\Users\d3x593\Desktop\Volt-VAR-Example\Base_Volt_VAR_Initial_Voltage.jpg"/>
-          <p:cNvPicPr>
-            <a:picLocks noChangeAspect="1" noChangeArrowheads="1"/>
-          </p:cNvPicPr>
-          <p:nvPr/>
-        </p:nvPicPr>
-        <p:blipFill>
-          <a:blip r:embed="rId2">
-            <a:extLst>
-              <a:ext uri="{28A0092B-C50C-407E-A947-70E740481C1C}">
-                <a14:useLocalDpi xmlns:a14="http://schemas.microsoft.com/office/drawing/2010/main" val="0"/>
-              </a:ext>
-            </a:extLst>
-          </a:blip>
-          <a:srcRect/>
-          <a:stretch>
-            <a:fillRect/>
-          </a:stretch>
-        </p:blipFill>
-        <p:spPr bwMode="auto">
-          <a:xfrm>
-            <a:off x="5001768" y="1645920"/>
-            <a:ext cx="4069080" cy="3457295"/>
-          </a:xfrm>
-          <a:prstGeom prst="rect">
-            <a:avLst/>
-          </a:prstGeom>
-          <a:noFill/>
-          <a:extLst>
-            <a:ext uri="{909E8E84-426E-40DD-AFC4-6F175D3DCCD1}">
-              <a14:hiddenFill xmlns:a14="http://schemas.microsoft.com/office/drawing/2010/main">
-                <a:solidFill>
-                  <a:srgbClr val="FFFFFF"/>
-                </a:solidFill>
-              </a14:hiddenFill>
-            </a:ext>
-          </a:extLst>
-        </p:spPr>
-      </p:pic>
+              <a:rPr lang="en-US" dirty="0"/>
+              <a:t>	</a:t>
+            </a:r>
+            <a:r>
+              <a:rPr lang="en-US" dirty="0" smtClean="0"/>
+              <a:t>Note that </a:t>
+            </a:r>
+            <a:r>
+              <a:rPr lang="en-US" i="1" dirty="0" err="1" smtClean="0"/>
+              <a:t>PF</a:t>
+            </a:r>
+            <a:r>
+              <a:rPr lang="en-US" i="1" baseline="-25000" dirty="0" err="1" smtClean="0"/>
+              <a:t>curr</a:t>
+            </a:r>
+            <a:r>
+              <a:rPr lang="en-US" dirty="0" smtClean="0"/>
+              <a:t> and </a:t>
+            </a:r>
+            <a:r>
+              <a:rPr lang="en-US" i="1" dirty="0" err="1" smtClean="0"/>
+              <a:t>Q</a:t>
+            </a:r>
+            <a:r>
+              <a:rPr lang="en-US" i="1" baseline="-25000" dirty="0" err="1" smtClean="0"/>
+              <a:t>line</a:t>
+            </a:r>
+            <a:r>
+              <a:rPr lang="en-US" dirty="0" smtClean="0"/>
+              <a:t> are treated more like </a:t>
+            </a:r>
+            <a:r>
+              <a:rPr lang="en-US" i="1" dirty="0" smtClean="0"/>
+              <a:t>power factor</a:t>
+            </a:r>
+            <a:r>
+              <a:rPr lang="en-US" dirty="0" smtClean="0"/>
+              <a:t> 	magnitude and </a:t>
+            </a:r>
+            <a:r>
+              <a:rPr lang="en-US" i="1" dirty="0" smtClean="0"/>
+              <a:t>reactive power</a:t>
+            </a:r>
+            <a:r>
+              <a:rPr lang="en-US" dirty="0" smtClean="0"/>
+              <a:t> magnitude.  The VVO algorithm 	assumes normal radial feeders with predominately inductive loading 	(no predominately capacitive loads or reverse power flow)</a:t>
+            </a:r>
+          </a:p>
+        </p:txBody>
+      </p:sp>
       <p:sp>
         <p:nvSpPr>
           <p:cNvPr id="4" name="Slide Number Placeholder 3"/>
@@ -5354,10 +6141,67 @@
           </a:p>
         </p:txBody>
       </p:sp>
+      <p:graphicFrame>
+        <p:nvGraphicFramePr>
+          <p:cNvPr id="5" name="Object 4"/>
+          <p:cNvGraphicFramePr>
+            <a:graphicFrameLocks noChangeAspect="1"/>
+          </p:cNvGraphicFramePr>
+          <p:nvPr>
+            <p:extLst>
+              <p:ext uri="{D42A27DB-BD31-4B8C-83A1-F6EECF244321}">
+                <p14:modId xmlns:p14="http://schemas.microsoft.com/office/powerpoint/2010/main" val="41120078"/>
+              </p:ext>
+            </p:extLst>
+          </p:nvPr>
+        </p:nvGraphicFramePr>
+        <p:xfrm>
+          <a:off x="1069848" y="3505200"/>
+          <a:ext cx="2681154" cy="963090"/>
+        </p:xfrm>
+        <a:graphic>
+          <a:graphicData uri="http://schemas.openxmlformats.org/presentationml/2006/ole">
+            <mc:AlternateContent xmlns:mc="http://schemas.openxmlformats.org/markup-compatibility/2006">
+              <mc:Choice xmlns:v="urn:schemas-microsoft-com:vml" Requires="v">
+                <p:oleObj spid="_x0000_s5131" name="Equation" r:id="rId3" imgW="1307880" imgH="469800" progId="Equation.3">
+                  <p:embed/>
+                </p:oleObj>
+              </mc:Choice>
+              <mc:Fallback>
+                <p:oleObj name="Equation" r:id="rId3" imgW="1307880" imgH="469800" progId="Equation.3">
+                  <p:embed/>
+                  <p:pic>
+                    <p:nvPicPr>
+                      <p:cNvPr id="0" name=""/>
+                      <p:cNvPicPr/>
+                      <p:nvPr/>
+                    </p:nvPicPr>
+                    <p:blipFill>
+                      <a:blip r:embed="rId4"/>
+                      <a:stretch>
+                        <a:fillRect/>
+                      </a:stretch>
+                    </p:blipFill>
+                    <p:spPr>
+                      <a:xfrm>
+                        <a:off x="1069848" y="3505200"/>
+                        <a:ext cx="2681154" cy="963090"/>
+                      </a:xfrm>
+                      <a:prstGeom prst="rect">
+                        <a:avLst/>
+                      </a:prstGeom>
+                    </p:spPr>
+                  </p:pic>
+                </p:oleObj>
+              </mc:Fallback>
+            </mc:AlternateContent>
+          </a:graphicData>
+        </a:graphic>
+      </p:graphicFrame>
     </p:spTree>
     <p:extLst>
       <p:ext uri="{BB962C8B-B14F-4D97-AF65-F5344CB8AC3E}">
-        <p14:creationId xmlns:p14="http://schemas.microsoft.com/office/powerpoint/2010/main" val="2280317076"/>
+        <p14:creationId xmlns:p14="http://schemas.microsoft.com/office/powerpoint/2010/main" val="2196991609"/>
       </p:ext>
     </p:extLst>
   </p:cSld>
@@ -5410,7 +6254,7 @@
           <a:p>
             <a:r>
               <a:rPr lang="en-US" dirty="0" smtClean="0"/>
-              <a:t>Volt-VAR Optimization Example – Condition Evaluation</a:t>
+              <a:t>VVO-Capacitors – Reactive Power Optimization</a:t>
             </a:r>
             <a:endParaRPr lang="en-US" dirty="0"/>
           </a:p>
@@ -5426,12 +6270,7 @@
             <p:ph idx="1"/>
           </p:nvPr>
         </p:nvSpPr>
-        <p:spPr>
-          <a:xfrm>
-            <a:off x="457199" y="1600200"/>
-            <a:ext cx="4541191" cy="4525963"/>
-          </a:xfrm>
-        </p:spPr>
+        <p:spPr/>
         <p:txBody>
           <a:bodyPr>
             <a:normAutofit/>
@@ -5443,89 +6282,174 @@
               <a:buAutoNum type="arabicPeriod" startAt="2"/>
             </a:pPr>
             <a:r>
-              <a:rPr lang="en-US" sz="2800" dirty="0" smtClean="0"/>
-              <a:t>Compute </a:t>
-            </a:r>
-            <a:r>
-              <a:rPr lang="en-US" sz="2800" i="1" dirty="0" smtClean="0"/>
-              <a:t>voltage drop</a:t>
-            </a:r>
-            <a:r>
-              <a:rPr lang="en-US" sz="2800" dirty="0" smtClean="0"/>
-              <a:t> between regulator and minimum voltage</a:t>
-            </a:r>
-          </a:p>
-          <a:p>
-            <a:pPr lvl="1"/>
-            <a:r>
-              <a:rPr lang="en-US" sz="2200" dirty="0" err="1" smtClean="0"/>
-              <a:t>Reg</a:t>
-            </a:r>
-            <a:r>
-              <a:rPr lang="en-US" sz="2200" dirty="0" smtClean="0"/>
-              <a:t> 1 – 250 V</a:t>
-            </a:r>
-          </a:p>
-          <a:p>
-            <a:pPr lvl="1"/>
-            <a:r>
-              <a:rPr lang="en-US" sz="2200" dirty="0" err="1" smtClean="0"/>
-              <a:t>Reg</a:t>
-            </a:r>
-            <a:r>
-              <a:rPr lang="en-US" sz="2200" dirty="0" smtClean="0"/>
-              <a:t> 2 – No action needed, but 140 V drop</a:t>
-            </a:r>
-          </a:p>
-          <a:p>
-            <a:pPr marL="0" indent="0">
+              <a:rPr lang="en-US" dirty="0" smtClean="0"/>
+              <a:t>Determine if </a:t>
+            </a:r>
+            <a:r>
+              <a:rPr lang="en-US" i="1" dirty="0" smtClean="0"/>
+              <a:t>power factor</a:t>
+            </a:r>
+            <a:r>
+              <a:rPr lang="en-US" dirty="0" smtClean="0"/>
+              <a:t> is below the </a:t>
+            </a:r>
+            <a:r>
+              <a:rPr lang="en-US" i="1" dirty="0" smtClean="0"/>
+              <a:t>desired power factor </a:t>
+            </a:r>
+            <a:r>
+              <a:rPr lang="en-US" dirty="0" smtClean="0"/>
+              <a:t>(</a:t>
+            </a:r>
+            <a:r>
+              <a:rPr lang="en-US" i="1" dirty="0" err="1" smtClean="0"/>
+              <a:t>PF</a:t>
+            </a:r>
+            <a:r>
+              <a:rPr lang="en-US" i="1" baseline="-25000" dirty="0" err="1" smtClean="0"/>
+              <a:t>des</a:t>
+            </a:r>
+            <a:r>
+              <a:rPr lang="en-US" dirty="0" smtClean="0"/>
+              <a:t>)</a:t>
+            </a:r>
+          </a:p>
+          <a:p>
+            <a:pPr marL="514350" indent="-514350">
+              <a:buFont typeface="+mj-lt"/>
+              <a:buAutoNum type="arabicPeriod" startAt="2"/>
+            </a:pPr>
+            <a:endParaRPr lang="en-US" dirty="0" smtClean="0"/>
+          </a:p>
+          <a:p>
+            <a:pPr marL="514350" indent="-514350">
+              <a:buFont typeface="+mj-lt"/>
+              <a:buAutoNum type="arabicPeriod" startAt="2"/>
+            </a:pPr>
+            <a:r>
+              <a:rPr lang="en-US" dirty="0" smtClean="0"/>
+              <a:t>If outside range, proceed through capacitors – only change one per operation cycle:</a:t>
+            </a:r>
+          </a:p>
+          <a:p>
+            <a:pPr marL="400050" lvl="1" indent="0">
               <a:buNone/>
             </a:pPr>
-            <a:endParaRPr lang="en-US" dirty="0"/>
-          </a:p>
-        </p:txBody>
-      </p:sp>
-      <p:pic>
-        <p:nvPicPr>
-          <p:cNvPr id="15362" name="Picture 2" descr="C:\Users\d3x593\Desktop\Volt-VAR-Example\Base_Volt_VAR_Evaluate1.jpg"/>
-          <p:cNvPicPr>
-            <a:picLocks noChangeAspect="1" noChangeArrowheads="1"/>
-          </p:cNvPicPr>
-          <p:nvPr/>
-        </p:nvPicPr>
-        <p:blipFill>
-          <a:blip r:embed="rId2">
-            <a:extLst>
-              <a:ext uri="{28A0092B-C50C-407E-A947-70E740481C1C}">
-                <a14:useLocalDpi xmlns:a14="http://schemas.microsoft.com/office/drawing/2010/main" val="0"/>
-              </a:ext>
-            </a:extLst>
-          </a:blip>
-          <a:srcRect/>
-          <a:stretch>
-            <a:fillRect/>
-          </a:stretch>
-        </p:blipFill>
-        <p:spPr bwMode="auto">
-          <a:xfrm>
-            <a:off x="5001768" y="1645920"/>
-            <a:ext cx="4068064" cy="3456432"/>
-          </a:xfrm>
-          <a:prstGeom prst="rect">
-            <a:avLst/>
-          </a:prstGeom>
-          <a:noFill/>
-          <a:extLst>
-            <a:ext uri="{909E8E84-426E-40DD-AFC4-6F175D3DCCD1}">
-              <a14:hiddenFill xmlns:a14="http://schemas.microsoft.com/office/drawing/2010/main">
-                <a:solidFill>
-                  <a:srgbClr val="FFFFFF"/>
-                </a:solidFill>
-              </a14:hiddenFill>
-            </a:ext>
-          </a:extLst>
-        </p:spPr>
-      </p:pic>
+            <a:r>
+              <a:rPr lang="en-US" dirty="0" smtClean="0"/>
+              <a:t>	Determine capacitor size, (</a:t>
+            </a:r>
+            <a:r>
+              <a:rPr lang="en-US" i="1" dirty="0" smtClean="0"/>
+              <a:t>P</a:t>
+            </a:r>
+            <a:r>
+              <a:rPr lang="en-US" i="1" baseline="-25000" dirty="0" smtClean="0"/>
+              <a:t>CAP</a:t>
+            </a:r>
+            <a:r>
+              <a:rPr lang="en-US" dirty="0" smtClean="0"/>
+              <a:t>) – adds together all phases</a:t>
+            </a:r>
+          </a:p>
+          <a:p>
+            <a:pPr marL="400050" lvl="1" indent="0">
+              <a:buNone/>
+            </a:pPr>
+            <a:r>
+              <a:rPr lang="en-US" dirty="0"/>
+              <a:t>	</a:t>
+            </a:r>
+            <a:r>
+              <a:rPr lang="en-US" dirty="0" smtClean="0"/>
+              <a:t>Sort capacitors by size, smallest to largest, closest to farthest</a:t>
+            </a:r>
+          </a:p>
+          <a:p>
+            <a:pPr marL="400050" lvl="1" indent="0">
+              <a:buNone/>
+            </a:pPr>
+            <a:r>
+              <a:rPr lang="en-US" dirty="0"/>
+              <a:t>	</a:t>
+            </a:r>
+            <a:r>
+              <a:rPr lang="en-US" dirty="0" smtClean="0"/>
+              <a:t>Switching thresholds (</a:t>
+            </a:r>
+            <a:r>
+              <a:rPr lang="en-US" i="1" dirty="0" err="1" smtClean="0"/>
+              <a:t>Q</a:t>
+            </a:r>
+            <a:r>
+              <a:rPr lang="en-US" i="1" baseline="-25000" dirty="0" err="1" smtClean="0"/>
+              <a:t>cap_off</a:t>
+            </a:r>
+            <a:r>
+              <a:rPr lang="en-US" dirty="0" smtClean="0"/>
+              <a:t>, </a:t>
+            </a:r>
+            <a:r>
+              <a:rPr lang="en-US" i="1" dirty="0" err="1" smtClean="0"/>
+              <a:t>Q</a:t>
+            </a:r>
+            <a:r>
+              <a:rPr lang="en-US" i="1" baseline="-25000" dirty="0" err="1" smtClean="0"/>
+              <a:t>cap_on</a:t>
+            </a:r>
+            <a:r>
+              <a:rPr lang="en-US" dirty="0" smtClean="0"/>
+              <a:t>) are determined by </a:t>
+            </a:r>
+            <a:r>
+              <a:rPr lang="en-US" i="1" dirty="0" err="1" smtClean="0"/>
+              <a:t>d</a:t>
+            </a:r>
+            <a:r>
+              <a:rPr lang="en-US" i="1" baseline="-25000" dirty="0" err="1" smtClean="0"/>
+              <a:t>min</a:t>
+            </a:r>
+            <a:r>
+              <a:rPr lang="en-US" dirty="0" smtClean="0"/>
+              <a:t> and </a:t>
+            </a:r>
+            <a:r>
+              <a:rPr lang="en-US" i="1" dirty="0" err="1" smtClean="0"/>
+              <a:t>d</a:t>
+            </a:r>
+            <a:r>
+              <a:rPr lang="en-US" i="1" baseline="-25000" dirty="0" err="1" smtClean="0"/>
+              <a:t>max</a:t>
+            </a:r>
+            <a:r>
+              <a:rPr lang="en-US" dirty="0"/>
+              <a:t> </a:t>
+            </a:r>
+            <a:r>
+              <a:rPr lang="en-US" dirty="0" smtClean="0"/>
+              <a:t>	</a:t>
+            </a:r>
+            <a:r>
+              <a:rPr lang="en-US" dirty="0" smtClean="0"/>
+              <a:t>ratio constants </a:t>
+            </a:r>
+            <a:r>
+              <a:rPr lang="en-US" dirty="0" smtClean="0"/>
+              <a:t>– create hysteresis-like condition</a:t>
+            </a:r>
+          </a:p>
+          <a:p>
+            <a:pPr marL="400050" lvl="1" indent="0">
+              <a:buNone/>
+            </a:pPr>
+            <a:r>
+              <a:rPr lang="en-US" dirty="0"/>
+              <a:t>	</a:t>
+            </a:r>
+            <a:endParaRPr lang="en-US" dirty="0" smtClean="0"/>
+          </a:p>
+        </p:txBody>
+      </p:sp>
       <p:sp>
         <p:nvSpPr>
           <p:cNvPr id="4" name="Slide Number Placeholder 3"/>
@@ -5546,14 +6470,268 @@
               <a:pPr/>
               <a:t>19</a:t>
             </a:fld>
-            <a:endParaRPr lang="en-US"/>
-          </a:p>
-        </p:txBody>
-      </p:sp>
+            <a:endParaRPr lang="en-US" dirty="0"/>
+          </a:p>
+        </p:txBody>
+      </p:sp>
+      <p:graphicFrame>
+        <p:nvGraphicFramePr>
+          <p:cNvPr id="5" name="Object 4"/>
+          <p:cNvGraphicFramePr>
+            <a:graphicFrameLocks noChangeAspect="1"/>
+          </p:cNvGraphicFramePr>
+          <p:nvPr>
+            <p:extLst>
+              <p:ext uri="{D42A27DB-BD31-4B8C-83A1-F6EECF244321}">
+                <p14:modId xmlns:p14="http://schemas.microsoft.com/office/powerpoint/2010/main" val="1310123686"/>
+              </p:ext>
+            </p:extLst>
+          </p:nvPr>
+        </p:nvGraphicFramePr>
+        <p:xfrm>
+          <a:off x="1069848" y="2426970"/>
+          <a:ext cx="1743894" cy="468630"/>
+        </p:xfrm>
+        <a:graphic>
+          <a:graphicData uri="http://schemas.openxmlformats.org/presentationml/2006/ole">
+            <mc:AlternateContent xmlns:mc="http://schemas.openxmlformats.org/markup-compatibility/2006">
+              <mc:Choice xmlns:v="urn:schemas-microsoft-com:vml" Requires="v">
+                <p:oleObj spid="_x0000_s6169" name="Equation" r:id="rId3" imgW="850680" imgH="228600" progId="Equation.3">
+                  <p:embed/>
+                </p:oleObj>
+              </mc:Choice>
+              <mc:Fallback>
+                <p:oleObj name="Equation" r:id="rId3" imgW="850680" imgH="228600" progId="Equation.3">
+                  <p:embed/>
+                  <p:pic>
+                    <p:nvPicPr>
+                      <p:cNvPr id="0" name=""/>
+                      <p:cNvPicPr/>
+                      <p:nvPr/>
+                    </p:nvPicPr>
+                    <p:blipFill>
+                      <a:blip r:embed="rId4"/>
+                      <a:stretch>
+                        <a:fillRect/>
+                      </a:stretch>
+                    </p:blipFill>
+                    <p:spPr>
+                      <a:xfrm>
+                        <a:off x="1069848" y="2426970"/>
+                        <a:ext cx="1743894" cy="468630"/>
+                      </a:xfrm>
+                      <a:prstGeom prst="rect">
+                        <a:avLst/>
+                      </a:prstGeom>
+                    </p:spPr>
+                  </p:pic>
+                </p:oleObj>
+              </mc:Fallback>
+            </mc:AlternateContent>
+          </a:graphicData>
+        </a:graphic>
+      </p:graphicFrame>
+      <p:graphicFrame>
+        <p:nvGraphicFramePr>
+          <p:cNvPr id="7" name="Object 6"/>
+          <p:cNvGraphicFramePr>
+            <a:graphicFrameLocks noChangeAspect="1"/>
+          </p:cNvGraphicFramePr>
+          <p:nvPr>
+            <p:extLst>
+              <p:ext uri="{D42A27DB-BD31-4B8C-83A1-F6EECF244321}">
+                <p14:modId xmlns:p14="http://schemas.microsoft.com/office/powerpoint/2010/main" val="2887654650"/>
+              </p:ext>
+            </p:extLst>
+          </p:nvPr>
+        </p:nvGraphicFramePr>
+        <p:xfrm>
+          <a:off x="1463040" y="5489575"/>
+          <a:ext cx="2446338" cy="493712"/>
+        </p:xfrm>
+        <a:graphic>
+          <a:graphicData uri="http://schemas.openxmlformats.org/presentationml/2006/ole">
+            <mc:AlternateContent xmlns:mc="http://schemas.openxmlformats.org/markup-compatibility/2006">
+              <mc:Choice xmlns:v="urn:schemas-microsoft-com:vml" Requires="v">
+                <p:oleObj spid="_x0000_s6170" name="Equation" r:id="rId5" imgW="1193760" imgH="241200" progId="Equation.3">
+                  <p:embed/>
+                </p:oleObj>
+              </mc:Choice>
+              <mc:Fallback>
+                <p:oleObj name="Equation" r:id="rId5" imgW="1193760" imgH="241200" progId="Equation.3">
+                  <p:embed/>
+                  <p:pic>
+                    <p:nvPicPr>
+                      <p:cNvPr id="0" name=""/>
+                      <p:cNvPicPr/>
+                      <p:nvPr/>
+                    </p:nvPicPr>
+                    <p:blipFill>
+                      <a:blip r:embed="rId6"/>
+                      <a:stretch>
+                        <a:fillRect/>
+                      </a:stretch>
+                    </p:blipFill>
+                    <p:spPr>
+                      <a:xfrm>
+                        <a:off x="1463040" y="5489575"/>
+                        <a:ext cx="2446338" cy="493712"/>
+                      </a:xfrm>
+                      <a:prstGeom prst="rect">
+                        <a:avLst/>
+                      </a:prstGeom>
+                    </p:spPr>
+                  </p:pic>
+                </p:oleObj>
+              </mc:Fallback>
+            </mc:AlternateContent>
+          </a:graphicData>
+        </a:graphic>
+      </p:graphicFrame>
+      <p:graphicFrame>
+        <p:nvGraphicFramePr>
+          <p:cNvPr id="8" name="Object 7"/>
+          <p:cNvGraphicFramePr>
+            <a:graphicFrameLocks noChangeAspect="1"/>
+          </p:cNvGraphicFramePr>
+          <p:nvPr>
+            <p:extLst>
+              <p:ext uri="{D42A27DB-BD31-4B8C-83A1-F6EECF244321}">
+                <p14:modId xmlns:p14="http://schemas.microsoft.com/office/powerpoint/2010/main" val="1305327853"/>
+              </p:ext>
+            </p:extLst>
+          </p:nvPr>
+        </p:nvGraphicFramePr>
+        <p:xfrm>
+          <a:off x="1463040" y="5983287"/>
+          <a:ext cx="2420938" cy="493713"/>
+        </p:xfrm>
+        <a:graphic>
+          <a:graphicData uri="http://schemas.openxmlformats.org/presentationml/2006/ole">
+            <mc:AlternateContent xmlns:mc="http://schemas.openxmlformats.org/markup-compatibility/2006">
+              <mc:Choice xmlns:v="urn:schemas-microsoft-com:vml" Requires="v">
+                <p:oleObj spid="_x0000_s6171" name="Equation" r:id="rId7" imgW="1180800" imgH="241200" progId="Equation.3">
+                  <p:embed/>
+                </p:oleObj>
+              </mc:Choice>
+              <mc:Fallback>
+                <p:oleObj name="Equation" r:id="rId7" imgW="1180800" imgH="241200" progId="Equation.3">
+                  <p:embed/>
+                  <p:pic>
+                    <p:nvPicPr>
+                      <p:cNvPr id="0" name="Object 6"/>
+                      <p:cNvPicPr>
+                        <a:picLocks noChangeAspect="1" noChangeArrowheads="1"/>
+                      </p:cNvPicPr>
+                      <p:nvPr/>
+                    </p:nvPicPr>
+                    <p:blipFill>
+                      <a:blip r:embed="rId8"/>
+                      <a:srcRect/>
+                      <a:stretch>
+                        <a:fillRect/>
+                      </a:stretch>
+                    </p:blipFill>
+                    <p:spPr bwMode="auto">
+                      <a:xfrm>
+                        <a:off x="1463040" y="5983287"/>
+                        <a:ext cx="2420938" cy="493713"/>
+                      </a:xfrm>
+                      <a:prstGeom prst="rect">
+                        <a:avLst/>
+                      </a:prstGeom>
+                      <a:noFill/>
+                      <a:ln>
+                        <a:noFill/>
+                      </a:ln>
+                      <a:extLst>
+                        <a:ext uri="{909E8E84-426E-40DD-AFC4-6F175D3DCCD1}">
+                          <a14:hiddenFill xmlns:a14="http://schemas.microsoft.com/office/drawing/2010/main">
+                            <a:solidFill>
+                              <a:srgbClr val="FFFFFF"/>
+                            </a:solidFill>
+                          </a14:hiddenFill>
+                        </a:ext>
+                        <a:ext uri="{91240B29-F687-4F45-9708-019B960494DF}">
+                          <a14:hiddenLine xmlns:a14="http://schemas.microsoft.com/office/drawing/2010/main" w="9525">
+                            <a:solidFill>
+                              <a:srgbClr val="000000"/>
+                            </a:solidFill>
+                            <a:miter lim="800000"/>
+                            <a:headEnd/>
+                            <a:tailEnd/>
+                          </a14:hiddenLine>
+                        </a:ext>
+                      </a:extLst>
+                    </p:spPr>
+                  </p:pic>
+                </p:oleObj>
+              </mc:Fallback>
+            </mc:AlternateContent>
+          </a:graphicData>
+        </a:graphic>
+      </p:graphicFrame>
+      <p:graphicFrame>
+        <p:nvGraphicFramePr>
+          <p:cNvPr id="6" name="Object 5"/>
+          <p:cNvGraphicFramePr>
+            <a:graphicFrameLocks noChangeAspect="1"/>
+          </p:cNvGraphicFramePr>
+          <p:nvPr>
+            <p:extLst>
+              <p:ext uri="{D42A27DB-BD31-4B8C-83A1-F6EECF244321}">
+                <p14:modId xmlns:p14="http://schemas.microsoft.com/office/powerpoint/2010/main" val="4221119922"/>
+              </p:ext>
+            </p:extLst>
+          </p:nvPr>
+        </p:nvGraphicFramePr>
+        <p:xfrm>
+          <a:off x="1463040" y="5046618"/>
+          <a:ext cx="2759382" cy="468630"/>
+        </p:xfrm>
+        <a:graphic>
+          <a:graphicData uri="http://schemas.openxmlformats.org/presentationml/2006/ole">
+            <mc:AlternateContent xmlns:mc="http://schemas.openxmlformats.org/markup-compatibility/2006">
+              <mc:Choice xmlns:v="urn:schemas-microsoft-com:vml" Requires="v">
+                <p:oleObj spid="_x0000_s6172" name="Equation" r:id="rId9" imgW="1346040" imgH="228600" progId="Equation.3">
+                  <p:embed/>
+                </p:oleObj>
+              </mc:Choice>
+              <mc:Fallback>
+                <p:oleObj name="Equation" r:id="rId9" imgW="1346040" imgH="228600" progId="Equation.3">
+                  <p:embed/>
+                  <p:pic>
+                    <p:nvPicPr>
+                      <p:cNvPr id="0" name=""/>
+                      <p:cNvPicPr/>
+                      <p:nvPr/>
+                    </p:nvPicPr>
+                    <p:blipFill>
+                      <a:blip r:embed="rId10"/>
+                      <a:stretch>
+                        <a:fillRect/>
+                      </a:stretch>
+                    </p:blipFill>
+                    <p:spPr>
+                      <a:xfrm>
+                        <a:off x="1463040" y="5046618"/>
+                        <a:ext cx="2759382" cy="468630"/>
+                      </a:xfrm>
+                      <a:prstGeom prst="rect">
+                        <a:avLst/>
+                      </a:prstGeom>
+                    </p:spPr>
+                  </p:pic>
+                </p:oleObj>
+              </mc:Fallback>
+            </mc:AlternateContent>
+          </a:graphicData>
+        </a:graphic>
+      </p:graphicFrame>
     </p:spTree>
     <p:extLst>
       <p:ext uri="{BB962C8B-B14F-4D97-AF65-F5344CB8AC3E}">
-        <p14:creationId xmlns:p14="http://schemas.microsoft.com/office/powerpoint/2010/main" val="3460944002"/>
+        <p14:creationId xmlns:p14="http://schemas.microsoft.com/office/powerpoint/2010/main" val="3951161820"/>
       </p:ext>
     </p:extLst>
   </p:cSld>
@@ -5747,6 +6925,1017 @@
           <a:p>
             <a:r>
               <a:rPr lang="en-US" dirty="0" smtClean="0"/>
+              <a:t>VVO-Capacitors – Reactive Power Optimization</a:t>
+            </a:r>
+            <a:endParaRPr lang="en-US" dirty="0"/>
+          </a:p>
+        </p:txBody>
+      </p:sp>
+      <p:sp>
+        <p:nvSpPr>
+          <p:cNvPr id="3" name="Content Placeholder 2"/>
+          <p:cNvSpPr>
+            <a:spLocks noGrp="1"/>
+          </p:cNvSpPr>
+          <p:nvPr>
+            <p:ph idx="1"/>
+          </p:nvPr>
+        </p:nvSpPr>
+        <p:spPr/>
+        <p:txBody>
+          <a:bodyPr>
+            <a:normAutofit/>
+          </a:bodyPr>
+          <a:lstStyle/>
+          <a:p>
+            <a:pPr marL="514350" indent="-514350">
+              <a:buFont typeface="+mj-lt"/>
+              <a:buAutoNum type="arabicPeriod" startAt="3"/>
+            </a:pPr>
+            <a:r>
+              <a:rPr lang="en-US" dirty="0" smtClean="0"/>
+              <a:t>If outside range, proceed through capacitors – only change one per operation cycle – dependent on state and size:</a:t>
+            </a:r>
+          </a:p>
+          <a:p>
+            <a:pPr marL="739775" lvl="1" indent="-339725"/>
+            <a:endParaRPr lang="en-US" dirty="0" smtClean="0"/>
+          </a:p>
+          <a:p>
+            <a:pPr marL="739775" lvl="1" indent="-339725"/>
+            <a:r>
+              <a:rPr lang="en-US" i="1" dirty="0" smtClean="0"/>
+              <a:t>ON</a:t>
+            </a:r>
+            <a:r>
+              <a:rPr lang="en-US" dirty="0" smtClean="0"/>
+              <a:t> and</a:t>
+            </a:r>
+            <a:endParaRPr lang="en-US" i="1" baseline="-25000" dirty="0" smtClean="0"/>
+          </a:p>
+          <a:p>
+            <a:pPr marL="400050" lvl="1" indent="0">
+              <a:buNone/>
+            </a:pPr>
+            <a:r>
+              <a:rPr lang="en-US" dirty="0" smtClean="0"/>
+              <a:t>	Capacitor </a:t>
+            </a:r>
+            <a:r>
+              <a:rPr lang="en-US" i="1" dirty="0" smtClean="0"/>
+              <a:t>ON</a:t>
+            </a:r>
+            <a:r>
+              <a:rPr lang="en-US" dirty="0" smtClean="0"/>
+              <a:t> and </a:t>
+            </a:r>
+            <a:r>
+              <a:rPr lang="en-US" i="1" dirty="0" smtClean="0"/>
+              <a:t>reactive power</a:t>
+            </a:r>
+            <a:r>
+              <a:rPr lang="en-US" dirty="0" smtClean="0"/>
+              <a:t> &lt; </a:t>
+            </a:r>
+            <a:r>
+              <a:rPr lang="en-US" i="1" dirty="0" err="1" smtClean="0"/>
+              <a:t>Q</a:t>
+            </a:r>
+            <a:r>
+              <a:rPr lang="en-US" i="1" baseline="-25000" dirty="0" err="1" smtClean="0"/>
+              <a:t>cap_off</a:t>
+            </a:r>
+            <a:r>
+              <a:rPr lang="en-US" dirty="0" smtClean="0"/>
+              <a:t>: switch capacitor to </a:t>
+            </a:r>
+            <a:r>
+              <a:rPr lang="en-US" i="1" dirty="0" smtClean="0"/>
+              <a:t>OFF</a:t>
+            </a:r>
+          </a:p>
+          <a:p>
+            <a:pPr marL="400050" lvl="1" indent="0">
+              <a:buNone/>
+            </a:pPr>
+            <a:endParaRPr lang="en-US" dirty="0" smtClean="0"/>
+          </a:p>
+          <a:p>
+            <a:pPr marL="739775" lvl="1" indent="-339725"/>
+            <a:r>
+              <a:rPr lang="en-US" i="1" dirty="0" smtClean="0"/>
+              <a:t>OFF</a:t>
+            </a:r>
+            <a:r>
+              <a:rPr lang="en-US" dirty="0" smtClean="0"/>
+              <a:t> and</a:t>
+            </a:r>
+            <a:endParaRPr lang="en-US" i="1" baseline="-25000" dirty="0" smtClean="0"/>
+          </a:p>
+          <a:p>
+            <a:pPr marL="800100" lvl="2" indent="0">
+              <a:buNone/>
+            </a:pPr>
+            <a:r>
+              <a:rPr lang="en-US" dirty="0"/>
+              <a:t>	</a:t>
+            </a:r>
+            <a:r>
+              <a:rPr lang="en-US" sz="2000" dirty="0" smtClean="0"/>
+              <a:t>Capacitor </a:t>
+            </a:r>
+            <a:r>
+              <a:rPr lang="en-US" sz="2000" i="1" dirty="0" smtClean="0"/>
+              <a:t>OFF</a:t>
+            </a:r>
+            <a:r>
+              <a:rPr lang="en-US" sz="2000" dirty="0" smtClean="0"/>
+              <a:t> and </a:t>
+            </a:r>
+            <a:r>
+              <a:rPr lang="en-US" sz="2000" i="1" dirty="0" smtClean="0"/>
+              <a:t>reactive power</a:t>
+            </a:r>
+            <a:r>
+              <a:rPr lang="en-US" sz="2000" dirty="0" smtClean="0"/>
+              <a:t> &gt; </a:t>
+            </a:r>
+            <a:r>
+              <a:rPr lang="en-US" sz="2000" i="1" dirty="0" err="1" smtClean="0"/>
+              <a:t>Q</a:t>
+            </a:r>
+            <a:r>
+              <a:rPr lang="en-US" sz="2000" i="1" baseline="-25000" dirty="0" err="1" smtClean="0"/>
+              <a:t>cap_on</a:t>
+            </a:r>
+            <a:r>
+              <a:rPr lang="en-US" sz="2000" dirty="0" smtClean="0"/>
+              <a:t>: switch capacitor to </a:t>
+            </a:r>
+            <a:r>
+              <a:rPr lang="en-US" sz="2000" i="1" dirty="0" smtClean="0"/>
+              <a:t>ON</a:t>
+            </a:r>
+          </a:p>
+          <a:p>
+            <a:pPr marL="800100" lvl="2" indent="0">
+              <a:buNone/>
+            </a:pPr>
+            <a:endParaRPr lang="en-US" sz="2000" dirty="0" smtClean="0"/>
+          </a:p>
+          <a:p>
+            <a:pPr marL="739775" lvl="1" indent="-339725"/>
+            <a:r>
+              <a:rPr lang="en-US" dirty="0" smtClean="0"/>
+              <a:t>Neither met</a:t>
+            </a:r>
+          </a:p>
+          <a:p>
+            <a:pPr marL="800100" lvl="2" indent="0">
+              <a:buNone/>
+            </a:pPr>
+            <a:r>
+              <a:rPr lang="en-US" dirty="0"/>
+              <a:t>	</a:t>
+            </a:r>
+            <a:r>
+              <a:rPr lang="en-US" sz="2000" dirty="0" smtClean="0"/>
+              <a:t>Proceed to next largest capacitor and continue check</a:t>
+            </a:r>
+          </a:p>
+        </p:txBody>
+      </p:sp>
+      <p:sp>
+        <p:nvSpPr>
+          <p:cNvPr id="4" name="Slide Number Placeholder 3"/>
+          <p:cNvSpPr>
+            <a:spLocks noGrp="1"/>
+          </p:cNvSpPr>
+          <p:nvPr>
+            <p:ph type="sldNum" sz="quarter" idx="12"/>
+          </p:nvPr>
+        </p:nvSpPr>
+        <p:spPr/>
+        <p:txBody>
+          <a:bodyPr/>
+          <a:lstStyle/>
+          <a:p>
+            <a:fld id="{B6F15528-21DE-4FAA-801E-634DDDAF4B2B}" type="slidenum">
+              <a:rPr lang="en-US" smtClean="0"/>
+              <a:pPr/>
+              <a:t>20</a:t>
+            </a:fld>
+            <a:endParaRPr lang="en-US"/>
+          </a:p>
+        </p:txBody>
+      </p:sp>
+      <p:graphicFrame>
+        <p:nvGraphicFramePr>
+          <p:cNvPr id="5" name="Object 4"/>
+          <p:cNvGraphicFramePr>
+            <a:graphicFrameLocks noChangeAspect="1"/>
+          </p:cNvGraphicFramePr>
+          <p:nvPr>
+            <p:extLst>
+              <p:ext uri="{D42A27DB-BD31-4B8C-83A1-F6EECF244321}">
+                <p14:modId xmlns:p14="http://schemas.microsoft.com/office/powerpoint/2010/main" val="3880563166"/>
+              </p:ext>
+            </p:extLst>
+          </p:nvPr>
+        </p:nvGraphicFramePr>
+        <p:xfrm>
+          <a:off x="2107473" y="2788887"/>
+          <a:ext cx="1441678" cy="402804"/>
+        </p:xfrm>
+        <a:graphic>
+          <a:graphicData uri="http://schemas.openxmlformats.org/presentationml/2006/ole">
+            <mc:AlternateContent xmlns:mc="http://schemas.openxmlformats.org/markup-compatibility/2006">
+              <mc:Choice xmlns:v="urn:schemas-microsoft-com:vml" Requires="v">
+                <p:oleObj spid="_x0000_s7180" name="Equation" r:id="rId3" imgW="863280" imgH="241200" progId="Equation.3">
+                  <p:embed/>
+                </p:oleObj>
+              </mc:Choice>
+              <mc:Fallback>
+                <p:oleObj name="Equation" r:id="rId3" imgW="863280" imgH="241200" progId="Equation.3">
+                  <p:embed/>
+                  <p:pic>
+                    <p:nvPicPr>
+                      <p:cNvPr id="0" name=""/>
+                      <p:cNvPicPr/>
+                      <p:nvPr/>
+                    </p:nvPicPr>
+                    <p:blipFill>
+                      <a:blip r:embed="rId4"/>
+                      <a:stretch>
+                        <a:fillRect/>
+                      </a:stretch>
+                    </p:blipFill>
+                    <p:spPr>
+                      <a:xfrm>
+                        <a:off x="2107473" y="2788887"/>
+                        <a:ext cx="1441678" cy="402804"/>
+                      </a:xfrm>
+                      <a:prstGeom prst="rect">
+                        <a:avLst/>
+                      </a:prstGeom>
+                    </p:spPr>
+                  </p:pic>
+                </p:oleObj>
+              </mc:Fallback>
+            </mc:AlternateContent>
+          </a:graphicData>
+        </a:graphic>
+      </p:graphicFrame>
+      <p:graphicFrame>
+        <p:nvGraphicFramePr>
+          <p:cNvPr id="6" name="Object 5"/>
+          <p:cNvGraphicFramePr>
+            <a:graphicFrameLocks noChangeAspect="1"/>
+          </p:cNvGraphicFramePr>
+          <p:nvPr>
+            <p:extLst>
+              <p:ext uri="{D42A27DB-BD31-4B8C-83A1-F6EECF244321}">
+                <p14:modId xmlns:p14="http://schemas.microsoft.com/office/powerpoint/2010/main" val="1900855747"/>
+              </p:ext>
+            </p:extLst>
+          </p:nvPr>
+        </p:nvGraphicFramePr>
+        <p:xfrm>
+          <a:off x="2258006" y="3886200"/>
+          <a:ext cx="1399594" cy="402804"/>
+        </p:xfrm>
+        <a:graphic>
+          <a:graphicData uri="http://schemas.openxmlformats.org/presentationml/2006/ole">
+            <mc:AlternateContent xmlns:mc="http://schemas.openxmlformats.org/markup-compatibility/2006">
+              <mc:Choice xmlns:v="urn:schemas-microsoft-com:vml" Requires="v">
+                <p:oleObj spid="_x0000_s7181" name="Equation" r:id="rId5" imgW="838080" imgH="241200" progId="Equation.3">
+                  <p:embed/>
+                </p:oleObj>
+              </mc:Choice>
+              <mc:Fallback>
+                <p:oleObj name="Equation" r:id="rId5" imgW="838080" imgH="241200" progId="Equation.3">
+                  <p:embed/>
+                  <p:pic>
+                    <p:nvPicPr>
+                      <p:cNvPr id="0" name=""/>
+                      <p:cNvPicPr/>
+                      <p:nvPr/>
+                    </p:nvPicPr>
+                    <p:blipFill>
+                      <a:blip r:embed="rId6"/>
+                      <a:stretch>
+                        <a:fillRect/>
+                      </a:stretch>
+                    </p:blipFill>
+                    <p:spPr>
+                      <a:xfrm>
+                        <a:off x="2258006" y="3886200"/>
+                        <a:ext cx="1399594" cy="402804"/>
+                      </a:xfrm>
+                      <a:prstGeom prst="rect">
+                        <a:avLst/>
+                      </a:prstGeom>
+                    </p:spPr>
+                  </p:pic>
+                </p:oleObj>
+              </mc:Fallback>
+            </mc:AlternateContent>
+          </a:graphicData>
+        </a:graphic>
+      </p:graphicFrame>
+    </p:spTree>
+    <p:extLst>
+      <p:ext uri="{BB962C8B-B14F-4D97-AF65-F5344CB8AC3E}">
+        <p14:creationId xmlns:p14="http://schemas.microsoft.com/office/powerpoint/2010/main" val="393414313"/>
+      </p:ext>
+    </p:extLst>
+  </p:cSld>
+  <p:clrMapOvr>
+    <a:masterClrMapping/>
+  </p:clrMapOvr>
+  <p:timing>
+    <p:tnLst>
+      <p:par>
+        <p:cTn id="1" dur="indefinite" restart="never" nodeType="tmRoot"/>
+      </p:par>
+    </p:tnLst>
+  </p:timing>
+</p:sld>
+</file>
+
+<file path=ppt/slides/slide21.xml><?xml version="1.0" encoding="utf-8"?>
+<p:sld xmlns:a="http://schemas.openxmlformats.org/drawingml/2006/main" xmlns:r="http://schemas.openxmlformats.org/officeDocument/2006/relationships" xmlns:p="http://schemas.openxmlformats.org/presentationml/2006/main">
+  <p:cSld>
+    <p:spTree>
+      <p:nvGrpSpPr>
+        <p:cNvPr id="1" name=""/>
+        <p:cNvGrpSpPr/>
+        <p:nvPr/>
+      </p:nvGrpSpPr>
+      <p:grpSpPr>
+        <a:xfrm>
+          <a:off x="0" y="0"/>
+          <a:ext cx="0" cy="0"/>
+          <a:chOff x="0" y="0"/>
+          <a:chExt cx="0" cy="0"/>
+        </a:xfrm>
+      </p:grpSpPr>
+      <p:sp>
+        <p:nvSpPr>
+          <p:cNvPr id="2" name="Title 1"/>
+          <p:cNvSpPr>
+            <a:spLocks noGrp="1"/>
+          </p:cNvSpPr>
+          <p:nvPr>
+            <p:ph type="title"/>
+          </p:nvPr>
+        </p:nvSpPr>
+        <p:spPr/>
+        <p:txBody>
+          <a:bodyPr/>
+          <a:lstStyle/>
+          <a:p>
+            <a:r>
+              <a:rPr lang="en-US" dirty="0" smtClean="0"/>
+              <a:t>Volt-VAR Optimization – Example</a:t>
+            </a:r>
+            <a:endParaRPr lang="en-US" dirty="0"/>
+          </a:p>
+        </p:txBody>
+      </p:sp>
+      <p:sp>
+        <p:nvSpPr>
+          <p:cNvPr id="3" name="Content Placeholder 2"/>
+          <p:cNvSpPr>
+            <a:spLocks noGrp="1"/>
+          </p:cNvSpPr>
+          <p:nvPr>
+            <p:ph idx="1"/>
+          </p:nvPr>
+        </p:nvSpPr>
+        <p:spPr>
+          <a:xfrm>
+            <a:off x="457199" y="1600200"/>
+            <a:ext cx="4541191" cy="4525963"/>
+          </a:xfrm>
+        </p:spPr>
+        <p:txBody>
+          <a:bodyPr>
+            <a:normAutofit fontScale="92500"/>
+          </a:bodyPr>
+          <a:lstStyle/>
+          <a:p>
+            <a:r>
+              <a:rPr lang="en-US" sz="3000" dirty="0" smtClean="0"/>
+              <a:t>Simple “4-node” system</a:t>
+            </a:r>
+          </a:p>
+          <a:p>
+            <a:pPr lvl="1"/>
+            <a:r>
+              <a:rPr lang="en-US" sz="2400" dirty="0" smtClean="0"/>
+              <a:t>Nodes represent measurements</a:t>
+            </a:r>
+          </a:p>
+          <a:p>
+            <a:pPr lvl="1"/>
+            <a:r>
+              <a:rPr lang="en-US" sz="2400" dirty="0" smtClean="0"/>
+              <a:t>Two Regulators</a:t>
+            </a:r>
+          </a:p>
+          <a:p>
+            <a:pPr lvl="1"/>
+            <a:r>
+              <a:rPr lang="en-US" sz="2400" dirty="0" smtClean="0"/>
+              <a:t>Two Capacitors</a:t>
+            </a:r>
+          </a:p>
+          <a:p>
+            <a:pPr lvl="1"/>
+            <a:r>
+              <a:rPr lang="en-US" sz="2400" dirty="0" smtClean="0"/>
+              <a:t>Assume regulators have 100 V tap positions</a:t>
+            </a:r>
+          </a:p>
+          <a:p>
+            <a:r>
+              <a:rPr lang="en-US" sz="3000" dirty="0" smtClean="0"/>
+              <a:t>4700 V end of line desired</a:t>
+            </a:r>
+          </a:p>
+          <a:p>
+            <a:r>
+              <a:rPr lang="en-US" sz="3000" dirty="0" smtClean="0"/>
+              <a:t>0.99 </a:t>
+            </a:r>
+            <a:r>
+              <a:rPr lang="en-US" sz="3000" dirty="0" err="1" smtClean="0"/>
+              <a:t>pf</a:t>
+            </a:r>
+            <a:r>
+              <a:rPr lang="en-US" sz="3000" dirty="0" smtClean="0"/>
+              <a:t> desired</a:t>
+            </a:r>
+          </a:p>
+          <a:p>
+            <a:r>
+              <a:rPr lang="en-US" sz="3000" dirty="0" smtClean="0"/>
+              <a:t>Minimize reactive flow through </a:t>
+            </a:r>
+            <a:r>
+              <a:rPr lang="en-US" sz="3000" dirty="0" err="1" smtClean="0"/>
+              <a:t>Xfmr</a:t>
+            </a:r>
+            <a:endParaRPr lang="en-US" sz="3000" dirty="0" smtClean="0"/>
+          </a:p>
+        </p:txBody>
+      </p:sp>
+      <p:pic>
+        <p:nvPicPr>
+          <p:cNvPr id="13314" name="Picture 2" descr="C:\Users\d3x593\Desktop\Volt-VAR-Example\Base_Volt_VAR.jpg"/>
+          <p:cNvPicPr>
+            <a:picLocks noChangeAspect="1" noChangeArrowheads="1"/>
+          </p:cNvPicPr>
+          <p:nvPr/>
+        </p:nvPicPr>
+        <p:blipFill>
+          <a:blip r:embed="rId2">
+            <a:extLst>
+              <a:ext uri="{28A0092B-C50C-407E-A947-70E740481C1C}">
+                <a14:useLocalDpi xmlns:a14="http://schemas.microsoft.com/office/drawing/2010/main" val="0"/>
+              </a:ext>
+            </a:extLst>
+          </a:blip>
+          <a:srcRect/>
+          <a:stretch>
+            <a:fillRect/>
+          </a:stretch>
+        </p:blipFill>
+        <p:spPr bwMode="auto">
+          <a:xfrm>
+            <a:off x="5001768" y="1647825"/>
+            <a:ext cx="4068064" cy="3456432"/>
+          </a:xfrm>
+          <a:prstGeom prst="rect">
+            <a:avLst/>
+          </a:prstGeom>
+          <a:noFill/>
+          <a:extLst>
+            <a:ext uri="{909E8E84-426E-40DD-AFC4-6F175D3DCCD1}">
+              <a14:hiddenFill xmlns:a14="http://schemas.microsoft.com/office/drawing/2010/main">
+                <a:solidFill>
+                  <a:srgbClr val="FFFFFF"/>
+                </a:solidFill>
+              </a14:hiddenFill>
+            </a:ext>
+          </a:extLst>
+        </p:spPr>
+      </p:pic>
+      <p:sp>
+        <p:nvSpPr>
+          <p:cNvPr id="4" name="Slide Number Placeholder 3"/>
+          <p:cNvSpPr>
+            <a:spLocks noGrp="1"/>
+          </p:cNvSpPr>
+          <p:nvPr>
+            <p:ph type="sldNum" sz="quarter" idx="12"/>
+          </p:nvPr>
+        </p:nvSpPr>
+        <p:spPr/>
+        <p:txBody>
+          <a:bodyPr/>
+          <a:lstStyle/>
+          <a:p>
+            <a:fld id="{B6F15528-21DE-4FAA-801E-634DDDAF4B2B}" type="slidenum">
+              <a:rPr lang="en-US" smtClean="0"/>
+              <a:pPr/>
+              <a:t>21</a:t>
+            </a:fld>
+            <a:endParaRPr lang="en-US"/>
+          </a:p>
+        </p:txBody>
+      </p:sp>
+    </p:spTree>
+    <p:extLst>
+      <p:ext uri="{BB962C8B-B14F-4D97-AF65-F5344CB8AC3E}">
+        <p14:creationId xmlns:p14="http://schemas.microsoft.com/office/powerpoint/2010/main" val="1951542715"/>
+      </p:ext>
+    </p:extLst>
+  </p:cSld>
+  <p:clrMapOvr>
+    <a:masterClrMapping/>
+  </p:clrMapOvr>
+  <p:timing>
+    <p:tnLst>
+      <p:par>
+        <p:cTn id="1" dur="indefinite" restart="never" nodeType="tmRoot"/>
+      </p:par>
+    </p:tnLst>
+  </p:timing>
+</p:sld>
+</file>
+
+<file path=ppt/slides/slide22.xml><?xml version="1.0" encoding="utf-8"?>
+<p:sld xmlns:a="http://schemas.openxmlformats.org/drawingml/2006/main" xmlns:r="http://schemas.openxmlformats.org/officeDocument/2006/relationships" xmlns:p="http://schemas.openxmlformats.org/presentationml/2006/main">
+  <p:cSld>
+    <p:spTree>
+      <p:nvGrpSpPr>
+        <p:cNvPr id="1" name=""/>
+        <p:cNvGrpSpPr/>
+        <p:nvPr/>
+      </p:nvGrpSpPr>
+      <p:grpSpPr>
+        <a:xfrm>
+          <a:off x="0" y="0"/>
+          <a:ext cx="0" cy="0"/>
+          <a:chOff x="0" y="0"/>
+          <a:chExt cx="0" cy="0"/>
+        </a:xfrm>
+      </p:grpSpPr>
+      <p:sp>
+        <p:nvSpPr>
+          <p:cNvPr id="2" name="Title 1"/>
+          <p:cNvSpPr>
+            <a:spLocks noGrp="1"/>
+          </p:cNvSpPr>
+          <p:nvPr>
+            <p:ph type="title"/>
+          </p:nvPr>
+        </p:nvSpPr>
+        <p:spPr/>
+        <p:txBody>
+          <a:bodyPr>
+            <a:normAutofit/>
+          </a:bodyPr>
+          <a:lstStyle/>
+          <a:p>
+            <a:r>
+              <a:rPr lang="en-US" dirty="0" smtClean="0"/>
+              <a:t>Volt-VAR Optimization Example – Initial Voltages</a:t>
+            </a:r>
+            <a:endParaRPr lang="en-US" dirty="0"/>
+          </a:p>
+        </p:txBody>
+      </p:sp>
+      <p:sp>
+        <p:nvSpPr>
+          <p:cNvPr id="3" name="Content Placeholder 2"/>
+          <p:cNvSpPr>
+            <a:spLocks noGrp="1"/>
+          </p:cNvSpPr>
+          <p:nvPr>
+            <p:ph idx="1"/>
+          </p:nvPr>
+        </p:nvSpPr>
+        <p:spPr>
+          <a:xfrm>
+            <a:off x="457199" y="1600200"/>
+            <a:ext cx="4541191" cy="4525963"/>
+          </a:xfrm>
+        </p:spPr>
+        <p:txBody>
+          <a:bodyPr>
+            <a:normAutofit/>
+          </a:bodyPr>
+          <a:lstStyle/>
+          <a:p>
+            <a:pPr marL="514350" indent="-514350">
+              <a:buFont typeface="+mj-lt"/>
+              <a:buAutoNum type="arabicPeriod"/>
+            </a:pPr>
+            <a:r>
+              <a:rPr lang="en-US" sz="2800" dirty="0" smtClean="0"/>
+              <a:t>Determine </a:t>
+            </a:r>
+            <a:r>
+              <a:rPr lang="en-US" sz="2800" i="1" dirty="0" smtClean="0"/>
+              <a:t>minimum voltage</a:t>
+            </a:r>
+            <a:r>
+              <a:rPr lang="en-US" sz="2800" dirty="0" smtClean="0"/>
+              <a:t> and </a:t>
+            </a:r>
+            <a:r>
+              <a:rPr lang="en-US" sz="2800" i="1" dirty="0" smtClean="0"/>
+              <a:t>regulator load-side voltages</a:t>
+            </a:r>
+          </a:p>
+          <a:p>
+            <a:pPr lvl="1"/>
+            <a:r>
+              <a:rPr lang="en-US" sz="2200" dirty="0" err="1" smtClean="0"/>
+              <a:t>Reg</a:t>
+            </a:r>
+            <a:r>
+              <a:rPr lang="en-US" sz="2200" dirty="0" smtClean="0"/>
+              <a:t> 1 – 4850 V and 4600 V</a:t>
+            </a:r>
+          </a:p>
+          <a:p>
+            <a:pPr lvl="1"/>
+            <a:r>
+              <a:rPr lang="en-US" sz="2200" dirty="0" err="1" smtClean="0"/>
+              <a:t>Reg</a:t>
+            </a:r>
+            <a:r>
+              <a:rPr lang="en-US" sz="2200" dirty="0" smtClean="0"/>
+              <a:t> 2 – 4840 V and 4700 V</a:t>
+            </a:r>
+          </a:p>
+          <a:p>
+            <a:pPr marL="0" indent="0">
+              <a:buNone/>
+            </a:pPr>
+            <a:r>
+              <a:rPr lang="en-US" sz="2800" dirty="0" smtClean="0"/>
+              <a:t>1a. Evaluate voltages</a:t>
+            </a:r>
+          </a:p>
+          <a:p>
+            <a:pPr lvl="1"/>
+            <a:r>
+              <a:rPr lang="en-US" sz="2200" dirty="0" err="1" smtClean="0"/>
+              <a:t>Reg</a:t>
+            </a:r>
+            <a:r>
+              <a:rPr lang="en-US" sz="2200" dirty="0" smtClean="0"/>
+              <a:t> 1 end-of-line voltage is low</a:t>
+            </a:r>
+          </a:p>
+          <a:p>
+            <a:pPr lvl="1"/>
+            <a:r>
+              <a:rPr lang="en-US" sz="2200" dirty="0" err="1" smtClean="0"/>
+              <a:t>Reg</a:t>
+            </a:r>
+            <a:r>
+              <a:rPr lang="en-US" sz="2200" dirty="0" smtClean="0"/>
+              <a:t> 2 is acceptable</a:t>
+            </a:r>
+          </a:p>
+          <a:p>
+            <a:endParaRPr lang="en-US" dirty="0"/>
+          </a:p>
+        </p:txBody>
+      </p:sp>
+      <p:pic>
+        <p:nvPicPr>
+          <p:cNvPr id="14338" name="Picture 2" descr="C:\Users\d3x593\Desktop\Volt-VAR-Example\Base_Volt_VAR_Initial_Voltage.jpg"/>
+          <p:cNvPicPr>
+            <a:picLocks noChangeAspect="1" noChangeArrowheads="1"/>
+          </p:cNvPicPr>
+          <p:nvPr/>
+        </p:nvPicPr>
+        <p:blipFill>
+          <a:blip r:embed="rId2">
+            <a:extLst>
+              <a:ext uri="{28A0092B-C50C-407E-A947-70E740481C1C}">
+                <a14:useLocalDpi xmlns:a14="http://schemas.microsoft.com/office/drawing/2010/main" val="0"/>
+              </a:ext>
+            </a:extLst>
+          </a:blip>
+          <a:srcRect/>
+          <a:stretch>
+            <a:fillRect/>
+          </a:stretch>
+        </p:blipFill>
+        <p:spPr bwMode="auto">
+          <a:xfrm>
+            <a:off x="5001768" y="1645920"/>
+            <a:ext cx="4069080" cy="3457295"/>
+          </a:xfrm>
+          <a:prstGeom prst="rect">
+            <a:avLst/>
+          </a:prstGeom>
+          <a:noFill/>
+          <a:extLst>
+            <a:ext uri="{909E8E84-426E-40DD-AFC4-6F175D3DCCD1}">
+              <a14:hiddenFill xmlns:a14="http://schemas.microsoft.com/office/drawing/2010/main">
+                <a:solidFill>
+                  <a:srgbClr val="FFFFFF"/>
+                </a:solidFill>
+              </a14:hiddenFill>
+            </a:ext>
+          </a:extLst>
+        </p:spPr>
+      </p:pic>
+      <p:sp>
+        <p:nvSpPr>
+          <p:cNvPr id="4" name="Slide Number Placeholder 3"/>
+          <p:cNvSpPr>
+            <a:spLocks noGrp="1"/>
+          </p:cNvSpPr>
+          <p:nvPr>
+            <p:ph type="sldNum" sz="quarter" idx="12"/>
+          </p:nvPr>
+        </p:nvSpPr>
+        <p:spPr/>
+        <p:txBody>
+          <a:bodyPr/>
+          <a:lstStyle/>
+          <a:p>
+            <a:fld id="{B6F15528-21DE-4FAA-801E-634DDDAF4B2B}" type="slidenum">
+              <a:rPr lang="en-US" smtClean="0"/>
+              <a:pPr/>
+              <a:t>22</a:t>
+            </a:fld>
+            <a:endParaRPr lang="en-US"/>
+          </a:p>
+        </p:txBody>
+      </p:sp>
+    </p:spTree>
+    <p:extLst>
+      <p:ext uri="{BB962C8B-B14F-4D97-AF65-F5344CB8AC3E}">
+        <p14:creationId xmlns:p14="http://schemas.microsoft.com/office/powerpoint/2010/main" val="2280317076"/>
+      </p:ext>
+    </p:extLst>
+  </p:cSld>
+  <p:clrMapOvr>
+    <a:masterClrMapping/>
+  </p:clrMapOvr>
+  <p:timing>
+    <p:tnLst>
+      <p:par>
+        <p:cTn id="1" dur="indefinite" restart="never" nodeType="tmRoot"/>
+      </p:par>
+    </p:tnLst>
+  </p:timing>
+</p:sld>
+</file>
+
+<file path=ppt/slides/slide23.xml><?xml version="1.0" encoding="utf-8"?>
+<p:sld xmlns:a="http://schemas.openxmlformats.org/drawingml/2006/main" xmlns:r="http://schemas.openxmlformats.org/officeDocument/2006/relationships" xmlns:p="http://schemas.openxmlformats.org/presentationml/2006/main">
+  <p:cSld>
+    <p:spTree>
+      <p:nvGrpSpPr>
+        <p:cNvPr id="1" name=""/>
+        <p:cNvGrpSpPr/>
+        <p:nvPr/>
+      </p:nvGrpSpPr>
+      <p:grpSpPr>
+        <a:xfrm>
+          <a:off x="0" y="0"/>
+          <a:ext cx="0" cy="0"/>
+          <a:chOff x="0" y="0"/>
+          <a:chExt cx="0" cy="0"/>
+        </a:xfrm>
+      </p:grpSpPr>
+      <p:sp>
+        <p:nvSpPr>
+          <p:cNvPr id="2" name="Title 1"/>
+          <p:cNvSpPr>
+            <a:spLocks noGrp="1"/>
+          </p:cNvSpPr>
+          <p:nvPr>
+            <p:ph type="title"/>
+          </p:nvPr>
+        </p:nvSpPr>
+        <p:spPr/>
+        <p:txBody>
+          <a:bodyPr>
+            <a:normAutofit/>
+          </a:bodyPr>
+          <a:lstStyle/>
+          <a:p>
+            <a:r>
+              <a:rPr lang="en-US" dirty="0" smtClean="0"/>
+              <a:t>Volt-VAR Optimization Example – Condition Evaluation</a:t>
+            </a:r>
+            <a:endParaRPr lang="en-US" dirty="0"/>
+          </a:p>
+        </p:txBody>
+      </p:sp>
+      <p:sp>
+        <p:nvSpPr>
+          <p:cNvPr id="3" name="Content Placeholder 2"/>
+          <p:cNvSpPr>
+            <a:spLocks noGrp="1"/>
+          </p:cNvSpPr>
+          <p:nvPr>
+            <p:ph idx="1"/>
+          </p:nvPr>
+        </p:nvSpPr>
+        <p:spPr>
+          <a:xfrm>
+            <a:off x="457199" y="1600200"/>
+            <a:ext cx="4541191" cy="4525963"/>
+          </a:xfrm>
+        </p:spPr>
+        <p:txBody>
+          <a:bodyPr>
+            <a:normAutofit/>
+          </a:bodyPr>
+          <a:lstStyle/>
+          <a:p>
+            <a:pPr marL="514350" indent="-514350">
+              <a:buFont typeface="+mj-lt"/>
+              <a:buAutoNum type="arabicPeriod" startAt="2"/>
+            </a:pPr>
+            <a:r>
+              <a:rPr lang="en-US" sz="2800" dirty="0" smtClean="0"/>
+              <a:t>Compute </a:t>
+            </a:r>
+            <a:r>
+              <a:rPr lang="en-US" sz="2800" i="1" dirty="0" smtClean="0"/>
+              <a:t>voltage drop</a:t>
+            </a:r>
+            <a:r>
+              <a:rPr lang="en-US" sz="2800" dirty="0" smtClean="0"/>
+              <a:t> between regulator and minimum voltage</a:t>
+            </a:r>
+          </a:p>
+          <a:p>
+            <a:pPr lvl="1"/>
+            <a:r>
+              <a:rPr lang="en-US" sz="2200" dirty="0" err="1" smtClean="0"/>
+              <a:t>Reg</a:t>
+            </a:r>
+            <a:r>
+              <a:rPr lang="en-US" sz="2200" dirty="0" smtClean="0"/>
+              <a:t> 1 – 250 V</a:t>
+            </a:r>
+          </a:p>
+          <a:p>
+            <a:pPr lvl="1"/>
+            <a:r>
+              <a:rPr lang="en-US" sz="2200" dirty="0" err="1" smtClean="0"/>
+              <a:t>Reg</a:t>
+            </a:r>
+            <a:r>
+              <a:rPr lang="en-US" sz="2200" dirty="0" smtClean="0"/>
+              <a:t> 2 – No action needed, but 140 V drop</a:t>
+            </a:r>
+          </a:p>
+          <a:p>
+            <a:pPr marL="0" indent="0">
+              <a:buNone/>
+            </a:pPr>
+            <a:endParaRPr lang="en-US" dirty="0"/>
+          </a:p>
+        </p:txBody>
+      </p:sp>
+      <p:pic>
+        <p:nvPicPr>
+          <p:cNvPr id="15362" name="Picture 2" descr="C:\Users\d3x593\Desktop\Volt-VAR-Example\Base_Volt_VAR_Evaluate1.jpg"/>
+          <p:cNvPicPr>
+            <a:picLocks noChangeAspect="1" noChangeArrowheads="1"/>
+          </p:cNvPicPr>
+          <p:nvPr/>
+        </p:nvPicPr>
+        <p:blipFill>
+          <a:blip r:embed="rId2">
+            <a:extLst>
+              <a:ext uri="{28A0092B-C50C-407E-A947-70E740481C1C}">
+                <a14:useLocalDpi xmlns:a14="http://schemas.microsoft.com/office/drawing/2010/main" val="0"/>
+              </a:ext>
+            </a:extLst>
+          </a:blip>
+          <a:srcRect/>
+          <a:stretch>
+            <a:fillRect/>
+          </a:stretch>
+        </p:blipFill>
+        <p:spPr bwMode="auto">
+          <a:xfrm>
+            <a:off x="5001768" y="1645920"/>
+            <a:ext cx="4068064" cy="3456432"/>
+          </a:xfrm>
+          <a:prstGeom prst="rect">
+            <a:avLst/>
+          </a:prstGeom>
+          <a:noFill/>
+          <a:extLst>
+            <a:ext uri="{909E8E84-426E-40DD-AFC4-6F175D3DCCD1}">
+              <a14:hiddenFill xmlns:a14="http://schemas.microsoft.com/office/drawing/2010/main">
+                <a:solidFill>
+                  <a:srgbClr val="FFFFFF"/>
+                </a:solidFill>
+              </a14:hiddenFill>
+            </a:ext>
+          </a:extLst>
+        </p:spPr>
+      </p:pic>
+      <p:sp>
+        <p:nvSpPr>
+          <p:cNvPr id="4" name="Slide Number Placeholder 3"/>
+          <p:cNvSpPr>
+            <a:spLocks noGrp="1"/>
+          </p:cNvSpPr>
+          <p:nvPr>
+            <p:ph type="sldNum" sz="quarter" idx="12"/>
+          </p:nvPr>
+        </p:nvSpPr>
+        <p:spPr/>
+        <p:txBody>
+          <a:bodyPr/>
+          <a:lstStyle/>
+          <a:p>
+            <a:fld id="{B6F15528-21DE-4FAA-801E-634DDDAF4B2B}" type="slidenum">
+              <a:rPr lang="en-US" smtClean="0"/>
+              <a:pPr/>
+              <a:t>23</a:t>
+            </a:fld>
+            <a:endParaRPr lang="en-US"/>
+          </a:p>
+        </p:txBody>
+      </p:sp>
+    </p:spTree>
+    <p:extLst>
+      <p:ext uri="{BB962C8B-B14F-4D97-AF65-F5344CB8AC3E}">
+        <p14:creationId xmlns:p14="http://schemas.microsoft.com/office/powerpoint/2010/main" val="3460944002"/>
+      </p:ext>
+    </p:extLst>
+  </p:cSld>
+  <p:clrMapOvr>
+    <a:masterClrMapping/>
+  </p:clrMapOvr>
+  <p:timing>
+    <p:tnLst>
+      <p:par>
+        <p:cTn id="1" dur="indefinite" restart="never" nodeType="tmRoot"/>
+      </p:par>
+    </p:tnLst>
+  </p:timing>
+</p:sld>
+</file>
+
+<file path=ppt/slides/slide24.xml><?xml version="1.0" encoding="utf-8"?>
+<p:sld xmlns:a="http://schemas.openxmlformats.org/drawingml/2006/main" xmlns:r="http://schemas.openxmlformats.org/officeDocument/2006/relationships" xmlns:p="http://schemas.openxmlformats.org/presentationml/2006/main">
+  <p:cSld>
+    <p:spTree>
+      <p:nvGrpSpPr>
+        <p:cNvPr id="1" name=""/>
+        <p:cNvGrpSpPr/>
+        <p:nvPr/>
+      </p:nvGrpSpPr>
+      <p:grpSpPr>
+        <a:xfrm>
+          <a:off x="0" y="0"/>
+          <a:ext cx="0" cy="0"/>
+          <a:chOff x="0" y="0"/>
+          <a:chExt cx="0" cy="0"/>
+        </a:xfrm>
+      </p:grpSpPr>
+      <p:sp>
+        <p:nvSpPr>
+          <p:cNvPr id="2" name="Title 1"/>
+          <p:cNvSpPr>
+            <a:spLocks noGrp="1"/>
+          </p:cNvSpPr>
+          <p:nvPr>
+            <p:ph type="title"/>
+          </p:nvPr>
+        </p:nvSpPr>
+        <p:spPr/>
+        <p:txBody>
+          <a:bodyPr>
+            <a:normAutofit/>
+          </a:bodyPr>
+          <a:lstStyle/>
+          <a:p>
+            <a:r>
+              <a:rPr lang="en-US" dirty="0" smtClean="0"/>
               <a:t>Volt-VAR Optimization Example – Corrective Actions</a:t>
             </a:r>
             <a:endParaRPr lang="en-US" dirty="0"/>
@@ -5913,7 +8102,7 @@
             <a:fld id="{B6F15528-21DE-4FAA-801E-634DDDAF4B2B}" type="slidenum">
               <a:rPr lang="en-US" smtClean="0"/>
               <a:pPr/>
-              <a:t>20</a:t>
+              <a:t>24</a:t>
             </a:fld>
             <a:endParaRPr lang="en-US"/>
           </a:p>
@@ -5939,7 +8128,7 @@
 </p:sld>
 </file>
 
-<file path=ppt/slides/slide21.xml><?xml version="1.0" encoding="utf-8"?>
+<file path=ppt/slides/slide25.xml><?xml version="1.0" encoding="utf-8"?>
 <p:sld xmlns:a="http://schemas.openxmlformats.org/drawingml/2006/main" xmlns:r="http://schemas.openxmlformats.org/officeDocument/2006/relationships" xmlns:p="http://schemas.openxmlformats.org/presentationml/2006/main">
   <p:cSld>
     <p:spTree>
@@ -6153,7 +8342,7 @@
             <a:fld id="{B6F15528-21DE-4FAA-801E-634DDDAF4B2B}" type="slidenum">
               <a:rPr lang="en-US" smtClean="0"/>
               <a:pPr/>
-              <a:t>21</a:t>
+              <a:t>25</a:t>
             </a:fld>
             <a:endParaRPr lang="en-US"/>
           </a:p>
@@ -6179,7 +8368,7 @@
 </p:sld>
 </file>
 
-<file path=ppt/slides/slide22.xml><?xml version="1.0" encoding="utf-8"?>
+<file path=ppt/slides/slide26.xml><?xml version="1.0" encoding="utf-8"?>
 <p:sld xmlns:a="http://schemas.openxmlformats.org/drawingml/2006/main" xmlns:r="http://schemas.openxmlformats.org/officeDocument/2006/relationships" xmlns:p="http://schemas.openxmlformats.org/presentationml/2006/main">
   <p:cSld>
     <p:spTree>
@@ -6332,7 +8521,7 @@
             <a:fld id="{B6F15528-21DE-4FAA-801E-634DDDAF4B2B}" type="slidenum">
               <a:rPr lang="en-US" smtClean="0"/>
               <a:pPr/>
-              <a:t>22</a:t>
+              <a:t>26</a:t>
             </a:fld>
             <a:endParaRPr lang="en-US"/>
           </a:p>
@@ -6358,7 +8547,7 @@
 </p:sld>
 </file>
 
-<file path=ppt/slides/slide23.xml><?xml version="1.0" encoding="utf-8"?>
+<file path=ppt/slides/slide27.xml><?xml version="1.0" encoding="utf-8"?>
 <p:sld xmlns:a="http://schemas.openxmlformats.org/drawingml/2006/main" xmlns:r="http://schemas.openxmlformats.org/officeDocument/2006/relationships" xmlns:p="http://schemas.openxmlformats.org/presentationml/2006/main">
   <p:cSld>
     <p:spTree>
@@ -6556,7 +8745,7 @@
             <a:fld id="{B6F15528-21DE-4FAA-801E-634DDDAF4B2B}" type="slidenum">
               <a:rPr lang="en-US" smtClean="0"/>
               <a:pPr/>
-              <a:t>23</a:t>
+              <a:t>27</a:t>
             </a:fld>
             <a:endParaRPr lang="en-US"/>
           </a:p>
@@ -6582,7 +8771,7 @@
 </p:sld>
 </file>
 
-<file path=ppt/slides/slide24.xml><?xml version="1.0" encoding="utf-8"?>
+<file path=ppt/slides/slide28.xml><?xml version="1.0" encoding="utf-8"?>
 <p:sld xmlns:a="http://schemas.openxmlformats.org/drawingml/2006/main" xmlns:r="http://schemas.openxmlformats.org/officeDocument/2006/relationships" xmlns:p="http://schemas.openxmlformats.org/presentationml/2006/main">
   <p:cSld>
     <p:spTree>
@@ -6822,7 +9011,7 @@
             <a:fld id="{B6F15528-21DE-4FAA-801E-634DDDAF4B2B}" type="slidenum">
               <a:rPr lang="en-US" smtClean="0"/>
               <a:pPr/>
-              <a:t>24</a:t>
+              <a:t>28</a:t>
             </a:fld>
             <a:endParaRPr lang="en-US"/>
           </a:p>
@@ -6848,7 +9037,7 @@
 </p:sld>
 </file>
 
-<file path=ppt/slides/slide25.xml><?xml version="1.0" encoding="utf-8"?>
+<file path=ppt/slides/slide29.xml><?xml version="1.0" encoding="utf-8"?>
 <p:sld xmlns:a="http://schemas.openxmlformats.org/drawingml/2006/main" xmlns:r="http://schemas.openxmlformats.org/officeDocument/2006/relationships" xmlns:p="http://schemas.openxmlformats.org/presentationml/2006/main">
   <p:cSld>
     <p:spTree>
@@ -7013,7 +9202,7 @@
             <a:fld id="{B6F15528-21DE-4FAA-801E-634DDDAF4B2B}" type="slidenum">
               <a:rPr lang="en-US" smtClean="0"/>
               <a:pPr/>
-              <a:t>25</a:t>
+              <a:t>29</a:t>
             </a:fld>
             <a:endParaRPr lang="en-US"/>
           </a:p>
@@ -7039,7 +9228,7 @@
 </p:sld>
 </file>
 
-<file path=ppt/slides/slide26.xml><?xml version="1.0" encoding="utf-8"?>
+<file path=ppt/slides/slide3.xml><?xml version="1.0" encoding="utf-8"?>
 <p:sld xmlns:a="http://schemas.openxmlformats.org/drawingml/2006/main" xmlns:r="http://schemas.openxmlformats.org/officeDocument/2006/relationships" xmlns:p="http://schemas.openxmlformats.org/presentationml/2006/main">
   <p:cSld>
     <p:spTree>
@@ -7068,77 +9257,85 @@
         </p:nvSpPr>
         <p:spPr/>
         <p:txBody>
+          <a:bodyPr/>
+          <a:lstStyle/>
+          <a:p>
+            <a:r>
+              <a:rPr lang="en-US" dirty="0" smtClean="0"/>
+              <a:t>Part 1: Traditional Voltage Control</a:t>
+            </a:r>
+            <a:endParaRPr lang="en-US" dirty="0"/>
+          </a:p>
+        </p:txBody>
+      </p:sp>
+      <p:sp>
+        <p:nvSpPr>
+          <p:cNvPr id="3" name="Content Placeholder 2"/>
+          <p:cNvSpPr>
+            <a:spLocks noGrp="1"/>
+          </p:cNvSpPr>
+          <p:nvPr>
+            <p:ph idx="1"/>
+          </p:nvPr>
+        </p:nvSpPr>
+        <p:spPr>
+          <a:xfrm>
+            <a:off x="457200" y="1600201"/>
+            <a:ext cx="8229600" cy="2286000"/>
+          </a:xfrm>
+        </p:spPr>
+        <p:txBody>
           <a:bodyPr>
             <a:normAutofit/>
           </a:bodyPr>
           <a:lstStyle/>
           <a:p>
             <a:r>
-              <a:rPr lang="en-US" dirty="0" smtClean="0"/>
-              <a:t>Integrated Volt/VAR Control in Distribution Systems</a:t>
-            </a:r>
-            <a:endParaRPr lang="en-US" dirty="0"/>
-          </a:p>
-        </p:txBody>
-      </p:sp>
-      <p:sp>
-        <p:nvSpPr>
-          <p:cNvPr id="3" name="Content Placeholder 2"/>
-          <p:cNvSpPr>
-            <a:spLocks noGrp="1"/>
-          </p:cNvSpPr>
-          <p:nvPr>
-            <p:ph idx="1"/>
-          </p:nvPr>
-        </p:nvSpPr>
-        <p:spPr/>
-        <p:txBody>
-          <a:bodyPr>
-            <a:normAutofit/>
-          </a:bodyPr>
-          <a:lstStyle/>
-          <a:p>
-            <a:r>
-              <a:rPr lang="en-US" dirty="0" smtClean="0"/>
-              <a:t>This is an openly available Volt-VAR control system that has been implemented in GridLAB-D.</a:t>
-            </a:r>
-          </a:p>
-          <a:p>
-            <a:endParaRPr lang="en-US" dirty="0" smtClean="0"/>
-          </a:p>
-          <a:p>
-            <a:r>
-              <a:rPr lang="en-US" dirty="0" smtClean="0"/>
-              <a:t>It is composed of 2 coordinated goals.</a:t>
-            </a:r>
-          </a:p>
-          <a:p>
-            <a:pPr lvl="1"/>
-            <a:r>
-              <a:rPr lang="en-US" dirty="0" smtClean="0"/>
-              <a:t>Voltage reduction</a:t>
-            </a:r>
-          </a:p>
-          <a:p>
-            <a:pPr lvl="1"/>
-            <a:r>
-              <a:rPr lang="en-US" dirty="0" smtClean="0"/>
-              <a:t>VAR control</a:t>
-            </a:r>
-          </a:p>
-          <a:p>
-            <a:pPr lvl="1"/>
-            <a:endParaRPr lang="en-US" dirty="0" smtClean="0"/>
-          </a:p>
-          <a:p>
-            <a:pPr lvl="1"/>
-            <a:endParaRPr lang="en-US" dirty="0" smtClean="0"/>
-          </a:p>
-          <a:p>
-            <a:endParaRPr lang="en-US" dirty="0" smtClean="0"/>
-          </a:p>
-        </p:txBody>
-      </p:sp>
+              <a:rPr lang="en-US" sz="2400" dirty="0" smtClean="0"/>
+              <a:t>The voltage supplied to the customer is generally maintained within the limits set by ANCI C84.1, 120V +/-5%.</a:t>
+            </a:r>
+          </a:p>
+          <a:p>
+            <a:r>
+              <a:rPr lang="en-US" sz="2400" dirty="0" smtClean="0"/>
+              <a:t>This is done by setting the voltage at the “head” of the feeder at the high end of the band, to ensure that the voltage drop at peak load does not exceed limits.</a:t>
+            </a:r>
+            <a:endParaRPr lang="en-US" sz="2400" dirty="0"/>
+          </a:p>
+        </p:txBody>
+      </p:sp>
+      <p:pic>
+        <p:nvPicPr>
+          <p:cNvPr id="1027" name="Picture 3"/>
+          <p:cNvPicPr>
+            <a:picLocks noChangeAspect="1" noChangeArrowheads="1"/>
+          </p:cNvPicPr>
+          <p:nvPr/>
+        </p:nvPicPr>
+        <p:blipFill>
+          <a:blip r:embed="rId2" cstate="print"/>
+          <a:srcRect/>
+          <a:stretch>
+            <a:fillRect/>
+          </a:stretch>
+        </p:blipFill>
+        <p:spPr bwMode="auto">
+          <a:xfrm>
+            <a:off x="1524000" y="3962400"/>
+            <a:ext cx="5705475" cy="2419350"/>
+          </a:xfrm>
+          <a:prstGeom prst="rect">
+            <a:avLst/>
+          </a:prstGeom>
+          <a:noFill/>
+          <a:ln w="9525">
+            <a:noFill/>
+            <a:miter lim="800000"/>
+            <a:headEnd/>
+            <a:tailEnd/>
+          </a:ln>
+        </p:spPr>
+      </p:pic>
       <p:sp>
         <p:nvSpPr>
           <p:cNvPr id="4" name="Slide Number Placeholder 3"/>
@@ -7157,7 +9354,7 @@
             <a:fld id="{B6F15528-21DE-4FAA-801E-634DDDAF4B2B}" type="slidenum">
               <a:rPr lang="en-US" smtClean="0"/>
               <a:pPr/>
-              <a:t>26</a:t>
+              <a:t>3</a:t>
             </a:fld>
             <a:endParaRPr lang="en-US"/>
           </a:p>
@@ -7178,7 +9375,146 @@
 </p:sld>
 </file>
 
-<file path=ppt/slides/slide27.xml><?xml version="1.0" encoding="utf-8"?>
+<file path=ppt/slides/slide30.xml><?xml version="1.0" encoding="utf-8"?>
+<p:sld xmlns:a="http://schemas.openxmlformats.org/drawingml/2006/main" xmlns:r="http://schemas.openxmlformats.org/officeDocument/2006/relationships" xmlns:p="http://schemas.openxmlformats.org/presentationml/2006/main">
+  <p:cSld>
+    <p:spTree>
+      <p:nvGrpSpPr>
+        <p:cNvPr id="1" name=""/>
+        <p:cNvGrpSpPr/>
+        <p:nvPr/>
+      </p:nvGrpSpPr>
+      <p:grpSpPr>
+        <a:xfrm>
+          <a:off x="0" y="0"/>
+          <a:ext cx="0" cy="0"/>
+          <a:chOff x="0" y="0"/>
+          <a:chExt cx="0" cy="0"/>
+        </a:xfrm>
+      </p:grpSpPr>
+      <p:sp>
+        <p:nvSpPr>
+          <p:cNvPr id="2" name="Title 1"/>
+          <p:cNvSpPr>
+            <a:spLocks noGrp="1"/>
+          </p:cNvSpPr>
+          <p:nvPr>
+            <p:ph type="title"/>
+          </p:nvPr>
+        </p:nvSpPr>
+        <p:spPr/>
+        <p:txBody>
+          <a:bodyPr>
+            <a:normAutofit/>
+          </a:bodyPr>
+          <a:lstStyle/>
+          <a:p>
+            <a:r>
+              <a:rPr lang="en-US" dirty="0" smtClean="0"/>
+              <a:t>Integrated Volt/VAR Control in Distribution Systems</a:t>
+            </a:r>
+            <a:endParaRPr lang="en-US" dirty="0"/>
+          </a:p>
+        </p:txBody>
+      </p:sp>
+      <p:sp>
+        <p:nvSpPr>
+          <p:cNvPr id="3" name="Content Placeholder 2"/>
+          <p:cNvSpPr>
+            <a:spLocks noGrp="1"/>
+          </p:cNvSpPr>
+          <p:nvPr>
+            <p:ph idx="1"/>
+          </p:nvPr>
+        </p:nvSpPr>
+        <p:spPr/>
+        <p:txBody>
+          <a:bodyPr>
+            <a:normAutofit/>
+          </a:bodyPr>
+          <a:lstStyle/>
+          <a:p>
+            <a:r>
+              <a:rPr lang="en-US" dirty="0" smtClean="0"/>
+              <a:t>This is an openly available Volt-VAR control system that has been implemented in GridLAB-D.</a:t>
+            </a:r>
+          </a:p>
+          <a:p>
+            <a:endParaRPr lang="en-US" dirty="0" smtClean="0"/>
+          </a:p>
+          <a:p>
+            <a:r>
+              <a:rPr lang="en-US" dirty="0" smtClean="0"/>
+              <a:t>It is composed of two coordinated goals.</a:t>
+            </a:r>
+          </a:p>
+          <a:p>
+            <a:pPr lvl="1"/>
+            <a:r>
+              <a:rPr lang="en-US" dirty="0" smtClean="0"/>
+              <a:t>Voltage reduction</a:t>
+            </a:r>
+          </a:p>
+          <a:p>
+            <a:pPr lvl="1"/>
+            <a:r>
+              <a:rPr lang="en-US" dirty="0" smtClean="0"/>
+              <a:t>VAR control</a:t>
+            </a:r>
+          </a:p>
+          <a:p>
+            <a:pPr lvl="1"/>
+            <a:endParaRPr lang="en-US" dirty="0" smtClean="0"/>
+          </a:p>
+          <a:p>
+            <a:pPr lvl="1"/>
+            <a:endParaRPr lang="en-US" dirty="0" smtClean="0"/>
+          </a:p>
+          <a:p>
+            <a:endParaRPr lang="en-US" dirty="0" smtClean="0"/>
+          </a:p>
+        </p:txBody>
+      </p:sp>
+      <p:sp>
+        <p:nvSpPr>
+          <p:cNvPr id="4" name="Slide Number Placeholder 3"/>
+          <p:cNvSpPr>
+            <a:spLocks noGrp="1"/>
+          </p:cNvSpPr>
+          <p:nvPr>
+            <p:ph type="sldNum" sz="quarter" idx="12"/>
+          </p:nvPr>
+        </p:nvSpPr>
+        <p:spPr/>
+        <p:txBody>
+          <a:bodyPr/>
+          <a:lstStyle/>
+          <a:p>
+            <a:fld id="{B6F15528-21DE-4FAA-801E-634DDDAF4B2B}" type="slidenum">
+              <a:rPr lang="en-US" smtClean="0"/>
+              <a:pPr/>
+              <a:t>30</a:t>
+            </a:fld>
+            <a:endParaRPr lang="en-US"/>
+          </a:p>
+        </p:txBody>
+      </p:sp>
+    </p:spTree>
+  </p:cSld>
+  <p:clrMapOvr>
+    <a:masterClrMapping/>
+  </p:clrMapOvr>
+  <p:timing>
+    <p:tnLst>
+      <p:par>
+        <p:cTn id="1" dur="indefinite" restart="never" nodeType="tmRoot"/>
+      </p:par>
+    </p:tnLst>
+  </p:timing>
+</p:sld>
+</file>
+
+<file path=ppt/slides/slide31.xml><?xml version="1.0" encoding="utf-8"?>
 <p:sld xmlns:a="http://schemas.openxmlformats.org/drawingml/2006/main" xmlns:r="http://schemas.openxmlformats.org/officeDocument/2006/relationships" xmlns:p="http://schemas.openxmlformats.org/presentationml/2006/main">
   <p:cSld>
     <p:spTree>
@@ -7604,7 +9940,7 @@
             <a:fld id="{B6F15528-21DE-4FAA-801E-634DDDAF4B2B}" type="slidenum">
               <a:rPr lang="en-US" smtClean="0"/>
               <a:pPr/>
-              <a:t>27</a:t>
+              <a:t>31</a:t>
             </a:fld>
             <a:endParaRPr lang="en-US"/>
           </a:p>
@@ -7863,7 +10199,7 @@
 </p:sld>
 </file>
 
-<file path=ppt/slides/slide28.xml><?xml version="1.0" encoding="utf-8"?>
+<file path=ppt/slides/slide32.xml><?xml version="1.0" encoding="utf-8"?>
 <p:sld xmlns:a="http://schemas.openxmlformats.org/drawingml/2006/main" xmlns:r="http://schemas.openxmlformats.org/officeDocument/2006/relationships" xmlns:p="http://schemas.openxmlformats.org/presentationml/2006/main">
   <p:cSld>
     <p:spTree>
@@ -8093,7 +10429,7 @@
             <a:fld id="{B6F15528-21DE-4FAA-801E-634DDDAF4B2B}" type="slidenum">
               <a:rPr lang="en-US" smtClean="0"/>
               <a:pPr/>
-              <a:t>28</a:t>
+              <a:t>32</a:t>
             </a:fld>
             <a:endParaRPr lang="en-US"/>
           </a:p>
@@ -8114,7 +10450,7 @@
 </p:sld>
 </file>
 
-<file path=ppt/slides/slide29.xml><?xml version="1.0" encoding="utf-8"?>
+<file path=ppt/slides/slide33.xml><?xml version="1.0" encoding="utf-8"?>
 <p:sld xmlns:a="http://schemas.openxmlformats.org/drawingml/2006/main" xmlns:r="http://schemas.openxmlformats.org/officeDocument/2006/relationships" xmlns:p="http://schemas.openxmlformats.org/presentationml/2006/main">
   <p:cSld>
     <p:spTree>
@@ -8361,7 +10697,7 @@
             <a:fld id="{B6F15528-21DE-4FAA-801E-634DDDAF4B2B}" type="slidenum">
               <a:rPr lang="en-US" smtClean="0"/>
               <a:pPr/>
-              <a:t>29</a:t>
+              <a:t>33</a:t>
             </a:fld>
             <a:endParaRPr lang="en-US"/>
           </a:p>
@@ -8382,154 +10718,7 @@
 </p:sld>
 </file>
 
-<file path=ppt/slides/slide3.xml><?xml version="1.0" encoding="utf-8"?>
-<p:sld xmlns:a="http://schemas.openxmlformats.org/drawingml/2006/main" xmlns:r="http://schemas.openxmlformats.org/officeDocument/2006/relationships" xmlns:p="http://schemas.openxmlformats.org/presentationml/2006/main">
-  <p:cSld>
-    <p:spTree>
-      <p:nvGrpSpPr>
-        <p:cNvPr id="1" name=""/>
-        <p:cNvGrpSpPr/>
-        <p:nvPr/>
-      </p:nvGrpSpPr>
-      <p:grpSpPr>
-        <a:xfrm>
-          <a:off x="0" y="0"/>
-          <a:ext cx="0" cy="0"/>
-          <a:chOff x="0" y="0"/>
-          <a:chExt cx="0" cy="0"/>
-        </a:xfrm>
-      </p:grpSpPr>
-      <p:sp>
-        <p:nvSpPr>
-          <p:cNvPr id="2" name="Title 1"/>
-          <p:cNvSpPr>
-            <a:spLocks noGrp="1"/>
-          </p:cNvSpPr>
-          <p:nvPr>
-            <p:ph type="title"/>
-          </p:nvPr>
-        </p:nvSpPr>
-        <p:spPr/>
-        <p:txBody>
-          <a:bodyPr/>
-          <a:lstStyle/>
-          <a:p>
-            <a:r>
-              <a:rPr lang="en-US" dirty="0" smtClean="0"/>
-              <a:t>Part 1: Traditional Voltage Control</a:t>
-            </a:r>
-            <a:endParaRPr lang="en-US" dirty="0"/>
-          </a:p>
-        </p:txBody>
-      </p:sp>
-      <p:sp>
-        <p:nvSpPr>
-          <p:cNvPr id="3" name="Content Placeholder 2"/>
-          <p:cNvSpPr>
-            <a:spLocks noGrp="1"/>
-          </p:cNvSpPr>
-          <p:nvPr>
-            <p:ph idx="1"/>
-          </p:nvPr>
-        </p:nvSpPr>
-        <p:spPr>
-          <a:xfrm>
-            <a:off x="457200" y="1600201"/>
-            <a:ext cx="8229600" cy="2286000"/>
-          </a:xfrm>
-        </p:spPr>
-        <p:txBody>
-          <a:bodyPr>
-            <a:normAutofit/>
-          </a:bodyPr>
-          <a:lstStyle/>
-          <a:p>
-            <a:r>
-              <a:rPr lang="en-US" sz="2400" dirty="0" smtClean="0"/>
-              <a:t>The voltage supplied to the customer is generally maintained within the limits set by ANCI C84.1, 120V +/-5%.</a:t>
-            </a:r>
-          </a:p>
-          <a:p>
-            <a:r>
-              <a:rPr lang="en-US" sz="2400" dirty="0" smtClean="0"/>
-              <a:t>This is done by setting the voltage at the “head” of the feeder at the high end of the band, to ensure that the voltage drop at peak load does not exceed limits.</a:t>
-            </a:r>
-            <a:endParaRPr lang="en-US" sz="2400" dirty="0"/>
-          </a:p>
-        </p:txBody>
-      </p:sp>
-      <p:pic>
-        <p:nvPicPr>
-          <p:cNvPr id="1027" name="Picture 3"/>
-          <p:cNvPicPr>
-            <a:picLocks noChangeAspect="1" noChangeArrowheads="1"/>
-          </p:cNvPicPr>
-          <p:nvPr/>
-        </p:nvPicPr>
-        <p:blipFill>
-          <a:blip r:embed="rId2" cstate="print"/>
-          <a:srcRect/>
-          <a:stretch>
-            <a:fillRect/>
-          </a:stretch>
-        </p:blipFill>
-        <p:spPr bwMode="auto">
-          <a:xfrm>
-            <a:off x="1524000" y="3962400"/>
-            <a:ext cx="5705475" cy="2419350"/>
-          </a:xfrm>
-          <a:prstGeom prst="rect">
-            <a:avLst/>
-          </a:prstGeom>
-          <a:noFill/>
-          <a:ln w="9525">
-            <a:noFill/>
-            <a:miter lim="800000"/>
-            <a:headEnd/>
-            <a:tailEnd/>
-          </a:ln>
-        </p:spPr>
-      </p:pic>
-      <p:sp>
-        <p:nvSpPr>
-          <p:cNvPr id="4" name="Slide Number Placeholder 3"/>
-          <p:cNvSpPr>
-            <a:spLocks noGrp="1"/>
-          </p:cNvSpPr>
-          <p:nvPr>
-            <p:ph type="sldNum" sz="quarter" idx="12"/>
-          </p:nvPr>
-        </p:nvSpPr>
-        <p:spPr/>
-        <p:txBody>
-          <a:bodyPr/>
-          <a:lstStyle/>
-          <a:p>
-            <a:fld id="{B6F15528-21DE-4FAA-801E-634DDDAF4B2B}" type="slidenum">
-              <a:rPr lang="en-US" smtClean="0"/>
-              <a:pPr/>
-              <a:t>3</a:t>
-            </a:fld>
-            <a:endParaRPr lang="en-US"/>
-          </a:p>
-        </p:txBody>
-      </p:sp>
-    </p:spTree>
-  </p:cSld>
-  <p:clrMapOvr>
-    <a:masterClrMapping/>
-  </p:clrMapOvr>
-  <p:timing>
-    <p:tnLst>
-      <p:par>
-        <p:cTn id="1" dur="indefinite" restart="never" nodeType="tmRoot"/>
-      </p:par>
-    </p:tnLst>
-  </p:timing>
-</p:sld>
-</file>
-
-<file path=ppt/slides/slide30.xml><?xml version="1.0" encoding="utf-8"?>
+<file path=ppt/slides/slide34.xml><?xml version="1.0" encoding="utf-8"?>
 <p:sld xmlns:a="http://schemas.openxmlformats.org/drawingml/2006/main" xmlns:r="http://schemas.openxmlformats.org/officeDocument/2006/relationships" xmlns:p="http://schemas.openxmlformats.org/presentationml/2006/main">
   <p:cSld>
     <p:spTree>
@@ -8900,7 +11089,7 @@
             <a:fld id="{B6F15528-21DE-4FAA-801E-634DDDAF4B2B}" type="slidenum">
               <a:rPr lang="en-US" smtClean="0"/>
               <a:pPr/>
-              <a:t>30</a:t>
+              <a:t>34</a:t>
             </a:fld>
             <a:endParaRPr lang="en-US"/>
           </a:p>
@@ -9124,7 +11313,7 @@
 </p:sld>
 </file>
 
-<file path=ppt/slides/slide31.xml><?xml version="1.0" encoding="utf-8"?>
+<file path=ppt/slides/slide35.xml><?xml version="1.0" encoding="utf-8"?>
 <p:sld xmlns:a="http://schemas.openxmlformats.org/drawingml/2006/main" xmlns:r="http://schemas.openxmlformats.org/officeDocument/2006/relationships" xmlns:p="http://schemas.openxmlformats.org/presentationml/2006/main">
   <p:cSld>
     <p:spTree>
@@ -9282,7 +11471,7 @@
             <a:fld id="{B6F15528-21DE-4FAA-801E-634DDDAF4B2B}" type="slidenum">
               <a:rPr lang="en-US" smtClean="0"/>
               <a:pPr/>
-              <a:t>31</a:t>
+              <a:t>35</a:t>
             </a:fld>
             <a:endParaRPr lang="en-US"/>
           </a:p>
@@ -10089,11 +12278,7 @@
           <a:p>
             <a:r>
               <a:rPr lang="en-US" dirty="0" smtClean="0"/>
-              <a:t>Volt-VAR Optimization, and the associated global optimum(s), exists </a:t>
-            </a:r>
-            <a:r>
-              <a:rPr lang="en-US" dirty="0" smtClean="0"/>
-              <a:t>in many forms.</a:t>
+              <a:t>Volt-VAR Optimization, and the associated global optimum(s), exists in many forms.</a:t>
             </a:r>
           </a:p>
           <a:p>
@@ -10102,11 +12287,7 @@
           <a:p>
             <a:r>
               <a:rPr lang="en-US" dirty="0" smtClean="0"/>
-              <a:t>The general principle is to control the voltage and reactive power on a distribution feeder so that load can be managed</a:t>
-            </a:r>
-            <a:r>
-              <a:rPr lang="en-US" dirty="0" smtClean="0"/>
-              <a:t>.</a:t>
+              <a:t>The general principle is to control the voltage and reactive power on a distribution feeder so that load can be managed.</a:t>
             </a:r>
           </a:p>
           <a:p>
@@ -10117,7 +12298,6 @@
               <a:rPr lang="en-US" dirty="0" smtClean="0"/>
               <a:t>One example of VVO:</a:t>
             </a:r>
-            <a:endParaRPr lang="en-US" dirty="0" smtClean="0"/>
           </a:p>
           <a:p>
             <a:pPr lvl="1"/>

</xml_diff>

<commit_message>
Fixed slide in Module 6 (ANSI vs. ANCI).  Addition of homework for module 6.
</commit_message>
<xml_diff>
--- a/University of Washington Class/Module 6 - Volt-VAR Optimization.pptx
+++ b/University of Washington Class/Module 6 - Volt-VAR Optimization.pptx
@@ -227,7 +227,7 @@
             <a:fld id="{30456DE2-1550-4DE2-8C7A-8D9992B45402}" type="datetimeFigureOut">
               <a:rPr lang="en-US" smtClean="0"/>
               <a:pPr/>
-              <a:t>11/29/2011</a:t>
+              <a:t>12/1/2011</a:t>
             </a:fld>
             <a:endParaRPr lang="en-US"/>
           </a:p>
@@ -679,7 +679,7 @@
           <a:p>
             <a:fld id="{6519E7BD-BA7F-4B81-A129-70E95F6DF237}" type="datetime1">
               <a:rPr lang="en-US" smtClean="0"/>
-              <a:t>11/29/2011</a:t>
+              <a:t>12/1/2011</a:t>
             </a:fld>
             <a:endParaRPr lang="en-US"/>
           </a:p>
@@ -948,7 +948,7 @@
           <a:p>
             <a:fld id="{ED390F24-4C39-4969-AF25-1239CA7FF3DE}" type="datetime1">
               <a:rPr lang="en-US" smtClean="0"/>
-              <a:t>11/29/2011</a:t>
+              <a:t>12/1/2011</a:t>
             </a:fld>
             <a:endParaRPr lang="en-US"/>
           </a:p>
@@ -1124,7 +1124,7 @@
           <a:p>
             <a:fld id="{C34E4A9B-9920-4234-AEB4-5607845725C0}" type="datetime1">
               <a:rPr lang="en-US" smtClean="0"/>
-              <a:t>11/29/2011</a:t>
+              <a:t>12/1/2011</a:t>
             </a:fld>
             <a:endParaRPr lang="en-US"/>
           </a:p>
@@ -1290,7 +1290,7 @@
           <a:p>
             <a:fld id="{4EB4F7BD-B02C-4562-9C64-672E469C9760}" type="datetime1">
               <a:rPr lang="en-US" smtClean="0"/>
-              <a:t>11/29/2011</a:t>
+              <a:t>12/1/2011</a:t>
             </a:fld>
             <a:endParaRPr lang="en-US" dirty="0"/>
           </a:p>
@@ -1532,7 +1532,7 @@
           <a:p>
             <a:fld id="{3E4D7124-CB27-4A90-BE7A-D1E0ABDB04C5}" type="datetime1">
               <a:rPr lang="en-US" smtClean="0"/>
-              <a:t>11/29/2011</a:t>
+              <a:t>12/1/2011</a:t>
             </a:fld>
             <a:endParaRPr lang="en-US"/>
           </a:p>
@@ -1816,7 +1816,7 @@
           <a:p>
             <a:fld id="{CA5669D2-688D-4573-B135-CCF7B5BC920F}" type="datetime1">
               <a:rPr lang="en-US" smtClean="0"/>
-              <a:t>11/29/2011</a:t>
+              <a:t>12/1/2011</a:t>
             </a:fld>
             <a:endParaRPr lang="en-US"/>
           </a:p>
@@ -2234,7 +2234,7 @@
           <a:p>
             <a:fld id="{30FFD320-1AEF-4D74-B2A0-E24E0249BEC1}" type="datetime1">
               <a:rPr lang="en-US" smtClean="0"/>
-              <a:t>11/29/2011</a:t>
+              <a:t>12/1/2011</a:t>
             </a:fld>
             <a:endParaRPr lang="en-US"/>
           </a:p>
@@ -2348,7 +2348,7 @@
           <a:p>
             <a:fld id="{BB15CDF8-705B-4637-AE33-67119B125F3D}" type="datetime1">
               <a:rPr lang="en-US" smtClean="0"/>
-              <a:t>11/29/2011</a:t>
+              <a:t>12/1/2011</a:t>
             </a:fld>
             <a:endParaRPr lang="en-US"/>
           </a:p>
@@ -2439,7 +2439,7 @@
           <a:p>
             <a:fld id="{0A6B3399-1807-4B55-9AC1-576C7016240D}" type="datetime1">
               <a:rPr lang="en-US" smtClean="0"/>
-              <a:t>11/29/2011</a:t>
+              <a:t>12/1/2011</a:t>
             </a:fld>
             <a:endParaRPr lang="en-US"/>
           </a:p>
@@ -2712,7 +2712,7 @@
           <a:p>
             <a:fld id="{AABB4BFE-5A26-46CE-87FE-B0B3FFEF3620}" type="datetime1">
               <a:rPr lang="en-US" smtClean="0"/>
-              <a:t>11/29/2011</a:t>
+              <a:t>12/1/2011</a:t>
             </a:fld>
             <a:endParaRPr lang="en-US"/>
           </a:p>
@@ -2961,7 +2961,7 @@
           <a:p>
             <a:fld id="{215422AA-CF2D-439D-80CB-DD01E7ACDE11}" type="datetime1">
               <a:rPr lang="en-US" smtClean="0"/>
-              <a:t>11/29/2011</a:t>
+              <a:t>12/1/2011</a:t>
             </a:fld>
             <a:endParaRPr lang="en-US"/>
           </a:p>
@@ -3174,7 +3174,7 @@
           <a:p>
             <a:fld id="{1129FE10-ACD9-430D-B7E5-C58C92EFD52A}" type="datetime1">
               <a:rPr lang="en-US" smtClean="0"/>
-              <a:t>11/29/2011</a:t>
+              <a:t>12/1/2011</a:t>
             </a:fld>
             <a:endParaRPr lang="en-US" dirty="0"/>
           </a:p>
@@ -4612,7 +4612,7 @@
           <a:graphicData uri="http://schemas.openxmlformats.org/presentationml/2006/ole">
             <mc:AlternateContent xmlns:mc="http://schemas.openxmlformats.org/markup-compatibility/2006">
               <mc:Choice xmlns:v="urn:schemas-microsoft-com:vml" Requires="v">
-                <p:oleObj spid="_x0000_s1049" name="Equation" r:id="rId3" imgW="1269720" imgH="241200" progId="Equation.3">
+                <p:oleObj spid="_x0000_s1053" name="Equation" r:id="rId3" imgW="1269720" imgH="241200" progId="Equation.3">
                   <p:embed/>
                 </p:oleObj>
               </mc:Choice>
@@ -4669,7 +4669,7 @@
           <a:graphicData uri="http://schemas.openxmlformats.org/presentationml/2006/ole">
             <mc:AlternateContent xmlns:mc="http://schemas.openxmlformats.org/markup-compatibility/2006">
               <mc:Choice xmlns:v="urn:schemas-microsoft-com:vml" Requires="v">
-                <p:oleObj spid="_x0000_s1050" name="Equation" r:id="rId5" imgW="1244520" imgH="241200" progId="Equation.3">
+                <p:oleObj spid="_x0000_s1054" name="Equation" r:id="rId5" imgW="1244520" imgH="241200" progId="Equation.3">
                   <p:embed/>
                 </p:oleObj>
               </mc:Choice>
@@ -4994,7 +4994,7 @@
           <a:graphicData uri="http://schemas.openxmlformats.org/presentationml/2006/ole">
             <mc:AlternateContent xmlns:mc="http://schemas.openxmlformats.org/markup-compatibility/2006">
               <mc:Choice xmlns:v="urn:schemas-microsoft-com:vml" Requires="v">
-                <p:oleObj spid="_x0000_s2085" name="Equation" r:id="rId3" imgW="1612800" imgH="241200" progId="Equation.3">
+                <p:oleObj spid="_x0000_s2091" name="Equation" r:id="rId3" imgW="1612800" imgH="241200" progId="Equation.3">
                   <p:embed/>
                 </p:oleObj>
               </mc:Choice>
@@ -5051,7 +5051,7 @@
           <a:graphicData uri="http://schemas.openxmlformats.org/presentationml/2006/ole">
             <mc:AlternateContent xmlns:mc="http://schemas.openxmlformats.org/markup-compatibility/2006">
               <mc:Choice xmlns:v="urn:schemas-microsoft-com:vml" Requires="v">
-                <p:oleObj spid="_x0000_s2086" name="Equation" r:id="rId5" imgW="1091880" imgH="241200" progId="Equation.3">
+                <p:oleObj spid="_x0000_s2092" name="Equation" r:id="rId5" imgW="1091880" imgH="241200" progId="Equation.3">
                   <p:embed/>
                 </p:oleObj>
               </mc:Choice>
@@ -5108,7 +5108,7 @@
           <a:graphicData uri="http://schemas.openxmlformats.org/presentationml/2006/ole">
             <mc:AlternateContent xmlns:mc="http://schemas.openxmlformats.org/markup-compatibility/2006">
               <mc:Choice xmlns:v="urn:schemas-microsoft-com:vml" Requires="v">
-                <p:oleObj spid="_x0000_s2087" name="Equation" r:id="rId7" imgW="1091880" imgH="241200" progId="Equation.3">
+                <p:oleObj spid="_x0000_s2093" name="Equation" r:id="rId7" imgW="1091880" imgH="241200" progId="Equation.3">
                   <p:embed/>
                 </p:oleObj>
               </mc:Choice>
@@ -5407,7 +5407,7 @@
           <a:graphicData uri="http://schemas.openxmlformats.org/presentationml/2006/ole">
             <mc:AlternateContent xmlns:mc="http://schemas.openxmlformats.org/markup-compatibility/2006">
               <mc:Choice xmlns:v="urn:schemas-microsoft-com:vml" Requires="v">
-                <p:oleObj spid="_x0000_s3136" name="Equation" r:id="rId3" imgW="1841400" imgH="241200" progId="Equation.3">
+                <p:oleObj spid="_x0000_s3146" name="Equation" r:id="rId3" imgW="1841400" imgH="241200" progId="Equation.3">
                   <p:embed/>
                 </p:oleObj>
               </mc:Choice>
@@ -5464,7 +5464,7 @@
           <a:graphicData uri="http://schemas.openxmlformats.org/presentationml/2006/ole">
             <mc:AlternateContent xmlns:mc="http://schemas.openxmlformats.org/markup-compatibility/2006">
               <mc:Choice xmlns:v="urn:schemas-microsoft-com:vml" Requires="v">
-                <p:oleObj spid="_x0000_s3137" name="Equation" r:id="rId5" imgW="1638000" imgH="241200" progId="Equation.3">
+                <p:oleObj spid="_x0000_s3147" name="Equation" r:id="rId5" imgW="1638000" imgH="241200" progId="Equation.3">
                   <p:embed/>
                 </p:oleObj>
               </mc:Choice>
@@ -5547,7 +5547,7 @@
           <a:graphicData uri="http://schemas.openxmlformats.org/presentationml/2006/ole">
             <mc:AlternateContent xmlns:mc="http://schemas.openxmlformats.org/markup-compatibility/2006">
               <mc:Choice xmlns:v="urn:schemas-microsoft-com:vml" Requires="v">
-                <p:oleObj spid="_x0000_s3138" name="Equation" r:id="rId7" imgW="2984400" imgH="241200" progId="Equation.3">
+                <p:oleObj spid="_x0000_s3148" name="Equation" r:id="rId7" imgW="2984400" imgH="241200" progId="Equation.3">
                   <p:embed/>
                 </p:oleObj>
               </mc:Choice>
@@ -5604,7 +5604,7 @@
           <a:graphicData uri="http://schemas.openxmlformats.org/presentationml/2006/ole">
             <mc:AlternateContent xmlns:mc="http://schemas.openxmlformats.org/markup-compatibility/2006">
               <mc:Choice xmlns:v="urn:schemas-microsoft-com:vml" Requires="v">
-                <p:oleObj spid="_x0000_s3139" name="Equation" r:id="rId9" imgW="3022560" imgH="241200" progId="Equation.3">
+                <p:oleObj spid="_x0000_s3149" name="Equation" r:id="rId9" imgW="3022560" imgH="241200" progId="Equation.3">
                   <p:embed/>
                 </p:oleObj>
               </mc:Choice>
@@ -5687,7 +5687,7 @@
           <a:graphicData uri="http://schemas.openxmlformats.org/presentationml/2006/ole">
             <mc:AlternateContent xmlns:mc="http://schemas.openxmlformats.org/markup-compatibility/2006">
               <mc:Choice xmlns:v="urn:schemas-microsoft-com:vml" Requires="v">
-                <p:oleObj spid="_x0000_s3140" name="Equation" r:id="rId11" imgW="2577960" imgH="241200" progId="Equation.3">
+                <p:oleObj spid="_x0000_s3150" name="Equation" r:id="rId11" imgW="2577960" imgH="241200" progId="Equation.3">
                   <p:embed/>
                 </p:oleObj>
               </mc:Choice>
@@ -6163,7 +6163,7 @@
           <a:graphicData uri="http://schemas.openxmlformats.org/presentationml/2006/ole">
             <mc:AlternateContent xmlns:mc="http://schemas.openxmlformats.org/markup-compatibility/2006">
               <mc:Choice xmlns:v="urn:schemas-microsoft-com:vml" Requires="v">
-                <p:oleObj spid="_x0000_s5131" name="Equation" r:id="rId3" imgW="1307880" imgH="469800" progId="Equation.3">
+                <p:oleObj spid="_x0000_s5133" name="Equation" r:id="rId3" imgW="1307880" imgH="469800" progId="Equation.3">
                   <p:embed/>
                 </p:oleObj>
               </mc:Choice>
@@ -6427,15 +6427,7 @@
             </a:r>
             <a:r>
               <a:rPr lang="en-US" dirty="0" smtClean="0"/>
-              <a:t>	</a:t>
-            </a:r>
-            <a:r>
-              <a:rPr lang="en-US" dirty="0" smtClean="0"/>
-              <a:t>ratio constants </a:t>
-            </a:r>
-            <a:r>
-              <a:rPr lang="en-US" dirty="0" smtClean="0"/>
-              <a:t>– create hysteresis-like condition</a:t>
+              <a:t>	ratio constants – create hysteresis-like condition</a:t>
             </a:r>
           </a:p>
           <a:p>
@@ -6496,7 +6488,7 @@
           <a:graphicData uri="http://schemas.openxmlformats.org/presentationml/2006/ole">
             <mc:AlternateContent xmlns:mc="http://schemas.openxmlformats.org/markup-compatibility/2006">
               <mc:Choice xmlns:v="urn:schemas-microsoft-com:vml" Requires="v">
-                <p:oleObj spid="_x0000_s6169" name="Equation" r:id="rId3" imgW="850680" imgH="228600" progId="Equation.3">
+                <p:oleObj spid="_x0000_s6177" name="Equation" r:id="rId3" imgW="850680" imgH="228600" progId="Equation.3">
                   <p:embed/>
                 </p:oleObj>
               </mc:Choice>
@@ -6553,7 +6545,7 @@
           <a:graphicData uri="http://schemas.openxmlformats.org/presentationml/2006/ole">
             <mc:AlternateContent xmlns:mc="http://schemas.openxmlformats.org/markup-compatibility/2006">
               <mc:Choice xmlns:v="urn:schemas-microsoft-com:vml" Requires="v">
-                <p:oleObj spid="_x0000_s6170" name="Equation" r:id="rId5" imgW="1193760" imgH="241200" progId="Equation.3">
+                <p:oleObj spid="_x0000_s6178" name="Equation" r:id="rId5" imgW="1193760" imgH="241200" progId="Equation.3">
                   <p:embed/>
                 </p:oleObj>
               </mc:Choice>
@@ -6610,7 +6602,7 @@
           <a:graphicData uri="http://schemas.openxmlformats.org/presentationml/2006/ole">
             <mc:AlternateContent xmlns:mc="http://schemas.openxmlformats.org/markup-compatibility/2006">
               <mc:Choice xmlns:v="urn:schemas-microsoft-com:vml" Requires="v">
-                <p:oleObj spid="_x0000_s6171" name="Equation" r:id="rId7" imgW="1180800" imgH="241200" progId="Equation.3">
+                <p:oleObj spid="_x0000_s6179" name="Equation" r:id="rId7" imgW="1180800" imgH="241200" progId="Equation.3">
                   <p:embed/>
                 </p:oleObj>
               </mc:Choice>
@@ -6693,7 +6685,7 @@
           <a:graphicData uri="http://schemas.openxmlformats.org/presentationml/2006/ole">
             <mc:AlternateContent xmlns:mc="http://schemas.openxmlformats.org/markup-compatibility/2006">
               <mc:Choice xmlns:v="urn:schemas-microsoft-com:vml" Requires="v">
-                <p:oleObj spid="_x0000_s6172" name="Equation" r:id="rId9" imgW="1346040" imgH="228600" progId="Equation.3">
+                <p:oleObj spid="_x0000_s6180" name="Equation" r:id="rId9" imgW="1346040" imgH="228600" progId="Equation.3">
                   <p:embed/>
                 </p:oleObj>
               </mc:Choice>
@@ -7151,7 +7143,7 @@
           <a:graphicData uri="http://schemas.openxmlformats.org/presentationml/2006/ole">
             <mc:AlternateContent xmlns:mc="http://schemas.openxmlformats.org/markup-compatibility/2006">
               <mc:Choice xmlns:v="urn:schemas-microsoft-com:vml" Requires="v">
-                <p:oleObj spid="_x0000_s7180" name="Equation" r:id="rId3" imgW="863280" imgH="241200" progId="Equation.3">
+                <p:oleObj spid="_x0000_s7184" name="Equation" r:id="rId3" imgW="863280" imgH="241200" progId="Equation.3">
                   <p:embed/>
                 </p:oleObj>
               </mc:Choice>
@@ -7208,7 +7200,7 @@
           <a:graphicData uri="http://schemas.openxmlformats.org/presentationml/2006/ole">
             <mc:AlternateContent xmlns:mc="http://schemas.openxmlformats.org/markup-compatibility/2006">
               <mc:Choice xmlns:v="urn:schemas-microsoft-com:vml" Requires="v">
-                <p:oleObj spid="_x0000_s7181" name="Equation" r:id="rId5" imgW="838080" imgH="241200" progId="Equation.3">
+                <p:oleObj spid="_x0000_s7185" name="Equation" r:id="rId5" imgW="838080" imgH="241200" progId="Equation.3">
                   <p:embed/>
                 </p:oleObj>
               </mc:Choice>
@@ -9292,7 +9284,15 @@
           <a:p>
             <a:r>
               <a:rPr lang="en-US" sz="2400" dirty="0" smtClean="0"/>
-              <a:t>The voltage supplied to the customer is generally maintained within the limits set by ANCI C84.1, 120V +/-5%.</a:t>
+              <a:t>The voltage supplied to the customer is generally maintained within the limits set by </a:t>
+            </a:r>
+            <a:r>
+              <a:rPr lang="en-US" sz="2400" dirty="0" smtClean="0"/>
+              <a:t>ANSI </a:t>
+            </a:r>
+            <a:r>
+              <a:rPr lang="en-US" sz="2400" dirty="0" smtClean="0"/>
+              <a:t>C84.1, 120V +/-5%.</a:t>
             </a:r>
           </a:p>
           <a:p>
@@ -11990,7 +11990,11 @@
           <a:p>
             <a:r>
               <a:rPr lang="en-US" dirty="0" smtClean="0"/>
-              <a:t>ANCI C84.1</a:t>
+              <a:t>ANSI </a:t>
+            </a:r>
+            <a:r>
+              <a:rPr lang="en-US" dirty="0" smtClean="0"/>
+              <a:t>C84.1</a:t>
             </a:r>
             <a:endParaRPr lang="en-US" dirty="0"/>
           </a:p>

</xml_diff>

<commit_message>
Updates to fix typos in Volt-VAR Example
</commit_message>
<xml_diff>
--- a/University of Washington Class/Module 6 - Volt-VAR Optimization.pptx
+++ b/University of Washington Class/Module 6 - Volt-VAR Optimization.pptx
@@ -227,7 +227,7 @@
             <a:fld id="{30456DE2-1550-4DE2-8C7A-8D9992B45402}" type="datetimeFigureOut">
               <a:rPr lang="en-US" smtClean="0"/>
               <a:pPr/>
-              <a:t>12/1/2011</a:t>
+              <a:t>12/20/2011</a:t>
             </a:fld>
             <a:endParaRPr lang="en-US"/>
           </a:p>
@@ -679,7 +679,7 @@
           <a:p>
             <a:fld id="{6519E7BD-BA7F-4B81-A129-70E95F6DF237}" type="datetime1">
               <a:rPr lang="en-US" smtClean="0"/>
-              <a:t>12/1/2011</a:t>
+              <a:t>12/20/2011</a:t>
             </a:fld>
             <a:endParaRPr lang="en-US"/>
           </a:p>
@@ -948,7 +948,7 @@
           <a:p>
             <a:fld id="{ED390F24-4C39-4969-AF25-1239CA7FF3DE}" type="datetime1">
               <a:rPr lang="en-US" smtClean="0"/>
-              <a:t>12/1/2011</a:t>
+              <a:t>12/20/2011</a:t>
             </a:fld>
             <a:endParaRPr lang="en-US"/>
           </a:p>
@@ -1124,7 +1124,7 @@
           <a:p>
             <a:fld id="{C34E4A9B-9920-4234-AEB4-5607845725C0}" type="datetime1">
               <a:rPr lang="en-US" smtClean="0"/>
-              <a:t>12/1/2011</a:t>
+              <a:t>12/20/2011</a:t>
             </a:fld>
             <a:endParaRPr lang="en-US"/>
           </a:p>
@@ -1290,7 +1290,7 @@
           <a:p>
             <a:fld id="{4EB4F7BD-B02C-4562-9C64-672E469C9760}" type="datetime1">
               <a:rPr lang="en-US" smtClean="0"/>
-              <a:t>12/1/2011</a:t>
+              <a:t>12/20/2011</a:t>
             </a:fld>
             <a:endParaRPr lang="en-US" dirty="0"/>
           </a:p>
@@ -1532,7 +1532,7 @@
           <a:p>
             <a:fld id="{3E4D7124-CB27-4A90-BE7A-D1E0ABDB04C5}" type="datetime1">
               <a:rPr lang="en-US" smtClean="0"/>
-              <a:t>12/1/2011</a:t>
+              <a:t>12/20/2011</a:t>
             </a:fld>
             <a:endParaRPr lang="en-US"/>
           </a:p>
@@ -1816,7 +1816,7 @@
           <a:p>
             <a:fld id="{CA5669D2-688D-4573-B135-CCF7B5BC920F}" type="datetime1">
               <a:rPr lang="en-US" smtClean="0"/>
-              <a:t>12/1/2011</a:t>
+              <a:t>12/20/2011</a:t>
             </a:fld>
             <a:endParaRPr lang="en-US"/>
           </a:p>
@@ -2234,7 +2234,7 @@
           <a:p>
             <a:fld id="{30FFD320-1AEF-4D74-B2A0-E24E0249BEC1}" type="datetime1">
               <a:rPr lang="en-US" smtClean="0"/>
-              <a:t>12/1/2011</a:t>
+              <a:t>12/20/2011</a:t>
             </a:fld>
             <a:endParaRPr lang="en-US"/>
           </a:p>
@@ -2348,7 +2348,7 @@
           <a:p>
             <a:fld id="{BB15CDF8-705B-4637-AE33-67119B125F3D}" type="datetime1">
               <a:rPr lang="en-US" smtClean="0"/>
-              <a:t>12/1/2011</a:t>
+              <a:t>12/20/2011</a:t>
             </a:fld>
             <a:endParaRPr lang="en-US"/>
           </a:p>
@@ -2439,7 +2439,7 @@
           <a:p>
             <a:fld id="{0A6B3399-1807-4B55-9AC1-576C7016240D}" type="datetime1">
               <a:rPr lang="en-US" smtClean="0"/>
-              <a:t>12/1/2011</a:t>
+              <a:t>12/20/2011</a:t>
             </a:fld>
             <a:endParaRPr lang="en-US"/>
           </a:p>
@@ -2712,7 +2712,7 @@
           <a:p>
             <a:fld id="{AABB4BFE-5A26-46CE-87FE-B0B3FFEF3620}" type="datetime1">
               <a:rPr lang="en-US" smtClean="0"/>
-              <a:t>12/1/2011</a:t>
+              <a:t>12/20/2011</a:t>
             </a:fld>
             <a:endParaRPr lang="en-US"/>
           </a:p>
@@ -2961,7 +2961,7 @@
           <a:p>
             <a:fld id="{215422AA-CF2D-439D-80CB-DD01E7ACDE11}" type="datetime1">
               <a:rPr lang="en-US" smtClean="0"/>
-              <a:t>12/1/2011</a:t>
+              <a:t>12/20/2011</a:t>
             </a:fld>
             <a:endParaRPr lang="en-US"/>
           </a:p>
@@ -3174,7 +3174,7 @@
           <a:p>
             <a:fld id="{1129FE10-ACD9-430D-B7E5-C58C92EFD52A}" type="datetime1">
               <a:rPr lang="en-US" smtClean="0"/>
-              <a:t>12/1/2011</a:t>
+              <a:t>12/20/2011</a:t>
             </a:fld>
             <a:endParaRPr lang="en-US" dirty="0"/>
           </a:p>
@@ -4148,6 +4148,13 @@
   <p:clrMapOvr>
     <a:masterClrMapping/>
   </p:clrMapOvr>
+  <p:timing>
+    <p:tnLst>
+      <p:par>
+        <p:cTn id="1" dur="indefinite" restart="never" nodeType="tmRoot"/>
+      </p:par>
+    </p:tnLst>
+  </p:timing>
 </p:sld>
 </file>
 
@@ -4316,6 +4323,13 @@
   <p:clrMapOvr>
     <a:masterClrMapping/>
   </p:clrMapOvr>
+  <p:timing>
+    <p:tnLst>
+      <p:par>
+        <p:cTn id="1" dur="indefinite" restart="never" nodeType="tmRoot"/>
+      </p:par>
+    </p:tnLst>
+  </p:timing>
 </p:sld>
 </file>
 
@@ -4612,7 +4626,7 @@
           <a:graphicData uri="http://schemas.openxmlformats.org/presentationml/2006/ole">
             <mc:AlternateContent xmlns:mc="http://schemas.openxmlformats.org/markup-compatibility/2006">
               <mc:Choice xmlns:v="urn:schemas-microsoft-com:vml" Requires="v">
-                <p:oleObj spid="_x0000_s1053" name="Equation" r:id="rId3" imgW="1269720" imgH="241200" progId="Equation.3">
+                <p:oleObj spid="_x0000_s1061" name="Equation" r:id="rId3" imgW="1269720" imgH="241200" progId="Equation.3">
                   <p:embed/>
                 </p:oleObj>
               </mc:Choice>
@@ -4669,7 +4683,7 @@
           <a:graphicData uri="http://schemas.openxmlformats.org/presentationml/2006/ole">
             <mc:AlternateContent xmlns:mc="http://schemas.openxmlformats.org/markup-compatibility/2006">
               <mc:Choice xmlns:v="urn:schemas-microsoft-com:vml" Requires="v">
-                <p:oleObj spid="_x0000_s1054" name="Equation" r:id="rId5" imgW="1244520" imgH="241200" progId="Equation.3">
+                <p:oleObj spid="_x0000_s1062" name="Equation" r:id="rId5" imgW="1244520" imgH="241200" progId="Equation.3">
                   <p:embed/>
                 </p:oleObj>
               </mc:Choice>
@@ -4714,6 +4728,13 @@
   <p:clrMapOvr>
     <a:masterClrMapping/>
   </p:clrMapOvr>
+  <p:timing>
+    <p:tnLst>
+      <p:par>
+        <p:cTn id="1" dur="indefinite" restart="never" nodeType="tmRoot"/>
+      </p:par>
+    </p:tnLst>
+  </p:timing>
 </p:sld>
 </file>
 
@@ -4994,7 +5015,7 @@
           <a:graphicData uri="http://schemas.openxmlformats.org/presentationml/2006/ole">
             <mc:AlternateContent xmlns:mc="http://schemas.openxmlformats.org/markup-compatibility/2006">
               <mc:Choice xmlns:v="urn:schemas-microsoft-com:vml" Requires="v">
-                <p:oleObj spid="_x0000_s2091" name="Equation" r:id="rId3" imgW="1612800" imgH="241200" progId="Equation.3">
+                <p:oleObj spid="_x0000_s2103" name="Equation" r:id="rId3" imgW="1612800" imgH="241200" progId="Equation.3">
                   <p:embed/>
                 </p:oleObj>
               </mc:Choice>
@@ -5051,7 +5072,7 @@
           <a:graphicData uri="http://schemas.openxmlformats.org/presentationml/2006/ole">
             <mc:AlternateContent xmlns:mc="http://schemas.openxmlformats.org/markup-compatibility/2006">
               <mc:Choice xmlns:v="urn:schemas-microsoft-com:vml" Requires="v">
-                <p:oleObj spid="_x0000_s2092" name="Equation" r:id="rId5" imgW="1091880" imgH="241200" progId="Equation.3">
+                <p:oleObj spid="_x0000_s2104" name="Equation" r:id="rId5" imgW="1091880" imgH="241200" progId="Equation.3">
                   <p:embed/>
                 </p:oleObj>
               </mc:Choice>
@@ -5108,7 +5129,7 @@
           <a:graphicData uri="http://schemas.openxmlformats.org/presentationml/2006/ole">
             <mc:AlternateContent xmlns:mc="http://schemas.openxmlformats.org/markup-compatibility/2006">
               <mc:Choice xmlns:v="urn:schemas-microsoft-com:vml" Requires="v">
-                <p:oleObj spid="_x0000_s2093" name="Equation" r:id="rId7" imgW="1091880" imgH="241200" progId="Equation.3">
+                <p:oleObj spid="_x0000_s2105" name="Equation" r:id="rId7" imgW="1091880" imgH="241200" progId="Equation.3">
                   <p:embed/>
                 </p:oleObj>
               </mc:Choice>
@@ -5179,6 +5200,13 @@
   <p:clrMapOvr>
     <a:masterClrMapping/>
   </p:clrMapOvr>
+  <p:timing>
+    <p:tnLst>
+      <p:par>
+        <p:cTn id="1" dur="indefinite" restart="never" nodeType="tmRoot"/>
+      </p:par>
+    </p:tnLst>
+  </p:timing>
 </p:sld>
 </file>
 
@@ -5407,7 +5435,7 @@
           <a:graphicData uri="http://schemas.openxmlformats.org/presentationml/2006/ole">
             <mc:AlternateContent xmlns:mc="http://schemas.openxmlformats.org/markup-compatibility/2006">
               <mc:Choice xmlns:v="urn:schemas-microsoft-com:vml" Requires="v">
-                <p:oleObj spid="_x0000_s3146" name="Equation" r:id="rId3" imgW="1841400" imgH="241200" progId="Equation.3">
+                <p:oleObj spid="_x0000_s3166" name="Equation" r:id="rId3" imgW="1841400" imgH="241200" progId="Equation.3">
                   <p:embed/>
                 </p:oleObj>
               </mc:Choice>
@@ -5464,7 +5492,7 @@
           <a:graphicData uri="http://schemas.openxmlformats.org/presentationml/2006/ole">
             <mc:AlternateContent xmlns:mc="http://schemas.openxmlformats.org/markup-compatibility/2006">
               <mc:Choice xmlns:v="urn:schemas-microsoft-com:vml" Requires="v">
-                <p:oleObj spid="_x0000_s3147" name="Equation" r:id="rId5" imgW="1638000" imgH="241200" progId="Equation.3">
+                <p:oleObj spid="_x0000_s3167" name="Equation" r:id="rId5" imgW="1638000" imgH="241200" progId="Equation.3">
                   <p:embed/>
                 </p:oleObj>
               </mc:Choice>
@@ -5547,7 +5575,7 @@
           <a:graphicData uri="http://schemas.openxmlformats.org/presentationml/2006/ole">
             <mc:AlternateContent xmlns:mc="http://schemas.openxmlformats.org/markup-compatibility/2006">
               <mc:Choice xmlns:v="urn:schemas-microsoft-com:vml" Requires="v">
-                <p:oleObj spid="_x0000_s3148" name="Equation" r:id="rId7" imgW="2984400" imgH="241200" progId="Equation.3">
+                <p:oleObj spid="_x0000_s3168" name="Equation" r:id="rId7" imgW="2984400" imgH="241200" progId="Equation.3">
                   <p:embed/>
                 </p:oleObj>
               </mc:Choice>
@@ -5604,7 +5632,7 @@
           <a:graphicData uri="http://schemas.openxmlformats.org/presentationml/2006/ole">
             <mc:AlternateContent xmlns:mc="http://schemas.openxmlformats.org/markup-compatibility/2006">
               <mc:Choice xmlns:v="urn:schemas-microsoft-com:vml" Requires="v">
-                <p:oleObj spid="_x0000_s3149" name="Equation" r:id="rId9" imgW="3022560" imgH="241200" progId="Equation.3">
+                <p:oleObj spid="_x0000_s3169" name="Equation" r:id="rId9" imgW="3022560" imgH="241200" progId="Equation.3">
                   <p:embed/>
                 </p:oleObj>
               </mc:Choice>
@@ -5687,7 +5715,7 @@
           <a:graphicData uri="http://schemas.openxmlformats.org/presentationml/2006/ole">
             <mc:AlternateContent xmlns:mc="http://schemas.openxmlformats.org/markup-compatibility/2006">
               <mc:Choice xmlns:v="urn:schemas-microsoft-com:vml" Requires="v">
-                <p:oleObj spid="_x0000_s3150" name="Equation" r:id="rId11" imgW="2577960" imgH="241200" progId="Equation.3">
+                <p:oleObj spid="_x0000_s3170" name="Equation" r:id="rId11" imgW="2577960" imgH="241200" progId="Equation.3">
                   <p:embed/>
                 </p:oleObj>
               </mc:Choice>
@@ -6163,7 +6191,7 @@
           <a:graphicData uri="http://schemas.openxmlformats.org/presentationml/2006/ole">
             <mc:AlternateContent xmlns:mc="http://schemas.openxmlformats.org/markup-compatibility/2006">
               <mc:Choice xmlns:v="urn:schemas-microsoft-com:vml" Requires="v">
-                <p:oleObj spid="_x0000_s5133" name="Equation" r:id="rId3" imgW="1307880" imgH="469800" progId="Equation.3">
+                <p:oleObj spid="_x0000_s5137" name="Equation" r:id="rId3" imgW="1307880" imgH="469800" progId="Equation.3">
                   <p:embed/>
                 </p:oleObj>
               </mc:Choice>
@@ -6362,7 +6390,7 @@
             </a:r>
             <a:r>
               <a:rPr lang="en-US" dirty="0" smtClean="0"/>
-              <a:t>Sort capacitors by size, smallest to largest, closest to farthest</a:t>
+              <a:t>Sort capacitors by size, largest to smallest, closest to farthest</a:t>
             </a:r>
           </a:p>
           <a:p>
@@ -6488,7 +6516,7 @@
           <a:graphicData uri="http://schemas.openxmlformats.org/presentationml/2006/ole">
             <mc:AlternateContent xmlns:mc="http://schemas.openxmlformats.org/markup-compatibility/2006">
               <mc:Choice xmlns:v="urn:schemas-microsoft-com:vml" Requires="v">
-                <p:oleObj spid="_x0000_s6177" name="Equation" r:id="rId3" imgW="850680" imgH="228600" progId="Equation.3">
+                <p:oleObj spid="_x0000_s6193" name="Equation" r:id="rId3" imgW="850680" imgH="228600" progId="Equation.3">
                   <p:embed/>
                 </p:oleObj>
               </mc:Choice>
@@ -6545,7 +6573,7 @@
           <a:graphicData uri="http://schemas.openxmlformats.org/presentationml/2006/ole">
             <mc:AlternateContent xmlns:mc="http://schemas.openxmlformats.org/markup-compatibility/2006">
               <mc:Choice xmlns:v="urn:schemas-microsoft-com:vml" Requires="v">
-                <p:oleObj spid="_x0000_s6178" name="Equation" r:id="rId5" imgW="1193760" imgH="241200" progId="Equation.3">
+                <p:oleObj spid="_x0000_s6194" name="Equation" r:id="rId5" imgW="1193760" imgH="241200" progId="Equation.3">
                   <p:embed/>
                 </p:oleObj>
               </mc:Choice>
@@ -6602,7 +6630,7 @@
           <a:graphicData uri="http://schemas.openxmlformats.org/presentationml/2006/ole">
             <mc:AlternateContent xmlns:mc="http://schemas.openxmlformats.org/markup-compatibility/2006">
               <mc:Choice xmlns:v="urn:schemas-microsoft-com:vml" Requires="v">
-                <p:oleObj spid="_x0000_s6179" name="Equation" r:id="rId7" imgW="1180800" imgH="241200" progId="Equation.3">
+                <p:oleObj spid="_x0000_s6195" name="Equation" r:id="rId7" imgW="1180800" imgH="241200" progId="Equation.3">
                   <p:embed/>
                 </p:oleObj>
               </mc:Choice>
@@ -6685,7 +6713,7 @@
           <a:graphicData uri="http://schemas.openxmlformats.org/presentationml/2006/ole">
             <mc:AlternateContent xmlns:mc="http://schemas.openxmlformats.org/markup-compatibility/2006">
               <mc:Choice xmlns:v="urn:schemas-microsoft-com:vml" Requires="v">
-                <p:oleObj spid="_x0000_s6180" name="Equation" r:id="rId9" imgW="1346040" imgH="228600" progId="Equation.3">
+                <p:oleObj spid="_x0000_s6196" name="Equation" r:id="rId9" imgW="1346040" imgH="228600" progId="Equation.3">
                   <p:embed/>
                 </p:oleObj>
               </mc:Choice>
@@ -7143,7 +7171,7 @@
           <a:graphicData uri="http://schemas.openxmlformats.org/presentationml/2006/ole">
             <mc:AlternateContent xmlns:mc="http://schemas.openxmlformats.org/markup-compatibility/2006">
               <mc:Choice xmlns:v="urn:schemas-microsoft-com:vml" Requires="v">
-                <p:oleObj spid="_x0000_s7184" name="Equation" r:id="rId3" imgW="863280" imgH="241200" progId="Equation.3">
+                <p:oleObj spid="_x0000_s7192" name="Equation" r:id="rId3" imgW="863280" imgH="241200" progId="Equation.3">
                   <p:embed/>
                 </p:oleObj>
               </mc:Choice>
@@ -7200,7 +7228,7 @@
           <a:graphicData uri="http://schemas.openxmlformats.org/presentationml/2006/ole">
             <mc:AlternateContent xmlns:mc="http://schemas.openxmlformats.org/markup-compatibility/2006">
               <mc:Choice xmlns:v="urn:schemas-microsoft-com:vml" Requires="v">
-                <p:oleObj spid="_x0000_s7185" name="Equation" r:id="rId5" imgW="838080" imgH="241200" progId="Equation.3">
+                <p:oleObj spid="_x0000_s7193" name="Equation" r:id="rId5" imgW="838080" imgH="241200" progId="Equation.3">
                   <p:embed/>
                 </p:oleObj>
               </mc:Choice>
@@ -8856,7 +8884,7 @@
             </a:r>
             <a:r>
               <a:rPr lang="en-US" sz="2200" dirty="0" smtClean="0"/>
-              <a:t> 0f 0.6</a:t>
+              <a:t> of 0.6</a:t>
             </a:r>
           </a:p>
           <a:p>
@@ -8880,7 +8908,11 @@
             </a:pPr>
             <a:r>
               <a:rPr lang="en-US" sz="2200" dirty="0" smtClean="0"/>
-              <a:t>0.3 * 5 </a:t>
+              <a:t>0.6 </a:t>
+            </a:r>
+            <a:r>
+              <a:rPr lang="en-US" sz="2200" dirty="0" smtClean="0"/>
+              <a:t>* 5 </a:t>
             </a:r>
             <a:r>
               <a:rPr lang="en-US" sz="2200" dirty="0" err="1" smtClean="0"/>
@@ -8888,7 +8920,11 @@
             </a:r>
             <a:r>
               <a:rPr lang="en-US" sz="2200" dirty="0" smtClean="0"/>
-              <a:t> = 1.5 </a:t>
+              <a:t> = </a:t>
+            </a:r>
+            <a:r>
+              <a:rPr lang="en-US" sz="2200" dirty="0" smtClean="0"/>
+              <a:t>3.0 </a:t>
             </a:r>
             <a:r>
               <a:rPr lang="en-US" sz="2200" dirty="0" err="1" smtClean="0"/>
@@ -8920,7 +8956,7 @@
             </a:pPr>
             <a:r>
               <a:rPr lang="en-US" sz="2200" dirty="0" smtClean="0"/>
-              <a:t>0.3 * 1 </a:t>
+              <a:t>0.6 * 1 </a:t>
             </a:r>
             <a:r>
               <a:rPr lang="en-US" sz="2200" dirty="0" err="1" smtClean="0"/>
@@ -8928,7 +8964,7 @@
             </a:r>
             <a:r>
               <a:rPr lang="en-US" sz="2200" dirty="0" smtClean="0"/>
-              <a:t> = 0.3 </a:t>
+              <a:t> = 0.6 </a:t>
             </a:r>
             <a:r>
               <a:rPr lang="en-US" sz="2200" dirty="0" err="1" smtClean="0"/>
@@ -9284,15 +9320,7 @@
           <a:p>
             <a:r>
               <a:rPr lang="en-US" sz="2400" dirty="0" smtClean="0"/>
-              <a:t>The voltage supplied to the customer is generally maintained within the limits set by </a:t>
-            </a:r>
-            <a:r>
-              <a:rPr lang="en-US" sz="2400" dirty="0" smtClean="0"/>
-              <a:t>ANSI </a:t>
-            </a:r>
-            <a:r>
-              <a:rPr lang="en-US" sz="2400" dirty="0" smtClean="0"/>
-              <a:t>C84.1, 120V +/-5%.</a:t>
+              <a:t>The voltage supplied to the customer is generally maintained within the limits set by ANSI C84.1, 120V +/-5%.</a:t>
             </a:r>
           </a:p>
           <a:p>
@@ -11990,11 +12018,7 @@
           <a:p>
             <a:r>
               <a:rPr lang="en-US" dirty="0" smtClean="0"/>
-              <a:t>ANSI </a:t>
-            </a:r>
-            <a:r>
-              <a:rPr lang="en-US" dirty="0" smtClean="0"/>
-              <a:t>C84.1</a:t>
+              <a:t>ANSI C84.1</a:t>
             </a:r>
             <a:endParaRPr lang="en-US" dirty="0"/>
           </a:p>
@@ -12037,7 +12061,7 @@
           <a:p>
             <a:r>
               <a:rPr lang="en-US" sz="2400" dirty="0" smtClean="0"/>
-              <a:t>Range B(emergency steady-state):107V-127V (RMS)</a:t>
+              <a:t>Range B (emergency steady-state):107V-127V (RMS)</a:t>
             </a:r>
           </a:p>
           <a:p>

</xml_diff>